<commit_message>
updating schedule page and slides
</commit_message>
<xml_diff>
--- a/ClassMaterials/MoreRecursionMoreInterfaces/Slides/More_Interfaces_More_Recursion.pptx
+++ b/ClassMaterials/MoreRecursionMoreInterfaces/Slides/More_Interfaces_More_Recursion.pptx
@@ -5,7 +5,7 @@
     <p:sldMasterId id="2147483648" r:id="rId1"/>
   </p:sldMasterIdLst>
   <p:notesMasterIdLst>
-    <p:notesMasterId r:id="rId13"/>
+    <p:notesMasterId r:id="rId15"/>
   </p:notesMasterIdLst>
   <p:sldIdLst>
     <p:sldId id="256" r:id="rId2"/>
@@ -13,12 +13,14 @@
     <p:sldId id="264" r:id="rId4"/>
     <p:sldId id="265" r:id="rId5"/>
     <p:sldId id="259" r:id="rId6"/>
-    <p:sldId id="261" r:id="rId7"/>
-    <p:sldId id="262" r:id="rId8"/>
-    <p:sldId id="260" r:id="rId9"/>
-    <p:sldId id="267" r:id="rId10"/>
-    <p:sldId id="268" r:id="rId11"/>
-    <p:sldId id="269" r:id="rId12"/>
+    <p:sldId id="262" r:id="rId7"/>
+    <p:sldId id="270" r:id="rId8"/>
+    <p:sldId id="261" r:id="rId9"/>
+    <p:sldId id="260" r:id="rId10"/>
+    <p:sldId id="267" r:id="rId11"/>
+    <p:sldId id="268" r:id="rId12"/>
+    <p:sldId id="269" r:id="rId13"/>
+    <p:sldId id="271" r:id="rId14"/>
   </p:sldIdLst>
   <p:sldSz cx="9144000" cy="6858000" type="screen4x3"/>
   <p:notesSz cx="6858000" cy="9144000"/>
@@ -218,7 +220,7 @@
           <a:p>
             <a:fld id="{01A9AFE8-3E8D-E148-BA98-12759F2DD8EB}" type="datetimeFigureOut">
               <a:rPr lang="en-US" smtClean="0"/>
-              <a:t>10/5/2018</a:t>
+              <a:t>4/8/2020</a:t>
             </a:fld>
             <a:endParaRPr lang="en-US"/>
           </a:p>
@@ -526,59 +528,54 @@
         </p:nvSpPr>
         <p:spPr/>
         <p:txBody>
-          <a:bodyPr>
-            <a:normAutofit/>
-          </a:bodyPr>
-          <a:lstStyle/>
-          <a:p>
-            <a:pPr defTabSz="868801">
-              <a:defRPr/>
-            </a:pPr>
-            <a:r>
-              <a:rPr lang="en-US" dirty="0"/>
-              <a:t>[Probably should point</a:t>
-            </a:r>
-            <a:r>
-              <a:rPr lang="en-US" baseline="0" dirty="0"/>
-              <a:t> out that the slide title is not a typo.  They’ll read it as “memorization”.]</a:t>
-            </a:r>
-          </a:p>
-          <a:p>
-            <a:pPr defTabSz="868801">
-              <a:defRPr/>
-            </a:pPr>
+          <a:bodyPr/>
+          <a:lstStyle/>
+          <a:p>
+            <a:r>
+              <a:rPr lang="en-US" dirty="0" smtClean="0"/>
+              <a:t>SPECIAL TA INSTRUCTIONS:</a:t>
+            </a:r>
+          </a:p>
+          <a:p>
+            <a:r>
+              <a:rPr lang="en-US" dirty="0" smtClean="0"/>
+              <a:t>BE SURE TO WALK AROUND while students work</a:t>
+            </a:r>
+            <a:r>
+              <a:rPr lang="en-US" baseline="0" dirty="0" smtClean="0"/>
+              <a:t> </a:t>
+            </a:r>
+            <a:r>
+              <a:rPr lang="en-US" dirty="0" smtClean="0"/>
+              <a:t>on recursion examples and NUDGE in the right direction</a:t>
+            </a:r>
+          </a:p>
+          <a:p>
+            <a:endParaRPr lang="en-US" dirty="0" smtClean="0"/>
+          </a:p>
+          <a:p>
+            <a:r>
+              <a:rPr lang="en-US" dirty="0" smtClean="0"/>
+              <a:t>INSTRUCTOR:</a:t>
+            </a:r>
+          </a:p>
+          <a:p>
+            <a:r>
+              <a:rPr lang="en-US" dirty="0" smtClean="0"/>
+              <a:t>Be sure</a:t>
+            </a:r>
+            <a:r>
+              <a:rPr lang="en-US" baseline="0" dirty="0" smtClean="0"/>
+              <a:t> to start quiz BEFORE the break</a:t>
+            </a:r>
+          </a:p>
+          <a:p>
+            <a:r>
+              <a:rPr lang="en-US" baseline="0" dirty="0" smtClean="0"/>
+              <a:t>Leave 15+ minutes at the end AFTER showing UML for the refactoring of the code</a:t>
+            </a:r>
             <a:endParaRPr lang="en-US" dirty="0"/>
           </a:p>
-          <a:p>
-            <a:pPr defTabSz="868801">
-              <a:defRPr/>
-            </a:pPr>
-            <a:r>
-              <a:rPr lang="en-US" dirty="0"/>
-              <a:t>I draw out a tree of Fibonacci calls</a:t>
-            </a:r>
-            <a:r>
-              <a:rPr lang="en-US" baseline="0" dirty="0"/>
-              <a:t> on this slide for when it’s implemented as F(n) = F(n-1) + F(n-2), usually for F(5) or something like that. Then I explain that you would create an array/</a:t>
-            </a:r>
-            <a:r>
-              <a:rPr lang="en-US" baseline="0" dirty="0" err="1"/>
-              <a:t>hashmap</a:t>
-            </a:r>
-            <a:r>
-              <a:rPr lang="en-US" baseline="0" dirty="0"/>
-              <a:t>/something to contain the values you’ve previously found and each time you find one save it, then check for that first. After the explanation, I show how it would reduce the tree by leaving only one calculation of </a:t>
-            </a:r>
-            <a:r>
-              <a:rPr lang="en-US" baseline="0"/>
-              <a:t>each value left </a:t>
-            </a:r>
-            <a:r>
-              <a:rPr lang="en-US" baseline="0" dirty="0"/>
-              <a:t>in the tree.</a:t>
-            </a:r>
-            <a:endParaRPr lang="en-US" dirty="0"/>
-          </a:p>
         </p:txBody>
       </p:sp>
       <p:sp>
@@ -596,10 +593,9 @@
           <a:bodyPr/>
           <a:lstStyle/>
           <a:p>
-            <a:fld id="{3D41B427-7DFC-4CC2-88EE-62ECF6F87677}" type="slidenum">
+            <a:fld id="{45D9DED7-56C8-B246-9138-4CD26015242F}" type="slidenum">
               <a:rPr lang="en-US" smtClean="0"/>
-              <a:pPr/>
-              <a:t>6</a:t>
+              <a:t>1</a:t>
             </a:fld>
             <a:endParaRPr lang="en-US"/>
           </a:p>
@@ -608,7 +604,7 @@
     </p:spTree>
     <p:extLst>
       <p:ext uri="{BB962C8B-B14F-4D97-AF65-F5344CB8AC3E}">
-        <p14:creationId xmlns:p14="http://schemas.microsoft.com/office/powerpoint/2010/main" val="1873822009"/>
+        <p14:creationId xmlns:p14="http://schemas.microsoft.com/office/powerpoint/2010/main" val="805782995"/>
       </p:ext>
     </p:extLst>
   </p:cSld>
@@ -637,19 +633,29 @@
       </p:grpSpPr>
       <p:sp>
         <p:nvSpPr>
-          <p:cNvPr id="2" name="Slide Image Placeholder 1"/>
-          <p:cNvSpPr>
-            <a:spLocks noGrp="1" noRot="1" noChangeAspect="1"/>
+          <p:cNvPr id="26626" name="Slide Image Placeholder 1"/>
+          <p:cNvSpPr>
+            <a:spLocks noGrp="1" noRot="1" noChangeAspect="1" noTextEdit="1"/>
           </p:cNvSpPr>
           <p:nvPr>
             <p:ph type="sldImg"/>
           </p:nvPr>
         </p:nvSpPr>
-        <p:spPr/>
-      </p:sp>
-      <p:sp>
-        <p:nvSpPr>
-          <p:cNvPr id="3" name="Notes Placeholder 2"/>
+        <p:spPr bwMode="auto">
+          <a:noFill/>
+          <a:ln>
+            <a:solidFill>
+              <a:srgbClr val="000000"/>
+            </a:solidFill>
+            <a:miter lim="800000"/>
+            <a:headEnd/>
+            <a:tailEnd/>
+          </a:ln>
+        </p:spPr>
+      </p:sp>
+      <p:sp>
+        <p:nvSpPr>
+          <p:cNvPr id="26627" name="Notes Placeholder 2"/>
           <p:cNvSpPr>
             <a:spLocks noGrp="1"/>
           </p:cNvSpPr>
@@ -657,338 +663,52 @@
             <p:ph type="body" idx="1"/>
           </p:nvPr>
         </p:nvSpPr>
-        <p:spPr/>
+        <p:spPr>
+          <a:noFill/>
+          <a:ln/>
+        </p:spPr>
         <p:txBody>
           <a:bodyPr/>
           <a:lstStyle/>
           <a:p>
-            <a:r>
-              <a:rPr lang="en-US" dirty="0"/>
-              <a:t>Can ask students</a:t>
-            </a:r>
-            <a:r>
-              <a:rPr lang="en-US" baseline="0" dirty="0"/>
-              <a:t> to draw this out themselves to make sure they can translate from code to UML and then show this to verify they understood what they needed to write.</a:t>
-            </a:r>
             <a:endParaRPr lang="en-US" dirty="0"/>
           </a:p>
-          <a:p>
-            <a:endParaRPr lang="en-US" dirty="0"/>
-          </a:p>
-          <a:p>
-            <a:endParaRPr lang="en-US" dirty="0"/>
-          </a:p>
-          <a:p>
-            <a:r>
-              <a:rPr lang="en-US" dirty="0"/>
-              <a:t>@</a:t>
-            </a:r>
-            <a:r>
-              <a:rPr lang="en-US" dirty="0" err="1"/>
-              <a:t>startuml</a:t>
-            </a:r>
-            <a:endParaRPr lang="en-US" dirty="0"/>
-          </a:p>
-          <a:p>
-            <a:r>
-              <a:rPr lang="en-US" dirty="0"/>
-              <a:t>class </a:t>
-            </a:r>
-            <a:r>
-              <a:rPr lang="en-US" dirty="0" err="1"/>
-              <a:t>BettingMain</a:t>
-            </a:r>
-            <a:r>
-              <a:rPr lang="en-US" dirty="0"/>
-              <a:t> {</a:t>
-            </a:r>
-          </a:p>
-          <a:p>
-            <a:r>
-              <a:rPr lang="en-US" dirty="0" err="1"/>
-              <a:t>currentMoney</a:t>
-            </a:r>
-            <a:endParaRPr lang="en-US" dirty="0"/>
-          </a:p>
-          <a:p>
-            <a:r>
-              <a:rPr lang="en-US" dirty="0" err="1"/>
-              <a:t>handleCommand</a:t>
-            </a:r>
-            <a:r>
-              <a:rPr lang="en-US" dirty="0"/>
-              <a:t>(command)</a:t>
-            </a:r>
-          </a:p>
-          <a:p>
-            <a:r>
-              <a:rPr lang="en-US" dirty="0" err="1"/>
-              <a:t>handleRoll</a:t>
-            </a:r>
-            <a:r>
-              <a:rPr lang="en-US" dirty="0"/>
-              <a:t>()</a:t>
-            </a:r>
-          </a:p>
-          <a:p>
-            <a:r>
-              <a:rPr lang="en-US" dirty="0" err="1"/>
-              <a:t>handleNumberBet</a:t>
-            </a:r>
-            <a:r>
-              <a:rPr lang="en-US" dirty="0"/>
-              <a:t>(</a:t>
-            </a:r>
-            <a:r>
-              <a:rPr lang="en-US" dirty="0" err="1"/>
-              <a:t>betAmount</a:t>
-            </a:r>
-            <a:r>
-              <a:rPr lang="en-US" dirty="0"/>
-              <a:t>, </a:t>
-            </a:r>
-            <a:r>
-              <a:rPr lang="en-US" dirty="0" err="1"/>
-              <a:t>numberBetOn</a:t>
-            </a:r>
-            <a:r>
-              <a:rPr lang="en-US" dirty="0"/>
-              <a:t>)</a:t>
-            </a:r>
-          </a:p>
-          <a:p>
-            <a:r>
-              <a:rPr lang="en-US" dirty="0" err="1"/>
-              <a:t>handleOddEvenBet</a:t>
-            </a:r>
-            <a:r>
-              <a:rPr lang="en-US" dirty="0"/>
-              <a:t>(</a:t>
-            </a:r>
-            <a:r>
-              <a:rPr lang="en-US" dirty="0" err="1"/>
-              <a:t>oddOrEven</a:t>
-            </a:r>
-            <a:r>
-              <a:rPr lang="en-US" dirty="0"/>
-              <a:t>, </a:t>
-            </a:r>
-            <a:r>
-              <a:rPr lang="en-US" dirty="0" err="1"/>
-              <a:t>betAmount</a:t>
-            </a:r>
-            <a:r>
-              <a:rPr lang="en-US" dirty="0"/>
-              <a:t>)</a:t>
-            </a:r>
-          </a:p>
-          <a:p>
-            <a:r>
-              <a:rPr lang="en-US" dirty="0"/>
-              <a:t>}</a:t>
-            </a:r>
-          </a:p>
-          <a:p>
-            <a:endParaRPr lang="en-US" dirty="0"/>
-          </a:p>
-          <a:p>
-            <a:r>
-              <a:rPr lang="en-US" dirty="0"/>
-              <a:t>class </a:t>
-            </a:r>
-            <a:r>
-              <a:rPr lang="en-US" dirty="0" err="1"/>
-              <a:t>NumberBet</a:t>
-            </a:r>
-            <a:r>
-              <a:rPr lang="en-US" dirty="0"/>
-              <a:t> {</a:t>
-            </a:r>
-          </a:p>
-          <a:p>
-            <a:r>
-              <a:rPr lang="en-US" dirty="0" err="1"/>
-              <a:t>numberBetOn</a:t>
-            </a:r>
-            <a:endParaRPr lang="en-US" dirty="0"/>
-          </a:p>
-          <a:p>
-            <a:r>
-              <a:rPr lang="en-US" dirty="0"/>
-              <a:t>amount</a:t>
-            </a:r>
-          </a:p>
-          <a:p>
-            <a:r>
-              <a:rPr lang="en-US" dirty="0" err="1"/>
-              <a:t>isWinResult</a:t>
-            </a:r>
-            <a:r>
-              <a:rPr lang="en-US" dirty="0"/>
-              <a:t>(</a:t>
-            </a:r>
-            <a:r>
-              <a:rPr lang="en-US" dirty="0" err="1"/>
-              <a:t>rollResult</a:t>
-            </a:r>
-            <a:r>
-              <a:rPr lang="en-US" dirty="0"/>
-              <a:t>)</a:t>
-            </a:r>
-          </a:p>
-          <a:p>
-            <a:r>
-              <a:rPr lang="en-US" dirty="0" err="1"/>
-              <a:t>winAmount</a:t>
-            </a:r>
-            <a:r>
-              <a:rPr lang="en-US" dirty="0"/>
-              <a:t>()</a:t>
-            </a:r>
-          </a:p>
-          <a:p>
-            <a:r>
-              <a:rPr lang="en-US" dirty="0"/>
-              <a:t>}</a:t>
-            </a:r>
-          </a:p>
-          <a:p>
-            <a:endParaRPr lang="en-US" dirty="0"/>
-          </a:p>
-          <a:p>
-            <a:r>
-              <a:rPr lang="en-US" dirty="0"/>
-              <a:t>class </a:t>
-            </a:r>
-            <a:r>
-              <a:rPr lang="en-US" dirty="0" err="1"/>
-              <a:t>OddEvenBet</a:t>
-            </a:r>
-            <a:r>
-              <a:rPr lang="en-US" dirty="0"/>
-              <a:t>{</a:t>
-            </a:r>
-          </a:p>
-          <a:p>
-            <a:r>
-              <a:rPr lang="en-US" dirty="0" err="1"/>
-              <a:t>isEvenBet</a:t>
-            </a:r>
-            <a:endParaRPr lang="en-US" dirty="0"/>
-          </a:p>
-          <a:p>
-            <a:r>
-              <a:rPr lang="en-US" dirty="0"/>
-              <a:t>amount</a:t>
-            </a:r>
-          </a:p>
-          <a:p>
-            <a:r>
-              <a:rPr lang="en-US" dirty="0" err="1"/>
-              <a:t>isWinResult</a:t>
-            </a:r>
-            <a:r>
-              <a:rPr lang="en-US" dirty="0"/>
-              <a:t>(</a:t>
-            </a:r>
-            <a:r>
-              <a:rPr lang="en-US" dirty="0" err="1"/>
-              <a:t>rollResult</a:t>
-            </a:r>
-            <a:r>
-              <a:rPr lang="en-US" dirty="0"/>
-              <a:t>)</a:t>
-            </a:r>
-          </a:p>
-          <a:p>
-            <a:r>
-              <a:rPr lang="en-US" dirty="0" err="1"/>
-              <a:t>winAmount</a:t>
-            </a:r>
-            <a:r>
-              <a:rPr lang="en-US" dirty="0"/>
-              <a:t>()</a:t>
-            </a:r>
-          </a:p>
-          <a:p>
-            <a:r>
-              <a:rPr lang="en-US" dirty="0"/>
-              <a:t>}</a:t>
-            </a:r>
-          </a:p>
-          <a:p>
-            <a:r>
-              <a:rPr lang="en-US" dirty="0" err="1"/>
-              <a:t>BettingMain</a:t>
-            </a:r>
-            <a:r>
-              <a:rPr lang="en-US" dirty="0"/>
-              <a:t> -&gt; "*" </a:t>
-            </a:r>
-            <a:r>
-              <a:rPr lang="en-US" dirty="0" err="1"/>
-              <a:t>NumberBet</a:t>
-            </a:r>
-            <a:r>
-              <a:rPr lang="en-US" dirty="0"/>
-              <a:t> </a:t>
-            </a:r>
-          </a:p>
-          <a:p>
-            <a:r>
-              <a:rPr lang="en-US" dirty="0" err="1"/>
-              <a:t>BettingMain</a:t>
-            </a:r>
-            <a:r>
-              <a:rPr lang="en-US" dirty="0"/>
-              <a:t> -&gt; "*" </a:t>
-            </a:r>
-            <a:r>
-              <a:rPr lang="en-US" dirty="0" err="1"/>
-              <a:t>OddEvenBet</a:t>
-            </a:r>
-            <a:endParaRPr lang="en-US" dirty="0"/>
-          </a:p>
-          <a:p>
-            <a:r>
-              <a:rPr lang="en-US" dirty="0"/>
-              <a:t>@</a:t>
-            </a:r>
-            <a:r>
-              <a:rPr lang="en-US" dirty="0" err="1"/>
-              <a:t>enduml</a:t>
-            </a:r>
-            <a:endParaRPr lang="en-US" dirty="0"/>
-          </a:p>
-        </p:txBody>
-      </p:sp>
-      <p:sp>
-        <p:nvSpPr>
-          <p:cNvPr id="4" name="Slide Number Placeholder 3"/>
-          <p:cNvSpPr>
-            <a:spLocks noGrp="1"/>
-          </p:cNvSpPr>
-          <p:nvPr>
-            <p:ph type="sldNum" sz="quarter" idx="10"/>
-          </p:nvPr>
-        </p:nvSpPr>
-        <p:spPr/>
+        </p:txBody>
+      </p:sp>
+      <p:sp>
+        <p:nvSpPr>
+          <p:cNvPr id="26628" name="Slide Number Placeholder 3"/>
+          <p:cNvSpPr>
+            <a:spLocks noGrp="1"/>
+          </p:cNvSpPr>
+          <p:nvPr>
+            <p:ph type="sldNum" sz="quarter" idx="5"/>
+          </p:nvPr>
+        </p:nvSpPr>
+        <p:spPr>
+          <a:noFill/>
+        </p:spPr>
         <p:txBody>
           <a:bodyPr/>
           <a:lstStyle/>
           <a:p>
-            <a:fld id="{45D9DED7-56C8-B246-9138-4CD26015242F}" type="slidenum">
-              <a:rPr lang="en-US" smtClean="0"/>
-              <a:t>9</a:t>
+            <a:fld id="{2D0FC924-557D-4B90-ADC7-3FC4A5595839}" type="slidenum">
+              <a:rPr lang="en-US" smtClean="0">
+                <a:latin typeface="Calibri" pitchFamily="-106" charset="0"/>
+              </a:rPr>
+              <a:pPr/>
+              <a:t>7</a:t>
             </a:fld>
-            <a:endParaRPr lang="en-US"/>
+            <a:endParaRPr lang="en-US">
+              <a:latin typeface="Calibri" pitchFamily="-106" charset="0"/>
+            </a:endParaRPr>
           </a:p>
         </p:txBody>
       </p:sp>
     </p:spTree>
     <p:extLst>
       <p:ext uri="{BB962C8B-B14F-4D97-AF65-F5344CB8AC3E}">
-        <p14:creationId xmlns:p14="http://schemas.microsoft.com/office/powerpoint/2010/main" val="1248892832"/>
+        <p14:creationId xmlns:p14="http://schemas.microsoft.com/office/powerpoint/2010/main" val="2789952060"/>
       </p:ext>
     </p:extLst>
   </p:cSld>
@@ -1039,6 +759,139 @@
         </p:nvSpPr>
         <p:spPr/>
         <p:txBody>
+          <a:bodyPr>
+            <a:normAutofit/>
+          </a:bodyPr>
+          <a:lstStyle/>
+          <a:p>
+            <a:pPr defTabSz="868801">
+              <a:defRPr/>
+            </a:pPr>
+            <a:r>
+              <a:rPr lang="en-US" dirty="0"/>
+              <a:t>[Probably should point</a:t>
+            </a:r>
+            <a:r>
+              <a:rPr lang="en-US" baseline="0" dirty="0"/>
+              <a:t> out that the slide title is not a typo.  They’ll read it as “memorization”.]</a:t>
+            </a:r>
+          </a:p>
+          <a:p>
+            <a:pPr defTabSz="868801">
+              <a:defRPr/>
+            </a:pPr>
+            <a:endParaRPr lang="en-US" dirty="0"/>
+          </a:p>
+          <a:p>
+            <a:pPr defTabSz="868801">
+              <a:defRPr/>
+            </a:pPr>
+            <a:r>
+              <a:rPr lang="en-US" dirty="0"/>
+              <a:t>I draw out a tree of Fibonacci calls</a:t>
+            </a:r>
+            <a:r>
+              <a:rPr lang="en-US" baseline="0" dirty="0"/>
+              <a:t> on this slide for when it’s implemented as F(n) = F(n-1) + F(n-2), usually for F(5) or something like that. Then I explain that you would create an array/</a:t>
+            </a:r>
+            <a:r>
+              <a:rPr lang="en-US" baseline="0" dirty="0" err="1"/>
+              <a:t>hashmap</a:t>
+            </a:r>
+            <a:r>
+              <a:rPr lang="en-US" baseline="0" dirty="0"/>
+              <a:t>/something to contain the values you’ve previously found and each time you find one save it, then check for that first. After the explanation, I show how it would reduce the tree by leaving only one calculation of </a:t>
+            </a:r>
+            <a:r>
+              <a:rPr lang="en-US" baseline="0"/>
+              <a:t>each value left </a:t>
+            </a:r>
+            <a:r>
+              <a:rPr lang="en-US" baseline="0" dirty="0"/>
+              <a:t>in the tree.</a:t>
+            </a:r>
+            <a:endParaRPr lang="en-US" dirty="0"/>
+          </a:p>
+        </p:txBody>
+      </p:sp>
+      <p:sp>
+        <p:nvSpPr>
+          <p:cNvPr id="4" name="Slide Number Placeholder 3"/>
+          <p:cNvSpPr>
+            <a:spLocks noGrp="1"/>
+          </p:cNvSpPr>
+          <p:nvPr>
+            <p:ph type="sldNum" sz="quarter" idx="10"/>
+          </p:nvPr>
+        </p:nvSpPr>
+        <p:spPr/>
+        <p:txBody>
+          <a:bodyPr/>
+          <a:lstStyle/>
+          <a:p>
+            <a:fld id="{3D41B427-7DFC-4CC2-88EE-62ECF6F87677}" type="slidenum">
+              <a:rPr lang="en-US" smtClean="0"/>
+              <a:pPr/>
+              <a:t>8</a:t>
+            </a:fld>
+            <a:endParaRPr lang="en-US"/>
+          </a:p>
+        </p:txBody>
+      </p:sp>
+    </p:spTree>
+    <p:extLst>
+      <p:ext uri="{BB962C8B-B14F-4D97-AF65-F5344CB8AC3E}">
+        <p14:creationId xmlns:p14="http://schemas.microsoft.com/office/powerpoint/2010/main" val="1873822009"/>
+      </p:ext>
+    </p:extLst>
+  </p:cSld>
+  <p:clrMapOvr>
+    <a:masterClrMapping/>
+  </p:clrMapOvr>
+</p:notes>
+</file>
+
+<file path=ppt/notesSlides/notesSlide4.xml><?xml version="1.0" encoding="utf-8"?>
+<p:notes xmlns:a="http://schemas.openxmlformats.org/drawingml/2006/main" xmlns:r="http://schemas.openxmlformats.org/officeDocument/2006/relationships" xmlns:p="http://schemas.openxmlformats.org/presentationml/2006/main">
+  <p:cSld>
+    <p:spTree>
+      <p:nvGrpSpPr>
+        <p:cNvPr id="1" name=""/>
+        <p:cNvGrpSpPr/>
+        <p:nvPr/>
+      </p:nvGrpSpPr>
+      <p:grpSpPr>
+        <a:xfrm>
+          <a:off x="0" y="0"/>
+          <a:ext cx="0" cy="0"/>
+          <a:chOff x="0" y="0"/>
+          <a:chExt cx="0" cy="0"/>
+        </a:xfrm>
+      </p:grpSpPr>
+      <p:sp>
+        <p:nvSpPr>
+          <p:cNvPr id="2" name="Slide Image Placeholder 1"/>
+          <p:cNvSpPr>
+            <a:spLocks noGrp="1" noRot="1" noChangeAspect="1"/>
+          </p:cNvSpPr>
+          <p:nvPr>
+            <p:ph type="sldImg"/>
+          </p:nvPr>
+        </p:nvSpPr>
+        <p:spPr/>
+      </p:sp>
+      <p:sp>
+        <p:nvSpPr>
+          <p:cNvPr id="3" name="Notes Placeholder 2"/>
+          <p:cNvSpPr>
+            <a:spLocks noGrp="1"/>
+          </p:cNvSpPr>
+          <p:nvPr>
+            <p:ph type="body" idx="1"/>
+          </p:nvPr>
+        </p:nvSpPr>
+        <p:spPr/>
+        <p:txBody>
           <a:bodyPr/>
           <a:lstStyle/>
           <a:p>
@@ -1369,6 +1222,832 @@
     <p:extLst>
       <p:ext uri="{BB962C8B-B14F-4D97-AF65-F5344CB8AC3E}">
         <p14:creationId xmlns:p14="http://schemas.microsoft.com/office/powerpoint/2010/main" val="1248892832"/>
+      </p:ext>
+    </p:extLst>
+  </p:cSld>
+  <p:clrMapOvr>
+    <a:masterClrMapping/>
+  </p:clrMapOvr>
+</p:notes>
+</file>
+
+<file path=ppt/notesSlides/notesSlide5.xml><?xml version="1.0" encoding="utf-8"?>
+<p:notes xmlns:a="http://schemas.openxmlformats.org/drawingml/2006/main" xmlns:r="http://schemas.openxmlformats.org/officeDocument/2006/relationships" xmlns:p="http://schemas.openxmlformats.org/presentationml/2006/main">
+  <p:cSld>
+    <p:spTree>
+      <p:nvGrpSpPr>
+        <p:cNvPr id="1" name=""/>
+        <p:cNvGrpSpPr/>
+        <p:nvPr/>
+      </p:nvGrpSpPr>
+      <p:grpSpPr>
+        <a:xfrm>
+          <a:off x="0" y="0"/>
+          <a:ext cx="0" cy="0"/>
+          <a:chOff x="0" y="0"/>
+          <a:chExt cx="0" cy="0"/>
+        </a:xfrm>
+      </p:grpSpPr>
+      <p:sp>
+        <p:nvSpPr>
+          <p:cNvPr id="2" name="Slide Image Placeholder 1"/>
+          <p:cNvSpPr>
+            <a:spLocks noGrp="1" noRot="1" noChangeAspect="1"/>
+          </p:cNvSpPr>
+          <p:nvPr>
+            <p:ph type="sldImg"/>
+          </p:nvPr>
+        </p:nvSpPr>
+        <p:spPr/>
+      </p:sp>
+      <p:sp>
+        <p:nvSpPr>
+          <p:cNvPr id="3" name="Notes Placeholder 2"/>
+          <p:cNvSpPr>
+            <a:spLocks noGrp="1"/>
+          </p:cNvSpPr>
+          <p:nvPr>
+            <p:ph type="body" idx="1"/>
+          </p:nvPr>
+        </p:nvSpPr>
+        <p:spPr/>
+        <p:txBody>
+          <a:bodyPr/>
+          <a:lstStyle/>
+          <a:p>
+            <a:r>
+              <a:rPr lang="en-US" dirty="0"/>
+              <a:t>Can ask students</a:t>
+            </a:r>
+            <a:r>
+              <a:rPr lang="en-US" baseline="0" dirty="0"/>
+              <a:t> to draw this out themselves to make sure they can translate from code to UML and then show this to verify they understood what they needed to write.</a:t>
+            </a:r>
+            <a:endParaRPr lang="en-US" dirty="0"/>
+          </a:p>
+          <a:p>
+            <a:endParaRPr lang="en-US" dirty="0"/>
+          </a:p>
+          <a:p>
+            <a:endParaRPr lang="en-US" dirty="0"/>
+          </a:p>
+          <a:p>
+            <a:r>
+              <a:rPr lang="en-US" dirty="0"/>
+              <a:t>@</a:t>
+            </a:r>
+            <a:r>
+              <a:rPr lang="en-US" dirty="0" err="1"/>
+              <a:t>startuml</a:t>
+            </a:r>
+            <a:endParaRPr lang="en-US" dirty="0"/>
+          </a:p>
+          <a:p>
+            <a:r>
+              <a:rPr lang="en-US" dirty="0"/>
+              <a:t>class </a:t>
+            </a:r>
+            <a:r>
+              <a:rPr lang="en-US" dirty="0" err="1"/>
+              <a:t>BettingMain</a:t>
+            </a:r>
+            <a:r>
+              <a:rPr lang="en-US" dirty="0"/>
+              <a:t> {</a:t>
+            </a:r>
+          </a:p>
+          <a:p>
+            <a:r>
+              <a:rPr lang="en-US" dirty="0" err="1"/>
+              <a:t>currentMoney</a:t>
+            </a:r>
+            <a:endParaRPr lang="en-US" dirty="0"/>
+          </a:p>
+          <a:p>
+            <a:r>
+              <a:rPr lang="en-US" dirty="0" err="1"/>
+              <a:t>handleCommand</a:t>
+            </a:r>
+            <a:r>
+              <a:rPr lang="en-US" dirty="0"/>
+              <a:t>(command)</a:t>
+            </a:r>
+          </a:p>
+          <a:p>
+            <a:r>
+              <a:rPr lang="en-US" dirty="0" err="1"/>
+              <a:t>handleRoll</a:t>
+            </a:r>
+            <a:r>
+              <a:rPr lang="en-US" dirty="0"/>
+              <a:t>()</a:t>
+            </a:r>
+          </a:p>
+          <a:p>
+            <a:r>
+              <a:rPr lang="en-US" dirty="0" err="1"/>
+              <a:t>handleNumberBet</a:t>
+            </a:r>
+            <a:r>
+              <a:rPr lang="en-US" dirty="0"/>
+              <a:t>(</a:t>
+            </a:r>
+            <a:r>
+              <a:rPr lang="en-US" dirty="0" err="1"/>
+              <a:t>betAmount</a:t>
+            </a:r>
+            <a:r>
+              <a:rPr lang="en-US" dirty="0"/>
+              <a:t>, </a:t>
+            </a:r>
+            <a:r>
+              <a:rPr lang="en-US" dirty="0" err="1"/>
+              <a:t>numberBetOn</a:t>
+            </a:r>
+            <a:r>
+              <a:rPr lang="en-US" dirty="0"/>
+              <a:t>)</a:t>
+            </a:r>
+          </a:p>
+          <a:p>
+            <a:r>
+              <a:rPr lang="en-US" dirty="0" err="1"/>
+              <a:t>handleOddEvenBet</a:t>
+            </a:r>
+            <a:r>
+              <a:rPr lang="en-US" dirty="0"/>
+              <a:t>(</a:t>
+            </a:r>
+            <a:r>
+              <a:rPr lang="en-US" dirty="0" err="1"/>
+              <a:t>oddOrEven</a:t>
+            </a:r>
+            <a:r>
+              <a:rPr lang="en-US" dirty="0"/>
+              <a:t>, </a:t>
+            </a:r>
+            <a:r>
+              <a:rPr lang="en-US" dirty="0" err="1"/>
+              <a:t>betAmount</a:t>
+            </a:r>
+            <a:r>
+              <a:rPr lang="en-US" dirty="0"/>
+              <a:t>)</a:t>
+            </a:r>
+          </a:p>
+          <a:p>
+            <a:r>
+              <a:rPr lang="en-US" dirty="0"/>
+              <a:t>}</a:t>
+            </a:r>
+          </a:p>
+          <a:p>
+            <a:endParaRPr lang="en-US" dirty="0"/>
+          </a:p>
+          <a:p>
+            <a:r>
+              <a:rPr lang="en-US" dirty="0"/>
+              <a:t>class </a:t>
+            </a:r>
+            <a:r>
+              <a:rPr lang="en-US" dirty="0" err="1"/>
+              <a:t>NumberBet</a:t>
+            </a:r>
+            <a:r>
+              <a:rPr lang="en-US" dirty="0"/>
+              <a:t> {</a:t>
+            </a:r>
+          </a:p>
+          <a:p>
+            <a:r>
+              <a:rPr lang="en-US" dirty="0" err="1"/>
+              <a:t>numberBetOn</a:t>
+            </a:r>
+            <a:endParaRPr lang="en-US" dirty="0"/>
+          </a:p>
+          <a:p>
+            <a:r>
+              <a:rPr lang="en-US" dirty="0"/>
+              <a:t>amount</a:t>
+            </a:r>
+          </a:p>
+          <a:p>
+            <a:r>
+              <a:rPr lang="en-US" dirty="0" err="1"/>
+              <a:t>isWinResult</a:t>
+            </a:r>
+            <a:r>
+              <a:rPr lang="en-US" dirty="0"/>
+              <a:t>(</a:t>
+            </a:r>
+            <a:r>
+              <a:rPr lang="en-US" dirty="0" err="1"/>
+              <a:t>rollResult</a:t>
+            </a:r>
+            <a:r>
+              <a:rPr lang="en-US" dirty="0"/>
+              <a:t>)</a:t>
+            </a:r>
+          </a:p>
+          <a:p>
+            <a:r>
+              <a:rPr lang="en-US" dirty="0" err="1"/>
+              <a:t>winAmount</a:t>
+            </a:r>
+            <a:r>
+              <a:rPr lang="en-US" dirty="0"/>
+              <a:t>()</a:t>
+            </a:r>
+          </a:p>
+          <a:p>
+            <a:r>
+              <a:rPr lang="en-US" dirty="0"/>
+              <a:t>}</a:t>
+            </a:r>
+          </a:p>
+          <a:p>
+            <a:endParaRPr lang="en-US" dirty="0"/>
+          </a:p>
+          <a:p>
+            <a:r>
+              <a:rPr lang="en-US" dirty="0"/>
+              <a:t>class </a:t>
+            </a:r>
+            <a:r>
+              <a:rPr lang="en-US" dirty="0" err="1"/>
+              <a:t>OddEvenBet</a:t>
+            </a:r>
+            <a:r>
+              <a:rPr lang="en-US" dirty="0"/>
+              <a:t>{</a:t>
+            </a:r>
+          </a:p>
+          <a:p>
+            <a:r>
+              <a:rPr lang="en-US" dirty="0" err="1"/>
+              <a:t>isEvenBet</a:t>
+            </a:r>
+            <a:endParaRPr lang="en-US" dirty="0"/>
+          </a:p>
+          <a:p>
+            <a:r>
+              <a:rPr lang="en-US" dirty="0"/>
+              <a:t>amount</a:t>
+            </a:r>
+          </a:p>
+          <a:p>
+            <a:r>
+              <a:rPr lang="en-US" dirty="0" err="1"/>
+              <a:t>isWinResult</a:t>
+            </a:r>
+            <a:r>
+              <a:rPr lang="en-US" dirty="0"/>
+              <a:t>(</a:t>
+            </a:r>
+            <a:r>
+              <a:rPr lang="en-US" dirty="0" err="1"/>
+              <a:t>rollResult</a:t>
+            </a:r>
+            <a:r>
+              <a:rPr lang="en-US" dirty="0"/>
+              <a:t>)</a:t>
+            </a:r>
+          </a:p>
+          <a:p>
+            <a:r>
+              <a:rPr lang="en-US" dirty="0" err="1"/>
+              <a:t>winAmount</a:t>
+            </a:r>
+            <a:r>
+              <a:rPr lang="en-US" dirty="0"/>
+              <a:t>()</a:t>
+            </a:r>
+          </a:p>
+          <a:p>
+            <a:r>
+              <a:rPr lang="en-US" dirty="0"/>
+              <a:t>}</a:t>
+            </a:r>
+          </a:p>
+          <a:p>
+            <a:r>
+              <a:rPr lang="en-US" dirty="0" err="1"/>
+              <a:t>BettingMain</a:t>
+            </a:r>
+            <a:r>
+              <a:rPr lang="en-US" dirty="0"/>
+              <a:t> -&gt; "*" </a:t>
+            </a:r>
+            <a:r>
+              <a:rPr lang="en-US" dirty="0" err="1"/>
+              <a:t>NumberBet</a:t>
+            </a:r>
+            <a:r>
+              <a:rPr lang="en-US" dirty="0"/>
+              <a:t> </a:t>
+            </a:r>
+          </a:p>
+          <a:p>
+            <a:r>
+              <a:rPr lang="en-US" dirty="0" err="1"/>
+              <a:t>BettingMain</a:t>
+            </a:r>
+            <a:r>
+              <a:rPr lang="en-US" dirty="0"/>
+              <a:t> -&gt; "*" </a:t>
+            </a:r>
+            <a:r>
+              <a:rPr lang="en-US" dirty="0" err="1"/>
+              <a:t>OddEvenBet</a:t>
+            </a:r>
+            <a:endParaRPr lang="en-US" dirty="0"/>
+          </a:p>
+          <a:p>
+            <a:r>
+              <a:rPr lang="en-US" dirty="0"/>
+              <a:t>@</a:t>
+            </a:r>
+            <a:r>
+              <a:rPr lang="en-US" dirty="0" err="1"/>
+              <a:t>enduml</a:t>
+            </a:r>
+            <a:endParaRPr lang="en-US" dirty="0"/>
+          </a:p>
+        </p:txBody>
+      </p:sp>
+      <p:sp>
+        <p:nvSpPr>
+          <p:cNvPr id="4" name="Slide Number Placeholder 3"/>
+          <p:cNvSpPr>
+            <a:spLocks noGrp="1"/>
+          </p:cNvSpPr>
+          <p:nvPr>
+            <p:ph type="sldNum" sz="quarter" idx="10"/>
+          </p:nvPr>
+        </p:nvSpPr>
+        <p:spPr/>
+        <p:txBody>
+          <a:bodyPr/>
+          <a:lstStyle/>
+          <a:p>
+            <a:fld id="{45D9DED7-56C8-B246-9138-4CD26015242F}" type="slidenum">
+              <a:rPr lang="en-US" smtClean="0"/>
+              <a:t>11</a:t>
+            </a:fld>
+            <a:endParaRPr lang="en-US"/>
+          </a:p>
+        </p:txBody>
+      </p:sp>
+    </p:spTree>
+    <p:extLst>
+      <p:ext uri="{BB962C8B-B14F-4D97-AF65-F5344CB8AC3E}">
+        <p14:creationId xmlns:p14="http://schemas.microsoft.com/office/powerpoint/2010/main" val="1248892832"/>
+      </p:ext>
+    </p:extLst>
+  </p:cSld>
+  <p:clrMapOvr>
+    <a:masterClrMapping/>
+  </p:clrMapOvr>
+</p:notes>
+</file>
+
+<file path=ppt/notesSlides/notesSlide6.xml><?xml version="1.0" encoding="utf-8"?>
+<p:notes xmlns:a="http://schemas.openxmlformats.org/drawingml/2006/main" xmlns:r="http://schemas.openxmlformats.org/officeDocument/2006/relationships" xmlns:p="http://schemas.openxmlformats.org/presentationml/2006/main">
+  <p:cSld>
+    <p:spTree>
+      <p:nvGrpSpPr>
+        <p:cNvPr id="1" name=""/>
+        <p:cNvGrpSpPr/>
+        <p:nvPr/>
+      </p:nvGrpSpPr>
+      <p:grpSpPr>
+        <a:xfrm>
+          <a:off x="0" y="0"/>
+          <a:ext cx="0" cy="0"/>
+          <a:chOff x="0" y="0"/>
+          <a:chExt cx="0" cy="0"/>
+        </a:xfrm>
+      </p:grpSpPr>
+      <p:sp>
+        <p:nvSpPr>
+          <p:cNvPr id="2" name="Slide Image Placeholder 1"/>
+          <p:cNvSpPr>
+            <a:spLocks noGrp="1" noRot="1" noChangeAspect="1"/>
+          </p:cNvSpPr>
+          <p:nvPr>
+            <p:ph type="sldImg"/>
+          </p:nvPr>
+        </p:nvSpPr>
+        <p:spPr/>
+      </p:sp>
+      <p:sp>
+        <p:nvSpPr>
+          <p:cNvPr id="3" name="Notes Placeholder 2"/>
+          <p:cNvSpPr>
+            <a:spLocks noGrp="1"/>
+          </p:cNvSpPr>
+          <p:nvPr>
+            <p:ph type="body" idx="1"/>
+          </p:nvPr>
+        </p:nvSpPr>
+        <p:spPr/>
+        <p:txBody>
+          <a:bodyPr/>
+          <a:lstStyle/>
+          <a:p>
+            <a:r>
+              <a:rPr lang="en-US" dirty="0" smtClean="0"/>
+              <a:t>@</a:t>
+            </a:r>
+            <a:r>
+              <a:rPr lang="en-US" dirty="0" err="1" smtClean="0"/>
+              <a:t>startuml</a:t>
+            </a:r>
+            <a:endParaRPr lang="en-US" dirty="0" smtClean="0"/>
+          </a:p>
+          <a:p>
+            <a:r>
+              <a:rPr lang="en-US" dirty="0" err="1" smtClean="0"/>
+              <a:t>skinparam</a:t>
+            </a:r>
+            <a:r>
+              <a:rPr lang="en-US" dirty="0" smtClean="0"/>
+              <a:t> style </a:t>
+            </a:r>
+            <a:r>
+              <a:rPr lang="en-US" dirty="0" err="1" smtClean="0"/>
+              <a:t>strictuml</a:t>
+            </a:r>
+            <a:endParaRPr lang="en-US" dirty="0" smtClean="0"/>
+          </a:p>
+          <a:p>
+            <a:r>
+              <a:rPr lang="en-US" dirty="0" smtClean="0"/>
+              <a:t>class </a:t>
+            </a:r>
+            <a:r>
+              <a:rPr lang="en-US" dirty="0" err="1" smtClean="0"/>
+              <a:t>BettingMain</a:t>
+            </a:r>
+            <a:r>
+              <a:rPr lang="en-US" dirty="0" smtClean="0"/>
+              <a:t> {</a:t>
+            </a:r>
+          </a:p>
+          <a:p>
+            <a:r>
+              <a:rPr lang="en-US" dirty="0" err="1" smtClean="0"/>
+              <a:t>currentMoney</a:t>
+            </a:r>
+            <a:endParaRPr lang="en-US" dirty="0" smtClean="0"/>
+          </a:p>
+          <a:p>
+            <a:r>
+              <a:rPr lang="en-US" dirty="0" err="1" smtClean="0"/>
+              <a:t>handleCommand</a:t>
+            </a:r>
+            <a:r>
+              <a:rPr lang="en-US" dirty="0" smtClean="0"/>
+              <a:t>(command)</a:t>
+            </a:r>
+          </a:p>
+          <a:p>
+            <a:r>
+              <a:rPr lang="en-US" dirty="0" err="1" smtClean="0"/>
+              <a:t>handleRoll</a:t>
+            </a:r>
+            <a:r>
+              <a:rPr lang="en-US" dirty="0" smtClean="0"/>
+              <a:t>()</a:t>
+            </a:r>
+          </a:p>
+          <a:p>
+            <a:r>
+              <a:rPr lang="en-US" dirty="0" err="1" smtClean="0"/>
+              <a:t>handleNumberBet</a:t>
+            </a:r>
+            <a:r>
+              <a:rPr lang="en-US" dirty="0" smtClean="0"/>
+              <a:t>(</a:t>
+            </a:r>
+            <a:r>
+              <a:rPr lang="en-US" dirty="0" err="1" smtClean="0"/>
+              <a:t>betAmount</a:t>
+            </a:r>
+            <a:r>
+              <a:rPr lang="en-US" dirty="0" smtClean="0"/>
+              <a:t>, </a:t>
+            </a:r>
+            <a:r>
+              <a:rPr lang="en-US" dirty="0" err="1" smtClean="0"/>
+              <a:t>numberBetOn</a:t>
+            </a:r>
+            <a:r>
+              <a:rPr lang="en-US" dirty="0" smtClean="0"/>
+              <a:t>)</a:t>
+            </a:r>
+          </a:p>
+          <a:p>
+            <a:r>
+              <a:rPr lang="en-US" dirty="0" err="1" smtClean="0"/>
+              <a:t>handleOddEvenBet</a:t>
+            </a:r>
+            <a:r>
+              <a:rPr lang="en-US" dirty="0" smtClean="0"/>
+              <a:t>(</a:t>
+            </a:r>
+            <a:r>
+              <a:rPr lang="en-US" dirty="0" err="1" smtClean="0"/>
+              <a:t>oddOrEven</a:t>
+            </a:r>
+            <a:r>
+              <a:rPr lang="en-US" dirty="0" smtClean="0"/>
+              <a:t>, </a:t>
+            </a:r>
+            <a:r>
+              <a:rPr lang="en-US" dirty="0" err="1" smtClean="0"/>
+              <a:t>betAmount</a:t>
+            </a:r>
+            <a:r>
+              <a:rPr lang="en-US" dirty="0" smtClean="0"/>
+              <a:t>)</a:t>
+            </a:r>
+          </a:p>
+          <a:p>
+            <a:r>
+              <a:rPr lang="en-US" dirty="0" smtClean="0"/>
+              <a:t>}</a:t>
+            </a:r>
+          </a:p>
+          <a:p>
+            <a:r>
+              <a:rPr lang="en-US" dirty="0" smtClean="0"/>
+              <a:t>interface Bet {</a:t>
+            </a:r>
+          </a:p>
+          <a:p>
+            <a:r>
+              <a:rPr lang="en-US" dirty="0" err="1" smtClean="0"/>
+              <a:t>isWinResult</a:t>
+            </a:r>
+            <a:r>
+              <a:rPr lang="en-US" dirty="0" smtClean="0"/>
+              <a:t>(</a:t>
+            </a:r>
+            <a:r>
+              <a:rPr lang="en-US" dirty="0" err="1" smtClean="0"/>
+              <a:t>rollResult</a:t>
+            </a:r>
+            <a:r>
+              <a:rPr lang="en-US" dirty="0" smtClean="0"/>
+              <a:t>)</a:t>
+            </a:r>
+          </a:p>
+          <a:p>
+            <a:r>
+              <a:rPr lang="en-US" dirty="0" err="1" smtClean="0"/>
+              <a:t>winAmount</a:t>
+            </a:r>
+            <a:r>
+              <a:rPr lang="en-US" dirty="0" smtClean="0"/>
+              <a:t>()</a:t>
+            </a:r>
+          </a:p>
+          <a:p>
+            <a:r>
+              <a:rPr lang="en-US" dirty="0" smtClean="0"/>
+              <a:t>}</a:t>
+            </a:r>
+          </a:p>
+          <a:p>
+            <a:r>
+              <a:rPr lang="en-US" dirty="0" smtClean="0"/>
+              <a:t>class </a:t>
+            </a:r>
+            <a:r>
+              <a:rPr lang="en-US" dirty="0" err="1" smtClean="0"/>
+              <a:t>NumberBet</a:t>
+            </a:r>
+            <a:r>
+              <a:rPr lang="en-US" dirty="0" smtClean="0"/>
+              <a:t> {</a:t>
+            </a:r>
+          </a:p>
+          <a:p>
+            <a:r>
+              <a:rPr lang="en-US" dirty="0" err="1" smtClean="0"/>
+              <a:t>numberBetOn</a:t>
+            </a:r>
+            <a:endParaRPr lang="en-US" dirty="0" smtClean="0"/>
+          </a:p>
+          <a:p>
+            <a:r>
+              <a:rPr lang="en-US" dirty="0" smtClean="0"/>
+              <a:t>amount</a:t>
+            </a:r>
+          </a:p>
+          <a:p>
+            <a:r>
+              <a:rPr lang="en-US" dirty="0" smtClean="0"/>
+              <a:t>}</a:t>
+            </a:r>
+          </a:p>
+          <a:p>
+            <a:endParaRPr lang="en-US" dirty="0" smtClean="0"/>
+          </a:p>
+          <a:p>
+            <a:r>
+              <a:rPr lang="en-US" dirty="0" smtClean="0"/>
+              <a:t>class </a:t>
+            </a:r>
+            <a:r>
+              <a:rPr lang="en-US" dirty="0" err="1" smtClean="0"/>
+              <a:t>OddEvenBet</a:t>
+            </a:r>
+            <a:r>
+              <a:rPr lang="en-US" dirty="0" smtClean="0"/>
+              <a:t>{</a:t>
+            </a:r>
+          </a:p>
+          <a:p>
+            <a:r>
+              <a:rPr lang="en-US" dirty="0" err="1" smtClean="0"/>
+              <a:t>isEvenBet</a:t>
+            </a:r>
+            <a:endParaRPr lang="en-US" dirty="0" smtClean="0"/>
+          </a:p>
+          <a:p>
+            <a:r>
+              <a:rPr lang="en-US" dirty="0" smtClean="0"/>
+              <a:t>amount</a:t>
+            </a:r>
+          </a:p>
+          <a:p>
+            <a:r>
+              <a:rPr lang="en-US" dirty="0" smtClean="0"/>
+              <a:t>}</a:t>
+            </a:r>
+          </a:p>
+          <a:p>
+            <a:endParaRPr lang="en-US" dirty="0" smtClean="0"/>
+          </a:p>
+          <a:p>
+            <a:r>
+              <a:rPr lang="en-US" dirty="0" smtClean="0"/>
+              <a:t>class </a:t>
+            </a:r>
+            <a:r>
+              <a:rPr lang="en-US" dirty="0" err="1" smtClean="0"/>
+              <a:t>HighBet</a:t>
+            </a:r>
+            <a:r>
+              <a:rPr lang="en-US" dirty="0" smtClean="0"/>
+              <a:t>{</a:t>
+            </a:r>
+          </a:p>
+          <a:p>
+            <a:r>
+              <a:rPr lang="en-US" dirty="0" smtClean="0"/>
+              <a:t>amount</a:t>
+            </a:r>
+          </a:p>
+          <a:p>
+            <a:r>
+              <a:rPr lang="en-US" dirty="0" smtClean="0"/>
+              <a:t>}</a:t>
+            </a:r>
+          </a:p>
+          <a:p>
+            <a:r>
+              <a:rPr lang="en-US" dirty="0" err="1" smtClean="0"/>
+              <a:t>BettingMain</a:t>
+            </a:r>
+            <a:r>
+              <a:rPr lang="en-US" dirty="0" smtClean="0"/>
+              <a:t> -&gt;"*" Bet </a:t>
+            </a:r>
+          </a:p>
+          <a:p>
+            <a:r>
+              <a:rPr lang="en-US" dirty="0" err="1" smtClean="0"/>
+              <a:t>BettingMain</a:t>
+            </a:r>
+            <a:r>
+              <a:rPr lang="en-US" dirty="0" smtClean="0"/>
+              <a:t> .-&gt; </a:t>
+            </a:r>
+            <a:r>
+              <a:rPr lang="en-US" dirty="0" err="1" smtClean="0"/>
+              <a:t>HighBet</a:t>
+            </a:r>
+            <a:r>
+              <a:rPr lang="en-US" dirty="0" smtClean="0"/>
+              <a:t> </a:t>
+            </a:r>
+          </a:p>
+          <a:p>
+            <a:r>
+              <a:rPr lang="en-US" dirty="0" err="1" smtClean="0"/>
+              <a:t>BettingMain</a:t>
+            </a:r>
+            <a:r>
+              <a:rPr lang="en-US" dirty="0" smtClean="0"/>
+              <a:t> .-&gt; </a:t>
+            </a:r>
+            <a:r>
+              <a:rPr lang="en-US" dirty="0" err="1" smtClean="0"/>
+              <a:t>NumberBet</a:t>
+            </a:r>
+            <a:r>
+              <a:rPr lang="en-US" dirty="0" smtClean="0"/>
+              <a:t> </a:t>
+            </a:r>
+          </a:p>
+          <a:p>
+            <a:r>
+              <a:rPr lang="en-US" dirty="0" err="1" smtClean="0"/>
+              <a:t>BettingMain</a:t>
+            </a:r>
+            <a:r>
+              <a:rPr lang="en-US" dirty="0" smtClean="0"/>
+              <a:t> .-&gt; </a:t>
+            </a:r>
+            <a:r>
+              <a:rPr lang="en-US" dirty="0" err="1" smtClean="0"/>
+              <a:t>OddEvenBet</a:t>
+            </a:r>
+            <a:endParaRPr lang="en-US" dirty="0" smtClean="0"/>
+          </a:p>
+          <a:p>
+            <a:r>
+              <a:rPr lang="en-US" dirty="0" err="1" smtClean="0"/>
+              <a:t>HighBet</a:t>
+            </a:r>
+            <a:r>
+              <a:rPr lang="en-US" dirty="0" smtClean="0"/>
+              <a:t> .-|&gt; Bet </a:t>
+            </a:r>
+          </a:p>
+          <a:p>
+            <a:r>
+              <a:rPr lang="en-US" dirty="0" err="1" smtClean="0"/>
+              <a:t>NumberBet</a:t>
+            </a:r>
+            <a:r>
+              <a:rPr lang="en-US" dirty="0" smtClean="0"/>
+              <a:t> .-|&gt; Bet </a:t>
+            </a:r>
+          </a:p>
+          <a:p>
+            <a:r>
+              <a:rPr lang="en-US" dirty="0" err="1" smtClean="0"/>
+              <a:t>OddEvenBet</a:t>
+            </a:r>
+            <a:r>
+              <a:rPr lang="en-US" dirty="0" smtClean="0"/>
+              <a:t> .-|&gt; Bet</a:t>
+            </a:r>
+          </a:p>
+          <a:p>
+            <a:r>
+              <a:rPr lang="en-US" dirty="0" smtClean="0"/>
+              <a:t>@</a:t>
+            </a:r>
+            <a:r>
+              <a:rPr lang="en-US" dirty="0" err="1" smtClean="0"/>
+              <a:t>enduml</a:t>
+            </a:r>
+            <a:endParaRPr lang="en-US" dirty="0"/>
+          </a:p>
+        </p:txBody>
+      </p:sp>
+      <p:sp>
+        <p:nvSpPr>
+          <p:cNvPr id="4" name="Slide Number Placeholder 3"/>
+          <p:cNvSpPr>
+            <a:spLocks noGrp="1"/>
+          </p:cNvSpPr>
+          <p:nvPr>
+            <p:ph type="sldNum" sz="quarter" idx="10"/>
+          </p:nvPr>
+        </p:nvSpPr>
+        <p:spPr/>
+        <p:txBody>
+          <a:bodyPr/>
+          <a:lstStyle/>
+          <a:p>
+            <a:fld id="{45D9DED7-56C8-B246-9138-4CD26015242F}" type="slidenum">
+              <a:rPr lang="en-US" smtClean="0"/>
+              <a:t>13</a:t>
+            </a:fld>
+            <a:endParaRPr lang="en-US"/>
+          </a:p>
+        </p:txBody>
+      </p:sp>
+    </p:spTree>
+    <p:extLst>
+      <p:ext uri="{BB962C8B-B14F-4D97-AF65-F5344CB8AC3E}">
+        <p14:creationId xmlns:p14="http://schemas.microsoft.com/office/powerpoint/2010/main" val="3224250334"/>
       </p:ext>
     </p:extLst>
   </p:cSld>
@@ -1557,7 +2236,7 @@
           <a:p>
             <a:fld id="{E6E52604-4630-4861-9364-F52CA104A3D5}" type="datetimeFigureOut">
               <a:rPr lang="en-US" smtClean="0"/>
-              <a:t>10/5/2018</a:t>
+              <a:t>4/8/2020</a:t>
             </a:fld>
             <a:endParaRPr lang="en-US"/>
           </a:p>
@@ -1725,7 +2404,7 @@
           <a:p>
             <a:fld id="{E6E52604-4630-4861-9364-F52CA104A3D5}" type="datetimeFigureOut">
               <a:rPr lang="en-US" smtClean="0"/>
-              <a:t>10/5/2018</a:t>
+              <a:t>4/8/2020</a:t>
             </a:fld>
             <a:endParaRPr lang="en-US"/>
           </a:p>
@@ -1903,7 +2582,7 @@
           <a:p>
             <a:fld id="{E6E52604-4630-4861-9364-F52CA104A3D5}" type="datetimeFigureOut">
               <a:rPr lang="en-US" smtClean="0"/>
-              <a:t>10/5/2018</a:t>
+              <a:t>4/8/2020</a:t>
             </a:fld>
             <a:endParaRPr lang="en-US"/>
           </a:p>
@@ -2071,7 +2750,7 @@
           <a:p>
             <a:fld id="{E6E52604-4630-4861-9364-F52CA104A3D5}" type="datetimeFigureOut">
               <a:rPr lang="en-US" smtClean="0"/>
-              <a:t>10/5/2018</a:t>
+              <a:t>4/8/2020</a:t>
             </a:fld>
             <a:endParaRPr lang="en-US"/>
           </a:p>
@@ -2316,7 +2995,7 @@
           <a:p>
             <a:fld id="{E6E52604-4630-4861-9364-F52CA104A3D5}" type="datetimeFigureOut">
               <a:rPr lang="en-US" smtClean="0"/>
-              <a:t>10/5/2018</a:t>
+              <a:t>4/8/2020</a:t>
             </a:fld>
             <a:endParaRPr lang="en-US"/>
           </a:p>
@@ -2601,7 +3280,7 @@
           <a:p>
             <a:fld id="{E6E52604-4630-4861-9364-F52CA104A3D5}" type="datetimeFigureOut">
               <a:rPr lang="en-US" smtClean="0"/>
-              <a:t>10/5/2018</a:t>
+              <a:t>4/8/2020</a:t>
             </a:fld>
             <a:endParaRPr lang="en-US"/>
           </a:p>
@@ -3020,7 +3699,7 @@
           <a:p>
             <a:fld id="{E6E52604-4630-4861-9364-F52CA104A3D5}" type="datetimeFigureOut">
               <a:rPr lang="en-US" smtClean="0"/>
-              <a:t>10/5/2018</a:t>
+              <a:t>4/8/2020</a:t>
             </a:fld>
             <a:endParaRPr lang="en-US"/>
           </a:p>
@@ -3137,7 +3816,7 @@
           <a:p>
             <a:fld id="{E6E52604-4630-4861-9364-F52CA104A3D5}" type="datetimeFigureOut">
               <a:rPr lang="en-US" smtClean="0"/>
-              <a:t>10/5/2018</a:t>
+              <a:t>4/8/2020</a:t>
             </a:fld>
             <a:endParaRPr lang="en-US"/>
           </a:p>
@@ -3232,7 +3911,7 @@
           <a:p>
             <a:fld id="{E6E52604-4630-4861-9364-F52CA104A3D5}" type="datetimeFigureOut">
               <a:rPr lang="en-US" smtClean="0"/>
-              <a:t>10/5/2018</a:t>
+              <a:t>4/8/2020</a:t>
             </a:fld>
             <a:endParaRPr lang="en-US"/>
           </a:p>
@@ -3507,7 +4186,7 @@
           <a:p>
             <a:fld id="{E6E52604-4630-4861-9364-F52CA104A3D5}" type="datetimeFigureOut">
               <a:rPr lang="en-US" smtClean="0"/>
-              <a:t>10/5/2018</a:t>
+              <a:t>4/8/2020</a:t>
             </a:fld>
             <a:endParaRPr lang="en-US"/>
           </a:p>
@@ -3759,7 +4438,7 @@
           <a:p>
             <a:fld id="{E6E52604-4630-4861-9364-F52CA104A3D5}" type="datetimeFigureOut">
               <a:rPr lang="en-US" smtClean="0"/>
-              <a:t>10/5/2018</a:t>
+              <a:t>4/8/2020</a:t>
             </a:fld>
             <a:endParaRPr lang="en-US"/>
           </a:p>
@@ -3970,7 +4649,7 @@
           <a:p>
             <a:fld id="{E6E52604-4630-4861-9364-F52CA104A3D5}" type="datetimeFigureOut">
               <a:rPr lang="en-US" smtClean="0"/>
-              <a:t>10/5/2018</a:t>
+              <a:t>4/8/2020</a:t>
             </a:fld>
             <a:endParaRPr lang="en-US"/>
           </a:p>
@@ -4544,6 +5223,86 @@
           </a:p>
         </p:txBody>
       </p:sp>
+    </p:spTree>
+    <p:extLst>
+      <p:ext uri="{BB962C8B-B14F-4D97-AF65-F5344CB8AC3E}">
+        <p14:creationId xmlns:p14="http://schemas.microsoft.com/office/powerpoint/2010/main" val="3193839378"/>
+      </p:ext>
+    </p:extLst>
+  </p:cSld>
+  <p:clrMapOvr>
+    <a:masterClrMapping/>
+  </p:clrMapOvr>
+</p:sld>
+</file>
+
+<file path=ppt/slides/slide11.xml><?xml version="1.0" encoding="utf-8"?>
+<p:sld xmlns:a="http://schemas.openxmlformats.org/drawingml/2006/main" xmlns:r="http://schemas.openxmlformats.org/officeDocument/2006/relationships" xmlns:p="http://schemas.openxmlformats.org/presentationml/2006/main">
+  <p:cSld>
+    <p:spTree>
+      <p:nvGrpSpPr>
+        <p:cNvPr id="1" name=""/>
+        <p:cNvGrpSpPr/>
+        <p:nvPr/>
+      </p:nvGrpSpPr>
+      <p:grpSpPr>
+        <a:xfrm>
+          <a:off x="0" y="0"/>
+          <a:ext cx="0" cy="0"/>
+          <a:chOff x="0" y="0"/>
+          <a:chExt cx="0" cy="0"/>
+        </a:xfrm>
+      </p:grpSpPr>
+      <p:sp>
+        <p:nvSpPr>
+          <p:cNvPr id="2" name="Title 1"/>
+          <p:cNvSpPr>
+            <a:spLocks noGrp="1"/>
+          </p:cNvSpPr>
+          <p:nvPr>
+            <p:ph type="title"/>
+          </p:nvPr>
+        </p:nvSpPr>
+        <p:spPr/>
+        <p:txBody>
+          <a:bodyPr/>
+          <a:lstStyle/>
+          <a:p>
+            <a:r>
+              <a:rPr lang="en-US" dirty="0"/>
+              <a:t>UML as it currently stands</a:t>
+            </a:r>
+          </a:p>
+        </p:txBody>
+      </p:sp>
+      <p:sp>
+        <p:nvSpPr>
+          <p:cNvPr id="3" name="Content Placeholder 2"/>
+          <p:cNvSpPr>
+            <a:spLocks noGrp="1"/>
+          </p:cNvSpPr>
+          <p:nvPr>
+            <p:ph idx="1"/>
+          </p:nvPr>
+        </p:nvSpPr>
+        <p:spPr/>
+        <p:txBody>
+          <a:bodyPr/>
+          <a:lstStyle/>
+          <a:p>
+            <a:r>
+              <a:rPr lang="en-US" dirty="0"/>
+              <a:t>What do you need to add?</a:t>
+            </a:r>
+          </a:p>
+          <a:p>
+            <a:r>
+              <a:rPr lang="en-US" dirty="0"/>
+              <a:t>What do the Bet classes have in common?</a:t>
+            </a:r>
+          </a:p>
+        </p:txBody>
+      </p:sp>
       <p:pic>
         <p:nvPicPr>
           <p:cNvPr id="1026" name="Picture 2" descr="https://lh3.googleusercontent.com/avS3EF-xyZGG04tJF5XnFmcrDml7Lb7x93siJ11I91_VxpmeCrCGHBCtOZQHemjxpdp3PdAuMK3p9ly5XgMI3BcJzC2IEUJrxDemIbX9LgCQnNbajkySS-8K8usrJN9MRmYvqLwB">
@@ -4605,7 +5364,7 @@
 </p:sld>
 </file>
 
-<file path=ppt/slides/slide11.xml><?xml version="1.0" encoding="utf-8"?>
+<file path=ppt/slides/slide12.xml><?xml version="1.0" encoding="utf-8"?>
 <p:sld xmlns:a="http://schemas.openxmlformats.org/drawingml/2006/main" xmlns:r="http://schemas.openxmlformats.org/officeDocument/2006/relationships" xmlns:p="http://schemas.openxmlformats.org/presentationml/2006/main">
   <p:cSld>
     <p:spTree>
@@ -4699,6 +5458,202 @@
     <p:extLst>
       <p:ext uri="{BB962C8B-B14F-4D97-AF65-F5344CB8AC3E}">
         <p14:creationId xmlns:p14="http://schemas.microsoft.com/office/powerpoint/2010/main" val="1216131495"/>
+      </p:ext>
+    </p:extLst>
+  </p:cSld>
+  <p:clrMapOvr>
+    <a:masterClrMapping/>
+  </p:clrMapOvr>
+</p:sld>
+</file>
+
+<file path=ppt/slides/slide13.xml><?xml version="1.0" encoding="utf-8"?>
+<p:sld xmlns:a="http://schemas.openxmlformats.org/drawingml/2006/main" xmlns:r="http://schemas.openxmlformats.org/officeDocument/2006/relationships" xmlns:p="http://schemas.openxmlformats.org/presentationml/2006/main">
+  <p:cSld>
+    <p:spTree>
+      <p:nvGrpSpPr>
+        <p:cNvPr id="1" name=""/>
+        <p:cNvGrpSpPr/>
+        <p:nvPr/>
+      </p:nvGrpSpPr>
+      <p:grpSpPr>
+        <a:xfrm>
+          <a:off x="0" y="0"/>
+          <a:ext cx="0" cy="0"/>
+          <a:chOff x="0" y="0"/>
+          <a:chExt cx="0" cy="0"/>
+        </a:xfrm>
+      </p:grpSpPr>
+      <p:pic>
+        <p:nvPicPr>
+          <p:cNvPr id="1028" name="Picture 4" descr="PlantUML diagram"/>
+          <p:cNvPicPr>
+            <a:picLocks noChangeAspect="1" noChangeArrowheads="1"/>
+          </p:cNvPicPr>
+          <p:nvPr/>
+        </p:nvPicPr>
+        <p:blipFill>
+          <a:blip r:embed="rId3">
+            <a:extLst>
+              <a:ext uri="{28A0092B-C50C-407E-A947-70E740481C1C}">
+                <a14:useLocalDpi xmlns:a14="http://schemas.microsoft.com/office/drawing/2010/main" val="0"/>
+              </a:ext>
+            </a:extLst>
+          </a:blip>
+          <a:srcRect/>
+          <a:stretch>
+            <a:fillRect/>
+          </a:stretch>
+        </p:blipFill>
+        <p:spPr bwMode="auto">
+          <a:xfrm>
+            <a:off x="228600" y="1858603"/>
+            <a:ext cx="4495800" cy="4396139"/>
+          </a:xfrm>
+          <a:prstGeom prst="rect">
+            <a:avLst/>
+          </a:prstGeom>
+          <a:noFill/>
+          <a:extLst>
+            <a:ext uri="{909E8E84-426E-40DD-AFC4-6F175D3DCCD1}">
+              <a14:hiddenFill xmlns:a14="http://schemas.microsoft.com/office/drawing/2010/main">
+                <a:solidFill>
+                  <a:srgbClr val="FFFFFF"/>
+                </a:solidFill>
+              </a14:hiddenFill>
+            </a:ext>
+          </a:extLst>
+        </p:spPr>
+      </p:pic>
+      <p:pic>
+        <p:nvPicPr>
+          <p:cNvPr id="1030" name="Picture 6" descr="PlantUML diagram"/>
+          <p:cNvPicPr>
+            <a:picLocks noChangeAspect="1" noChangeArrowheads="1"/>
+          </p:cNvPicPr>
+          <p:nvPr/>
+        </p:nvPicPr>
+        <p:blipFill>
+          <a:blip r:embed="rId4">
+            <a:extLst>
+              <a:ext uri="{28A0092B-C50C-407E-A947-70E740481C1C}">
+                <a14:useLocalDpi xmlns:a14="http://schemas.microsoft.com/office/drawing/2010/main" val="0"/>
+              </a:ext>
+            </a:extLst>
+          </a:blip>
+          <a:srcRect/>
+          <a:stretch>
+            <a:fillRect/>
+          </a:stretch>
+        </p:blipFill>
+        <p:spPr bwMode="auto">
+          <a:xfrm>
+            <a:off x="4835236" y="1676400"/>
+            <a:ext cx="4191000" cy="4557560"/>
+          </a:xfrm>
+          <a:prstGeom prst="rect">
+            <a:avLst/>
+          </a:prstGeom>
+          <a:noFill/>
+          <a:extLst>
+            <a:ext uri="{909E8E84-426E-40DD-AFC4-6F175D3DCCD1}">
+              <a14:hiddenFill xmlns:a14="http://schemas.microsoft.com/office/drawing/2010/main">
+                <a:solidFill>
+                  <a:srgbClr val="FFFFFF"/>
+                </a:solidFill>
+              </a14:hiddenFill>
+            </a:ext>
+          </a:extLst>
+        </p:spPr>
+      </p:pic>
+      <p:sp>
+        <p:nvSpPr>
+          <p:cNvPr id="5" name="TextBox 4"/>
+          <p:cNvSpPr txBox="1"/>
+          <p:nvPr/>
+        </p:nvSpPr>
+        <p:spPr>
+          <a:xfrm>
+            <a:off x="5257800" y="459672"/>
+            <a:ext cx="2895600" cy="923330"/>
+          </a:xfrm>
+          <a:prstGeom prst="rect">
+            <a:avLst/>
+          </a:prstGeom>
+          <a:noFill/>
+          <a:ln>
+            <a:solidFill>
+              <a:schemeClr val="tx1"/>
+            </a:solidFill>
+          </a:ln>
+        </p:spPr>
+        <p:txBody>
+          <a:bodyPr wrap="square" rtlCol="0">
+            <a:spAutoFit/>
+          </a:bodyPr>
+          <a:lstStyle/>
+          <a:p>
+            <a:r>
+              <a:rPr lang="en-US" dirty="0" smtClean="0"/>
+              <a:t>Using:</a:t>
+            </a:r>
+          </a:p>
+          <a:p>
+            <a:r>
+              <a:rPr lang="en-US" dirty="0" err="1" smtClean="0"/>
+              <a:t>skinparam</a:t>
+            </a:r>
+            <a:r>
+              <a:rPr lang="en-US" dirty="0" smtClean="0"/>
+              <a:t> </a:t>
+            </a:r>
+            <a:r>
+              <a:rPr lang="en-US" dirty="0"/>
+              <a:t>style </a:t>
+            </a:r>
+            <a:r>
+              <a:rPr lang="en-US" dirty="0" err="1"/>
+              <a:t>strictuml</a:t>
+            </a:r>
+            <a:endParaRPr lang="en-US" dirty="0"/>
+          </a:p>
+          <a:p>
+            <a:endParaRPr lang="en-US" dirty="0"/>
+          </a:p>
+        </p:txBody>
+      </p:sp>
+      <p:sp>
+        <p:nvSpPr>
+          <p:cNvPr id="10" name="Title 1"/>
+          <p:cNvSpPr>
+            <a:spLocks noGrp="1"/>
+          </p:cNvSpPr>
+          <p:nvPr>
+            <p:ph type="title"/>
+          </p:nvPr>
+        </p:nvSpPr>
+        <p:spPr>
+          <a:xfrm>
+            <a:off x="457200" y="274638"/>
+            <a:ext cx="4495800" cy="1143000"/>
+          </a:xfrm>
+        </p:spPr>
+        <p:txBody>
+          <a:bodyPr/>
+          <a:lstStyle/>
+          <a:p>
+            <a:r>
+              <a:rPr lang="en-US" dirty="0" smtClean="0"/>
+              <a:t>UML Solution</a:t>
+            </a:r>
+            <a:endParaRPr lang="en-US" dirty="0"/>
+          </a:p>
+        </p:txBody>
+      </p:sp>
+    </p:spTree>
+    <p:extLst>
+      <p:ext uri="{BB962C8B-B14F-4D97-AF65-F5344CB8AC3E}">
+        <p14:creationId xmlns:p14="http://schemas.microsoft.com/office/powerpoint/2010/main" val="380812206"/>
       </p:ext>
     </p:extLst>
   </p:cSld>
@@ -5232,7 +6187,31 @@
       </p:grpSpPr>
       <p:sp>
         <p:nvSpPr>
-          <p:cNvPr id="2" name="Content Placeholder 1"/>
+          <p:cNvPr id="2" name="Title 1"/>
+          <p:cNvSpPr>
+            <a:spLocks noGrp="1"/>
+          </p:cNvSpPr>
+          <p:nvPr>
+            <p:ph type="title"/>
+          </p:nvPr>
+        </p:nvSpPr>
+        <p:spPr/>
+        <p:txBody>
+          <a:bodyPr>
+            <a:normAutofit fontScale="90000"/>
+          </a:bodyPr>
+          <a:lstStyle/>
+          <a:p>
+            <a:r>
+              <a:rPr lang="en-US" dirty="0"/>
+              <a:t>What if the recursive call isn’t in the return?</a:t>
+            </a:r>
+          </a:p>
+        </p:txBody>
+      </p:sp>
+      <p:sp>
+        <p:nvSpPr>
+          <p:cNvPr id="3" name="Content Placeholder 2"/>
           <p:cNvSpPr>
             <a:spLocks noGrp="1"/>
           </p:cNvSpPr>
@@ -5242,120 +6221,20 @@
         </p:nvSpPr>
         <p:spPr/>
         <p:txBody>
-          <a:bodyPr>
-            <a:normAutofit lnSpcReduction="10000"/>
-          </a:bodyPr>
-          <a:lstStyle/>
-          <a:p>
-            <a:r>
-              <a:rPr lang="en-US" dirty="0"/>
-              <a:t>Save every solution we find to sub-problems</a:t>
-            </a:r>
-          </a:p>
-          <a:p>
-            <a:endParaRPr lang="en-US" dirty="0"/>
-          </a:p>
-          <a:p>
-            <a:r>
-              <a:rPr lang="en-US" dirty="0"/>
-              <a:t>Before recursively computing a solution:</a:t>
-            </a:r>
-          </a:p>
-          <a:p>
-            <a:pPr lvl="1"/>
-            <a:r>
-              <a:rPr lang="en-US" dirty="0"/>
-              <a:t>Look it up</a:t>
-            </a:r>
-          </a:p>
-          <a:p>
-            <a:pPr lvl="1"/>
-            <a:r>
-              <a:rPr lang="en-US" dirty="0"/>
-              <a:t>If found, use it</a:t>
-            </a:r>
-          </a:p>
-          <a:p>
-            <a:pPr lvl="1"/>
-            <a:r>
-              <a:rPr lang="en-US" dirty="0"/>
-              <a:t>Otherwise do the recursive computation</a:t>
-            </a:r>
-          </a:p>
-          <a:p>
-            <a:pPr lvl="1"/>
-            <a:endParaRPr lang="en-US" dirty="0"/>
-          </a:p>
-          <a:p>
-            <a:r>
-              <a:rPr lang="en-US" dirty="0"/>
-              <a:t>Study the </a:t>
-            </a:r>
-            <a:r>
-              <a:rPr lang="en-US" dirty="0" err="1"/>
-              <a:t>memoization</a:t>
-            </a:r>
-            <a:r>
-              <a:rPr lang="en-US" dirty="0"/>
-              <a:t> code in the </a:t>
-            </a:r>
-            <a:r>
-              <a:rPr lang="en-US" dirty="0" err="1">
-                <a:solidFill>
-                  <a:srgbClr val="F79646"/>
-                </a:solidFill>
-              </a:rPr>
-              <a:t>RecursiveHelperFunctions</a:t>
-            </a:r>
-            <a:r>
-              <a:rPr lang="en-US" dirty="0">
-                <a:solidFill>
-                  <a:srgbClr val="F79646"/>
-                </a:solidFill>
-              </a:rPr>
-              <a:t> </a:t>
-            </a:r>
-            <a:r>
-              <a:rPr lang="en-US" dirty="0"/>
-              <a:t>project</a:t>
-            </a:r>
-          </a:p>
-          <a:p>
-            <a:pPr lvl="1"/>
-            <a:endParaRPr lang="en-US" dirty="0"/>
-          </a:p>
-          <a:p>
-            <a:endParaRPr lang="en-US" dirty="0"/>
-          </a:p>
-        </p:txBody>
-      </p:sp>
-      <p:sp>
-        <p:nvSpPr>
-          <p:cNvPr id="3" name="Title 2"/>
-          <p:cNvSpPr>
-            <a:spLocks noGrp="1"/>
-          </p:cNvSpPr>
-          <p:nvPr>
-            <p:ph type="title"/>
-          </p:nvPr>
-        </p:nvSpPr>
-        <p:spPr/>
-        <p:txBody>
           <a:bodyPr/>
           <a:lstStyle/>
           <a:p>
             <a:r>
-              <a:rPr lang="en-US" dirty="0" err="1"/>
-              <a:t>Memoization</a:t>
-            </a:r>
-            <a:endParaRPr lang="en-US" dirty="0"/>
+              <a:rPr lang="en-US" dirty="0"/>
+              <a:t>Let’s start the quiz problem together, then you can finish it on your own.</a:t>
+            </a:r>
           </a:p>
         </p:txBody>
       </p:sp>
     </p:spTree>
     <p:extLst>
       <p:ext uri="{BB962C8B-B14F-4D97-AF65-F5344CB8AC3E}">
-        <p14:creationId xmlns:p14="http://schemas.microsoft.com/office/powerpoint/2010/main" val="3349563426"/>
+        <p14:creationId xmlns:p14="http://schemas.microsoft.com/office/powerpoint/2010/main" val="1428894162"/>
       </p:ext>
     </p:extLst>
   </p:cSld>
@@ -5384,7 +6263,7 @@
       </p:grpSpPr>
       <p:sp>
         <p:nvSpPr>
-          <p:cNvPr id="2" name="Title 1"/>
+          <p:cNvPr id="3" name="Title 2"/>
           <p:cNvSpPr>
             <a:spLocks noGrp="1"/>
           </p:cNvSpPr>
@@ -5395,35 +6274,943 @@
         <p:spPr/>
         <p:txBody>
           <a:bodyPr>
-            <a:normAutofit fontScale="90000"/>
+            <a:normAutofit/>
           </a:bodyPr>
           <a:lstStyle/>
           <a:p>
-            <a:r>
-              <a:rPr lang="en-US" dirty="0"/>
-              <a:t>What if the recursive call isn’t in the return?</a:t>
-            </a:r>
-          </a:p>
-        </p:txBody>
-      </p:sp>
-      <p:sp>
-        <p:nvSpPr>
-          <p:cNvPr id="3" name="Content Placeholder 2"/>
-          <p:cNvSpPr>
-            <a:spLocks noGrp="1"/>
-          </p:cNvSpPr>
-          <p:nvPr>
-            <p:ph idx="1"/>
-          </p:nvPr>
-        </p:nvSpPr>
-        <p:spPr/>
-        <p:txBody>
-          <a:bodyPr/>
-          <a:lstStyle/>
-          <a:p>
-            <a:r>
-              <a:rPr lang="en-US" dirty="0"/>
-              <a:t>Let’s start the quiz problem together, then you can finish it on your own.</a:t>
+            <a:pPr>
+              <a:defRPr/>
+            </a:pPr>
+            <a:r>
+              <a:rPr lang="en-US" dirty="0"/>
+              <a:t>Frames for Tracing Recursive Code</a:t>
+            </a:r>
+          </a:p>
+        </p:txBody>
+      </p:sp>
+      <p:sp>
+        <p:nvSpPr>
+          <p:cNvPr id="4" name="TextBox 3"/>
+          <p:cNvSpPr txBox="1">
+            <a:spLocks noChangeArrowheads="1"/>
+          </p:cNvSpPr>
+          <p:nvPr/>
+        </p:nvSpPr>
+        <p:spPr bwMode="auto">
+          <a:xfrm>
+            <a:off x="152400" y="5791200"/>
+            <a:ext cx="2057400" cy="925513"/>
+          </a:xfrm>
+          <a:prstGeom prst="rect">
+            <a:avLst/>
+          </a:prstGeom>
+          <a:gradFill rotWithShape="1">
+            <a:gsLst>
+              <a:gs pos="0">
+                <a:srgbClr val="002252"/>
+              </a:gs>
+              <a:gs pos="50000">
+                <a:srgbClr val="0C3F86"/>
+              </a:gs>
+              <a:gs pos="70000">
+                <a:srgbClr val="1D4F98"/>
+              </a:gs>
+              <a:gs pos="100000">
+                <a:srgbClr val="3C6BBA"/>
+              </a:gs>
+            </a:gsLst>
+            <a:lin ang="16200000"/>
+          </a:gradFill>
+          <a:ln w="9525" algn="ctr">
+            <a:solidFill>
+              <a:srgbClr val="39639D"/>
+            </a:solidFill>
+            <a:miter lim="800000"/>
+            <a:headEnd/>
+            <a:tailEnd/>
+          </a:ln>
+          <a:effectLst>
+            <a:outerShdw dist="38100" dir="5400000" rotWithShape="0">
+              <a:srgbClr val="808080">
+                <a:alpha val="34999"/>
+              </a:srgbClr>
+            </a:outerShdw>
+          </a:effectLst>
+        </p:spPr>
+        <p:txBody>
+          <a:bodyPr>
+            <a:spAutoFit/>
+          </a:bodyPr>
+          <a:lstStyle/>
+          <a:p>
+            <a:pPr>
+              <a:defRPr/>
+            </a:pPr>
+            <a:r>
+              <a:rPr lang="en-US" dirty="0">
+                <a:solidFill>
+                  <a:schemeClr val="lt1"/>
+                </a:solidFill>
+                <a:latin typeface="+mn-lt"/>
+                <a:cs typeface="+mn-cs"/>
+              </a:rPr>
+              <a:t>Thanks to David </a:t>
+            </a:r>
+            <a:r>
+              <a:rPr lang="en-US" dirty="0" err="1">
+                <a:solidFill>
+                  <a:schemeClr val="lt1"/>
+                </a:solidFill>
+                <a:latin typeface="+mn-lt"/>
+                <a:cs typeface="+mn-cs"/>
+              </a:rPr>
+              <a:t>Gries</a:t>
+            </a:r>
+            <a:r>
+              <a:rPr lang="en-US" dirty="0">
+                <a:solidFill>
+                  <a:schemeClr val="lt1"/>
+                </a:solidFill>
+                <a:latin typeface="+mn-lt"/>
+                <a:cs typeface="+mn-cs"/>
+              </a:rPr>
+              <a:t> for this technique</a:t>
+            </a:r>
+          </a:p>
+        </p:txBody>
+      </p:sp>
+      <p:sp>
+        <p:nvSpPr>
+          <p:cNvPr id="5" name="Rectangle 4"/>
+          <p:cNvSpPr/>
+          <p:nvPr/>
+        </p:nvSpPr>
+        <p:spPr bwMode="auto">
+          <a:xfrm>
+            <a:off x="1905000" y="2667000"/>
+            <a:ext cx="5486400" cy="1676400"/>
+          </a:xfrm>
+          <a:prstGeom prst="rect">
+            <a:avLst/>
+          </a:prstGeom>
+        </p:spPr>
+        <p:style>
+          <a:lnRef idx="2">
+            <a:schemeClr val="accent1">
+              <a:shade val="50000"/>
+            </a:schemeClr>
+          </a:lnRef>
+          <a:fillRef idx="1">
+            <a:schemeClr val="accent1"/>
+          </a:fillRef>
+          <a:effectRef idx="0">
+            <a:schemeClr val="accent1"/>
+          </a:effectRef>
+          <a:fontRef idx="minor">
+            <a:schemeClr val="lt1"/>
+          </a:fontRef>
+        </p:style>
+        <p:txBody>
+          <a:bodyPr anchor="ctr"/>
+          <a:lstStyle/>
+          <a:p>
+            <a:pPr>
+              <a:defRPr/>
+            </a:pPr>
+            <a:r>
+              <a:rPr lang="en-US" dirty="0"/>
+              <a:t>parameters and local variables</a:t>
+            </a:r>
+          </a:p>
+          <a:p>
+            <a:pPr>
+              <a:defRPr/>
+            </a:pPr>
+            <a:endParaRPr lang="en-US" dirty="0"/>
+          </a:p>
+          <a:p>
+            <a:pPr>
+              <a:defRPr/>
+            </a:pPr>
+            <a:endParaRPr lang="en-US" dirty="0"/>
+          </a:p>
+        </p:txBody>
+      </p:sp>
+      <p:sp>
+        <p:nvSpPr>
+          <p:cNvPr id="6" name="TextBox 5"/>
+          <p:cNvSpPr txBox="1"/>
+          <p:nvPr/>
+        </p:nvSpPr>
+        <p:spPr bwMode="auto">
+          <a:xfrm>
+            <a:off x="1905000" y="2667000"/>
+            <a:ext cx="2330824" cy="369332"/>
+          </a:xfrm>
+          <a:prstGeom prst="rect">
+            <a:avLst/>
+          </a:prstGeom>
+        </p:spPr>
+        <p:style>
+          <a:lnRef idx="2">
+            <a:schemeClr val="accent3">
+              <a:shade val="50000"/>
+            </a:schemeClr>
+          </a:lnRef>
+          <a:fillRef idx="1">
+            <a:schemeClr val="accent3"/>
+          </a:fillRef>
+          <a:effectRef idx="0">
+            <a:schemeClr val="accent3"/>
+          </a:effectRef>
+          <a:fontRef idx="minor">
+            <a:schemeClr val="lt1"/>
+          </a:fontRef>
+        </p:style>
+        <p:txBody>
+          <a:bodyPr wrap="square">
+            <a:spAutoFit/>
+          </a:bodyPr>
+          <a:lstStyle/>
+          <a:p>
+            <a:pPr>
+              <a:defRPr/>
+            </a:pPr>
+            <a:r>
+              <a:rPr lang="en-US" dirty="0"/>
+              <a:t>method name (</a:t>
+            </a:r>
+            <a:r>
+              <a:rPr lang="en-US" dirty="0" err="1"/>
+              <a:t>args</a:t>
+            </a:r>
+            <a:r>
+              <a:rPr lang="en-US" dirty="0"/>
+              <a:t>)</a:t>
+            </a:r>
+          </a:p>
+        </p:txBody>
+      </p:sp>
+      <p:sp>
+        <p:nvSpPr>
+          <p:cNvPr id="9" name="Line Callout 2 8"/>
+          <p:cNvSpPr>
+            <a:spLocks/>
+          </p:cNvSpPr>
+          <p:nvPr/>
+        </p:nvSpPr>
+        <p:spPr bwMode="auto">
+          <a:xfrm flipH="1">
+            <a:off x="273424" y="1417638"/>
+            <a:ext cx="3962400" cy="487362"/>
+          </a:xfrm>
+          <a:prstGeom prst="borderCallout2">
+            <a:avLst>
+              <a:gd name="adj1" fmla="val 101525"/>
+              <a:gd name="adj2" fmla="val 20174"/>
+              <a:gd name="adj3" fmla="val 187058"/>
+              <a:gd name="adj4" fmla="val 8446"/>
+              <a:gd name="adj5" fmla="val 249356"/>
+              <a:gd name="adj6" fmla="val -188"/>
+            </a:avLst>
+          </a:prstGeom>
+          <a:gradFill rotWithShape="1">
+            <a:gsLst>
+              <a:gs pos="0">
+                <a:srgbClr val="A6A6A6"/>
+              </a:gs>
+              <a:gs pos="64999">
+                <a:srgbClr val="D7D7D7"/>
+              </a:gs>
+              <a:gs pos="100000">
+                <a:srgbClr val="E3E3E3"/>
+              </a:gs>
+            </a:gsLst>
+            <a:lin ang="16200000"/>
+          </a:gradFill>
+          <a:ln w="9525" algn="ctr">
+            <a:solidFill>
+              <a:schemeClr val="tx1"/>
+            </a:solidFill>
+            <a:miter lim="800000"/>
+            <a:headEnd/>
+            <a:tailEnd/>
+          </a:ln>
+          <a:effectLst>
+            <a:outerShdw dist="38100" dir="5400000" rotWithShape="0">
+              <a:srgbClr val="808080">
+                <a:alpha val="34999"/>
+              </a:srgbClr>
+            </a:outerShdw>
+          </a:effectLst>
+        </p:spPr>
+        <p:txBody>
+          <a:bodyPr anchor="ctr"/>
+          <a:lstStyle/>
+          <a:p>
+            <a:pPr>
+              <a:defRPr/>
+            </a:pPr>
+            <a:r>
+              <a:rPr lang="en-US" dirty="0">
+                <a:solidFill>
+                  <a:schemeClr val="dk1"/>
+                </a:solidFill>
+                <a:latin typeface="+mn-lt"/>
+                <a:cs typeface="+mn-cs"/>
+              </a:rPr>
+              <a:t>1. Draw box when method starts</a:t>
+            </a:r>
+          </a:p>
+        </p:txBody>
+      </p:sp>
+      <p:sp>
+        <p:nvSpPr>
+          <p:cNvPr id="10" name="Line Callout 2 9"/>
+          <p:cNvSpPr>
+            <a:spLocks/>
+          </p:cNvSpPr>
+          <p:nvPr/>
+        </p:nvSpPr>
+        <p:spPr bwMode="auto">
+          <a:xfrm flipH="1">
+            <a:off x="304800" y="2057400"/>
+            <a:ext cx="1617702" cy="487363"/>
+          </a:xfrm>
+          <a:prstGeom prst="borderCallout2">
+            <a:avLst>
+              <a:gd name="adj1" fmla="val 18750"/>
+              <a:gd name="adj2" fmla="val -8333"/>
+              <a:gd name="adj3" fmla="val 18750"/>
+              <a:gd name="adj4" fmla="val -16667"/>
+              <a:gd name="adj5" fmla="val 140644"/>
+              <a:gd name="adj6" fmla="val -12472"/>
+            </a:avLst>
+          </a:prstGeom>
+          <a:gradFill rotWithShape="1">
+            <a:gsLst>
+              <a:gs pos="0">
+                <a:srgbClr val="A6A6A6"/>
+              </a:gs>
+              <a:gs pos="64999">
+                <a:srgbClr val="D7D7D7"/>
+              </a:gs>
+              <a:gs pos="100000">
+                <a:srgbClr val="E3E3E3"/>
+              </a:gs>
+            </a:gsLst>
+            <a:lin ang="16200000"/>
+          </a:gradFill>
+          <a:ln w="9525" algn="ctr">
+            <a:solidFill>
+              <a:schemeClr val="tx1"/>
+            </a:solidFill>
+            <a:miter lim="800000"/>
+            <a:headEnd/>
+            <a:tailEnd/>
+          </a:ln>
+          <a:effectLst>
+            <a:outerShdw dist="38100" dir="5400000" rotWithShape="0">
+              <a:srgbClr val="808080">
+                <a:alpha val="34999"/>
+              </a:srgbClr>
+            </a:outerShdw>
+          </a:effectLst>
+        </p:spPr>
+        <p:txBody>
+          <a:bodyPr anchor="ctr"/>
+          <a:lstStyle/>
+          <a:p>
+            <a:pPr>
+              <a:defRPr/>
+            </a:pPr>
+            <a:r>
+              <a:rPr lang="en-US" dirty="0">
+                <a:solidFill>
+                  <a:schemeClr val="dk1"/>
+                </a:solidFill>
+                <a:latin typeface="+mn-lt"/>
+                <a:cs typeface="+mn-cs"/>
+              </a:rPr>
+              <a:t>2. Fill in name</a:t>
+            </a:r>
+          </a:p>
+        </p:txBody>
+      </p:sp>
+      <p:sp>
+        <p:nvSpPr>
+          <p:cNvPr id="12" name="Line Callout 2 11"/>
+          <p:cNvSpPr>
+            <a:spLocks/>
+          </p:cNvSpPr>
+          <p:nvPr/>
+        </p:nvSpPr>
+        <p:spPr bwMode="auto">
+          <a:xfrm>
+            <a:off x="972806" y="4745968"/>
+            <a:ext cx="2971800" cy="762000"/>
+          </a:xfrm>
+          <a:prstGeom prst="borderCallout2">
+            <a:avLst>
+              <a:gd name="adj1" fmla="val 18750"/>
+              <a:gd name="adj2" fmla="val -8333"/>
+              <a:gd name="adj3" fmla="val 18750"/>
+              <a:gd name="adj4" fmla="val -16667"/>
+              <a:gd name="adj5" fmla="val -197991"/>
+              <a:gd name="adj6" fmla="val 29669"/>
+            </a:avLst>
+          </a:prstGeom>
+          <a:gradFill rotWithShape="1">
+            <a:gsLst>
+              <a:gs pos="0">
+                <a:srgbClr val="A6A6A6"/>
+              </a:gs>
+              <a:gs pos="64999">
+                <a:srgbClr val="D7D7D7"/>
+              </a:gs>
+              <a:gs pos="100000">
+                <a:srgbClr val="E3E3E3"/>
+              </a:gs>
+            </a:gsLst>
+            <a:lin ang="16200000"/>
+          </a:gradFill>
+          <a:ln w="9525" algn="ctr">
+            <a:solidFill>
+              <a:schemeClr val="tx1"/>
+            </a:solidFill>
+            <a:miter lim="800000"/>
+            <a:headEnd/>
+            <a:tailEnd/>
+          </a:ln>
+          <a:effectLst>
+            <a:outerShdw dist="38100" dir="5400000" rotWithShape="0">
+              <a:srgbClr val="808080">
+                <a:alpha val="34999"/>
+              </a:srgbClr>
+            </a:outerShdw>
+          </a:effectLst>
+        </p:spPr>
+        <p:txBody>
+          <a:bodyPr anchor="ctr"/>
+          <a:lstStyle/>
+          <a:p>
+            <a:pPr>
+              <a:defRPr/>
+            </a:pPr>
+            <a:r>
+              <a:rPr lang="en-US" dirty="0">
+                <a:solidFill>
+                  <a:schemeClr val="dk1"/>
+                </a:solidFill>
+                <a:latin typeface="+mn-lt"/>
+                <a:cs typeface="+mn-cs"/>
+              </a:rPr>
+              <a:t>3. List every parameter and its argument value.</a:t>
+            </a:r>
+          </a:p>
+        </p:txBody>
+      </p:sp>
+      <p:sp>
+        <p:nvSpPr>
+          <p:cNvPr id="13" name="Line Callout 2 12"/>
+          <p:cNvSpPr>
+            <a:spLocks/>
+          </p:cNvSpPr>
+          <p:nvPr/>
+        </p:nvSpPr>
+        <p:spPr bwMode="auto">
+          <a:xfrm>
+            <a:off x="4267200" y="4500790"/>
+            <a:ext cx="4114800" cy="685800"/>
+          </a:xfrm>
+          <a:prstGeom prst="borderCallout2">
+            <a:avLst>
+              <a:gd name="adj1" fmla="val 24632"/>
+              <a:gd name="adj2" fmla="val -163"/>
+              <a:gd name="adj3" fmla="val -36152"/>
+              <a:gd name="adj4" fmla="val -9804"/>
+              <a:gd name="adj5" fmla="val -168474"/>
+              <a:gd name="adj6" fmla="val -14312"/>
+            </a:avLst>
+          </a:prstGeom>
+          <a:gradFill rotWithShape="1">
+            <a:gsLst>
+              <a:gs pos="0">
+                <a:srgbClr val="A6A6A6"/>
+              </a:gs>
+              <a:gs pos="64999">
+                <a:srgbClr val="D7D7D7"/>
+              </a:gs>
+              <a:gs pos="100000">
+                <a:srgbClr val="E3E3E3"/>
+              </a:gs>
+            </a:gsLst>
+            <a:lin ang="16200000"/>
+          </a:gradFill>
+          <a:ln w="9525" algn="ctr">
+            <a:solidFill>
+              <a:schemeClr val="tx1"/>
+            </a:solidFill>
+            <a:miter lim="800000"/>
+            <a:headEnd/>
+            <a:tailEnd/>
+          </a:ln>
+          <a:effectLst>
+            <a:outerShdw dist="38100" dir="5400000" rotWithShape="0">
+              <a:srgbClr val="808080">
+                <a:alpha val="34999"/>
+              </a:srgbClr>
+            </a:outerShdw>
+          </a:effectLst>
+        </p:spPr>
+        <p:txBody>
+          <a:bodyPr anchor="ctr"/>
+          <a:lstStyle/>
+          <a:p>
+            <a:pPr>
+              <a:defRPr/>
+            </a:pPr>
+            <a:r>
+              <a:rPr lang="en-US" dirty="0">
+                <a:solidFill>
+                  <a:schemeClr val="dk1"/>
+                </a:solidFill>
+                <a:latin typeface="+mn-lt"/>
+                <a:cs typeface="+mn-cs"/>
+              </a:rPr>
+              <a:t>4. List every local variable declared in the method, </a:t>
+            </a:r>
+            <a:r>
+              <a:rPr lang="en-US" b="1" dirty="0">
+                <a:solidFill>
+                  <a:schemeClr val="dk1"/>
+                </a:solidFill>
+                <a:latin typeface="+mn-lt"/>
+                <a:cs typeface="+mn-cs"/>
+              </a:rPr>
+              <a:t>but no values yet</a:t>
+            </a:r>
+            <a:endParaRPr lang="en-US" dirty="0">
+              <a:solidFill>
+                <a:schemeClr val="dk1"/>
+              </a:solidFill>
+              <a:latin typeface="+mn-lt"/>
+              <a:cs typeface="+mn-cs"/>
+            </a:endParaRPr>
+          </a:p>
+        </p:txBody>
+      </p:sp>
+      <p:sp>
+        <p:nvSpPr>
+          <p:cNvPr id="14" name="TextBox 13"/>
+          <p:cNvSpPr txBox="1">
+            <a:spLocks noChangeArrowheads="1"/>
+          </p:cNvSpPr>
+          <p:nvPr/>
+        </p:nvSpPr>
+        <p:spPr bwMode="auto">
+          <a:xfrm>
+            <a:off x="2590800" y="5551012"/>
+            <a:ext cx="6096000" cy="650875"/>
+          </a:xfrm>
+          <a:prstGeom prst="rect">
+            <a:avLst/>
+          </a:prstGeom>
+          <a:gradFill rotWithShape="1">
+            <a:gsLst>
+              <a:gs pos="0">
+                <a:srgbClr val="A6A6A6"/>
+              </a:gs>
+              <a:gs pos="64999">
+                <a:srgbClr val="D7D7D7"/>
+              </a:gs>
+              <a:gs pos="100000">
+                <a:srgbClr val="E3E3E3"/>
+              </a:gs>
+            </a:gsLst>
+            <a:lin ang="16200000"/>
+          </a:gradFill>
+          <a:ln w="9525" algn="ctr">
+            <a:solidFill>
+              <a:schemeClr val="tx1"/>
+            </a:solidFill>
+            <a:miter lim="800000"/>
+            <a:headEnd/>
+            <a:tailEnd/>
+          </a:ln>
+          <a:effectLst>
+            <a:outerShdw dist="38100" dir="5400000" rotWithShape="0">
+              <a:srgbClr val="808080">
+                <a:alpha val="34999"/>
+              </a:srgbClr>
+            </a:outerShdw>
+          </a:effectLst>
+        </p:spPr>
+        <p:txBody>
+          <a:bodyPr>
+            <a:spAutoFit/>
+          </a:bodyPr>
+          <a:lstStyle/>
+          <a:p>
+            <a:pPr>
+              <a:defRPr/>
+            </a:pPr>
+            <a:r>
+              <a:rPr lang="en-US" dirty="0">
+                <a:solidFill>
+                  <a:schemeClr val="dk1"/>
+                </a:solidFill>
+                <a:latin typeface="+mn-lt"/>
+                <a:cs typeface="+mn-cs"/>
+              </a:rPr>
+              <a:t>8. Step through the method, update variable values, draw new frame for new calls</a:t>
+            </a:r>
+          </a:p>
+        </p:txBody>
+      </p:sp>
+      <p:sp>
+        <p:nvSpPr>
+          <p:cNvPr id="2" name="TextBox 1"/>
+          <p:cNvSpPr txBox="1"/>
+          <p:nvPr/>
+        </p:nvSpPr>
+        <p:spPr>
+          <a:xfrm>
+            <a:off x="1905000" y="3516868"/>
+            <a:ext cx="2258311" cy="369332"/>
+          </a:xfrm>
+          <a:prstGeom prst="rect">
+            <a:avLst/>
+          </a:prstGeom>
+          <a:noFill/>
+        </p:spPr>
+        <p:txBody>
+          <a:bodyPr wrap="none" rtlCol="0">
+            <a:spAutoFit/>
+          </a:bodyPr>
+          <a:lstStyle/>
+          <a:p>
+            <a:r>
+              <a:rPr lang="en-US" dirty="0">
+                <a:solidFill>
+                  <a:schemeClr val="bg1"/>
+                </a:solidFill>
+                <a:latin typeface="+mj-lt"/>
+              </a:rPr>
+              <a:t>base case condition(s)</a:t>
+            </a:r>
+          </a:p>
+        </p:txBody>
+      </p:sp>
+      <p:sp>
+        <p:nvSpPr>
+          <p:cNvPr id="18" name="TextBox 17"/>
+          <p:cNvSpPr txBox="1"/>
+          <p:nvPr/>
+        </p:nvSpPr>
+        <p:spPr>
+          <a:xfrm>
+            <a:off x="1922502" y="3924340"/>
+            <a:ext cx="1849865" cy="369332"/>
+          </a:xfrm>
+          <a:prstGeom prst="rect">
+            <a:avLst/>
+          </a:prstGeom>
+          <a:noFill/>
+        </p:spPr>
+        <p:txBody>
+          <a:bodyPr wrap="none" rtlCol="0">
+            <a:spAutoFit/>
+          </a:bodyPr>
+          <a:lstStyle/>
+          <a:p>
+            <a:r>
+              <a:rPr lang="en-US" dirty="0">
+                <a:solidFill>
+                  <a:schemeClr val="bg1"/>
+                </a:solidFill>
+                <a:latin typeface="+mj-lt"/>
+              </a:rPr>
+              <a:t>return</a:t>
+            </a:r>
+            <a:r>
+              <a:rPr lang="en-US" dirty="0">
+                <a:solidFill>
+                  <a:schemeClr val="bg1"/>
+                </a:solidFill>
+              </a:rPr>
+              <a:t> </a:t>
+            </a:r>
+            <a:r>
+              <a:rPr lang="en-US" dirty="0">
+                <a:solidFill>
+                  <a:schemeClr val="bg1"/>
+                </a:solidFill>
+                <a:latin typeface="+mj-lt"/>
+              </a:rPr>
+              <a:t>statement </a:t>
+            </a:r>
+          </a:p>
+        </p:txBody>
+      </p:sp>
+      <p:sp>
+        <p:nvSpPr>
+          <p:cNvPr id="19" name="Line Callout 2 18"/>
+          <p:cNvSpPr>
+            <a:spLocks/>
+          </p:cNvSpPr>
+          <p:nvPr/>
+        </p:nvSpPr>
+        <p:spPr bwMode="auto">
+          <a:xfrm flipH="1">
+            <a:off x="2684702" y="2033725"/>
+            <a:ext cx="2214282" cy="487362"/>
+          </a:xfrm>
+          <a:prstGeom prst="borderCallout2">
+            <a:avLst>
+              <a:gd name="adj1" fmla="val 96006"/>
+              <a:gd name="adj2" fmla="val 77866"/>
+              <a:gd name="adj3" fmla="val 281004"/>
+              <a:gd name="adj4" fmla="val 16931"/>
+              <a:gd name="adj5" fmla="val 350099"/>
+              <a:gd name="adj6" fmla="val 38568"/>
+            </a:avLst>
+          </a:prstGeom>
+          <a:gradFill rotWithShape="1">
+            <a:gsLst>
+              <a:gs pos="0">
+                <a:srgbClr val="A6A6A6"/>
+              </a:gs>
+              <a:gs pos="64999">
+                <a:srgbClr val="D7D7D7"/>
+              </a:gs>
+              <a:gs pos="100000">
+                <a:srgbClr val="E3E3E3"/>
+              </a:gs>
+            </a:gsLst>
+            <a:lin ang="16200000"/>
+          </a:gradFill>
+          <a:ln w="9525" algn="ctr">
+            <a:solidFill>
+              <a:schemeClr val="tx1"/>
+            </a:solidFill>
+            <a:miter lim="800000"/>
+            <a:headEnd/>
+            <a:tailEnd/>
+          </a:ln>
+          <a:effectLst>
+            <a:outerShdw dist="38100" dir="5400000" rotWithShape="0">
+              <a:srgbClr val="808080">
+                <a:alpha val="34999"/>
+              </a:srgbClr>
+            </a:outerShdw>
+          </a:effectLst>
+        </p:spPr>
+        <p:txBody>
+          <a:bodyPr anchor="ctr"/>
+          <a:lstStyle/>
+          <a:p>
+            <a:pPr>
+              <a:defRPr/>
+            </a:pPr>
+            <a:r>
+              <a:rPr lang="en-US" dirty="0">
+                <a:solidFill>
+                  <a:schemeClr val="dk1"/>
+                </a:solidFill>
+                <a:latin typeface="+mn-lt"/>
+                <a:cs typeface="+mn-cs"/>
+              </a:rPr>
+              <a:t>5. Check Condition(s)</a:t>
+            </a:r>
+          </a:p>
+        </p:txBody>
+      </p:sp>
+      <p:sp>
+        <p:nvSpPr>
+          <p:cNvPr id="8" name="Rectangle 7"/>
+          <p:cNvSpPr/>
+          <p:nvPr/>
+        </p:nvSpPr>
+        <p:spPr>
+          <a:xfrm>
+            <a:off x="4495572" y="3876329"/>
+            <a:ext cx="403412" cy="375403"/>
+          </a:xfrm>
+          <a:prstGeom prst="rect">
+            <a:avLst/>
+          </a:prstGeom>
+          <a:ln>
+            <a:solidFill>
+              <a:schemeClr val="tx1"/>
+            </a:solidFill>
+          </a:ln>
+        </p:spPr>
+        <p:style>
+          <a:lnRef idx="2">
+            <a:schemeClr val="accent6"/>
+          </a:lnRef>
+          <a:fillRef idx="1">
+            <a:schemeClr val="lt1"/>
+          </a:fillRef>
+          <a:effectRef idx="0">
+            <a:schemeClr val="accent6"/>
+          </a:effectRef>
+          <a:fontRef idx="minor">
+            <a:schemeClr val="dk1"/>
+          </a:fontRef>
+        </p:style>
+        <p:txBody>
+          <a:bodyPr rtlCol="0" anchor="ctr"/>
+          <a:lstStyle/>
+          <a:p>
+            <a:pPr algn="ctr"/>
+            <a:endParaRPr lang="en-US"/>
+          </a:p>
+        </p:txBody>
+      </p:sp>
+      <p:sp>
+        <p:nvSpPr>
+          <p:cNvPr id="21" name="Line Callout 2 20"/>
+          <p:cNvSpPr>
+            <a:spLocks/>
+          </p:cNvSpPr>
+          <p:nvPr/>
+        </p:nvSpPr>
+        <p:spPr bwMode="auto">
+          <a:xfrm flipH="1">
+            <a:off x="4657493" y="1467668"/>
+            <a:ext cx="3733800" cy="487362"/>
+          </a:xfrm>
+          <a:prstGeom prst="borderCallout2">
+            <a:avLst>
+              <a:gd name="adj1" fmla="val 107043"/>
+              <a:gd name="adj2" fmla="val 78092"/>
+              <a:gd name="adj3" fmla="val 349848"/>
+              <a:gd name="adj4" fmla="val 74396"/>
+              <a:gd name="adj5" fmla="val 495796"/>
+              <a:gd name="adj6" fmla="val 96188"/>
+            </a:avLst>
+          </a:prstGeom>
+          <a:gradFill rotWithShape="1">
+            <a:gsLst>
+              <a:gs pos="0">
+                <a:srgbClr val="A6A6A6"/>
+              </a:gs>
+              <a:gs pos="64999">
+                <a:srgbClr val="D7D7D7"/>
+              </a:gs>
+              <a:gs pos="100000">
+                <a:srgbClr val="E3E3E3"/>
+              </a:gs>
+            </a:gsLst>
+            <a:lin ang="16200000"/>
+          </a:gradFill>
+          <a:ln w="9525" algn="ctr">
+            <a:solidFill>
+              <a:schemeClr val="tx1"/>
+            </a:solidFill>
+            <a:miter lim="800000"/>
+            <a:headEnd/>
+            <a:tailEnd/>
+          </a:ln>
+          <a:effectLst>
+            <a:outerShdw dist="38100" dir="5400000" rotWithShape="0">
+              <a:srgbClr val="808080">
+                <a:alpha val="34999"/>
+              </a:srgbClr>
+            </a:outerShdw>
+          </a:effectLst>
+        </p:spPr>
+        <p:txBody>
+          <a:bodyPr anchor="ctr"/>
+          <a:lstStyle/>
+          <a:p>
+            <a:pPr>
+              <a:defRPr/>
+            </a:pPr>
+            <a:r>
+              <a:rPr lang="en-US" dirty="0">
+                <a:solidFill>
+                  <a:schemeClr val="dk1"/>
+                </a:solidFill>
+                <a:latin typeface="+mn-lt"/>
+                <a:cs typeface="+mn-cs"/>
+              </a:rPr>
+              <a:t>6. Add box for next recursive call frame. Add blank for unknown value</a:t>
+            </a:r>
+          </a:p>
+        </p:txBody>
+      </p:sp>
+      <p:sp>
+        <p:nvSpPr>
+          <p:cNvPr id="20" name="Line Callout 2 19"/>
+          <p:cNvSpPr>
+            <a:spLocks/>
+          </p:cNvSpPr>
+          <p:nvPr/>
+        </p:nvSpPr>
+        <p:spPr bwMode="auto">
+          <a:xfrm flipH="1">
+            <a:off x="5105400" y="2076768"/>
+            <a:ext cx="3733800" cy="548481"/>
+          </a:xfrm>
+          <a:prstGeom prst="borderCallout2">
+            <a:avLst>
+              <a:gd name="adj1" fmla="val 107043"/>
+              <a:gd name="adj2" fmla="val 78092"/>
+              <a:gd name="adj3" fmla="val 349848"/>
+              <a:gd name="adj4" fmla="val 74396"/>
+              <a:gd name="adj5" fmla="val 392832"/>
+              <a:gd name="adj6" fmla="val 114406"/>
+            </a:avLst>
+          </a:prstGeom>
+          <a:gradFill rotWithShape="1">
+            <a:gsLst>
+              <a:gs pos="0">
+                <a:srgbClr val="A6A6A6"/>
+              </a:gs>
+              <a:gs pos="64999">
+                <a:srgbClr val="D7D7D7"/>
+              </a:gs>
+              <a:gs pos="100000">
+                <a:srgbClr val="E3E3E3"/>
+              </a:gs>
+            </a:gsLst>
+            <a:lin ang="16200000"/>
+          </a:gradFill>
+          <a:ln w="9525" algn="ctr">
+            <a:solidFill>
+              <a:schemeClr val="tx1"/>
+            </a:solidFill>
+            <a:miter lim="800000"/>
+            <a:headEnd/>
+            <a:tailEnd/>
+          </a:ln>
+          <a:effectLst>
+            <a:outerShdw dist="38100" dir="5400000" rotWithShape="0">
+              <a:srgbClr val="808080">
+                <a:alpha val="34999"/>
+              </a:srgbClr>
+            </a:outerShdw>
+          </a:effectLst>
+        </p:spPr>
+        <p:txBody>
+          <a:bodyPr anchor="ctr"/>
+          <a:lstStyle/>
+          <a:p>
+            <a:pPr>
+              <a:defRPr/>
+            </a:pPr>
+            <a:r>
+              <a:rPr lang="en-US" dirty="0">
+                <a:solidFill>
+                  <a:schemeClr val="dk1"/>
+                </a:solidFill>
+                <a:latin typeface="+mn-lt"/>
+                <a:cs typeface="+mn-cs"/>
+              </a:rPr>
+              <a:t>7. Add blank for unknown value, if needed (may be box from #6)</a:t>
             </a:r>
           </a:p>
         </p:txBody>
@@ -5431,13 +7218,413 @@
     </p:spTree>
     <p:extLst>
       <p:ext uri="{BB962C8B-B14F-4D97-AF65-F5344CB8AC3E}">
-        <p14:creationId xmlns:p14="http://schemas.microsoft.com/office/powerpoint/2010/main" val="1428894162"/>
+        <p14:creationId xmlns:p14="http://schemas.microsoft.com/office/powerpoint/2010/main" val="320395639"/>
       </p:ext>
     </p:extLst>
   </p:cSld>
   <p:clrMapOvr>
     <a:masterClrMapping/>
   </p:clrMapOvr>
+  <p:timing>
+    <p:tnLst>
+      <p:par>
+        <p:cTn id="1" dur="indefinite" restart="never" nodeType="tmRoot">
+          <p:childTnLst>
+            <p:seq concurrent="1" nextAc="seek">
+              <p:cTn id="2" dur="indefinite" nodeType="mainSeq">
+                <p:childTnLst>
+                  <p:par>
+                    <p:cTn id="3" fill="hold">
+                      <p:stCondLst>
+                        <p:cond delay="indefinite"/>
+                      </p:stCondLst>
+                      <p:childTnLst>
+                        <p:par>
+                          <p:cTn id="4" fill="hold">
+                            <p:stCondLst>
+                              <p:cond delay="0"/>
+                            </p:stCondLst>
+                            <p:childTnLst>
+                              <p:par>
+                                <p:cTn id="5" presetID="1" presetClass="entr" presetSubtype="0" fill="hold" grpId="0" nodeType="clickEffect">
+                                  <p:stCondLst>
+                                    <p:cond delay="0"/>
+                                  </p:stCondLst>
+                                  <p:childTnLst>
+                                    <p:set>
+                                      <p:cBhvr>
+                                        <p:cTn id="6" dur="1" fill="hold">
+                                          <p:stCondLst>
+                                            <p:cond delay="0"/>
+                                          </p:stCondLst>
+                                        </p:cTn>
+                                        <p:tgtEl>
+                                          <p:spTgt spid="9"/>
+                                        </p:tgtEl>
+                                        <p:attrNameLst>
+                                          <p:attrName>style.visibility</p:attrName>
+                                        </p:attrNameLst>
+                                      </p:cBhvr>
+                                      <p:to>
+                                        <p:strVal val="visible"/>
+                                      </p:to>
+                                    </p:set>
+                                  </p:childTnLst>
+                                </p:cTn>
+                              </p:par>
+                            </p:childTnLst>
+                          </p:cTn>
+                        </p:par>
+                      </p:childTnLst>
+                    </p:cTn>
+                  </p:par>
+                  <p:par>
+                    <p:cTn id="7" fill="hold">
+                      <p:stCondLst>
+                        <p:cond delay="indefinite"/>
+                      </p:stCondLst>
+                      <p:childTnLst>
+                        <p:par>
+                          <p:cTn id="8" fill="hold">
+                            <p:stCondLst>
+                              <p:cond delay="0"/>
+                            </p:stCondLst>
+                            <p:childTnLst>
+                              <p:par>
+                                <p:cTn id="9" presetID="1" presetClass="entr" presetSubtype="0" fill="hold" grpId="0" nodeType="clickEffect">
+                                  <p:stCondLst>
+                                    <p:cond delay="0"/>
+                                  </p:stCondLst>
+                                  <p:childTnLst>
+                                    <p:set>
+                                      <p:cBhvr>
+                                        <p:cTn id="10" dur="1" fill="hold">
+                                          <p:stCondLst>
+                                            <p:cond delay="0"/>
+                                          </p:stCondLst>
+                                        </p:cTn>
+                                        <p:tgtEl>
+                                          <p:spTgt spid="10"/>
+                                        </p:tgtEl>
+                                        <p:attrNameLst>
+                                          <p:attrName>style.visibility</p:attrName>
+                                        </p:attrNameLst>
+                                      </p:cBhvr>
+                                      <p:to>
+                                        <p:strVal val="visible"/>
+                                      </p:to>
+                                    </p:set>
+                                  </p:childTnLst>
+                                </p:cTn>
+                              </p:par>
+                            </p:childTnLst>
+                          </p:cTn>
+                        </p:par>
+                      </p:childTnLst>
+                    </p:cTn>
+                  </p:par>
+                  <p:par>
+                    <p:cTn id="11" fill="hold">
+                      <p:stCondLst>
+                        <p:cond delay="indefinite"/>
+                      </p:stCondLst>
+                      <p:childTnLst>
+                        <p:par>
+                          <p:cTn id="12" fill="hold">
+                            <p:stCondLst>
+                              <p:cond delay="0"/>
+                            </p:stCondLst>
+                            <p:childTnLst>
+                              <p:par>
+                                <p:cTn id="13" presetID="1" presetClass="entr" presetSubtype="0" fill="hold" grpId="0" nodeType="clickEffect">
+                                  <p:stCondLst>
+                                    <p:cond delay="0"/>
+                                  </p:stCondLst>
+                                  <p:childTnLst>
+                                    <p:set>
+                                      <p:cBhvr>
+                                        <p:cTn id="14" dur="1" fill="hold">
+                                          <p:stCondLst>
+                                            <p:cond delay="0"/>
+                                          </p:stCondLst>
+                                        </p:cTn>
+                                        <p:tgtEl>
+                                          <p:spTgt spid="12"/>
+                                        </p:tgtEl>
+                                        <p:attrNameLst>
+                                          <p:attrName>style.visibility</p:attrName>
+                                        </p:attrNameLst>
+                                      </p:cBhvr>
+                                      <p:to>
+                                        <p:strVal val="visible"/>
+                                      </p:to>
+                                    </p:set>
+                                  </p:childTnLst>
+                                </p:cTn>
+                              </p:par>
+                            </p:childTnLst>
+                          </p:cTn>
+                        </p:par>
+                      </p:childTnLst>
+                    </p:cTn>
+                  </p:par>
+                  <p:par>
+                    <p:cTn id="15" fill="hold">
+                      <p:stCondLst>
+                        <p:cond delay="indefinite"/>
+                      </p:stCondLst>
+                      <p:childTnLst>
+                        <p:par>
+                          <p:cTn id="16" fill="hold">
+                            <p:stCondLst>
+                              <p:cond delay="0"/>
+                            </p:stCondLst>
+                            <p:childTnLst>
+                              <p:par>
+                                <p:cTn id="17" presetID="1" presetClass="entr" presetSubtype="0" fill="hold" grpId="0" nodeType="clickEffect">
+                                  <p:stCondLst>
+                                    <p:cond delay="0"/>
+                                  </p:stCondLst>
+                                  <p:childTnLst>
+                                    <p:set>
+                                      <p:cBhvr>
+                                        <p:cTn id="18" dur="1" fill="hold">
+                                          <p:stCondLst>
+                                            <p:cond delay="0"/>
+                                          </p:stCondLst>
+                                        </p:cTn>
+                                        <p:tgtEl>
+                                          <p:spTgt spid="13"/>
+                                        </p:tgtEl>
+                                        <p:attrNameLst>
+                                          <p:attrName>style.visibility</p:attrName>
+                                        </p:attrNameLst>
+                                      </p:cBhvr>
+                                      <p:to>
+                                        <p:strVal val="visible"/>
+                                      </p:to>
+                                    </p:set>
+                                  </p:childTnLst>
+                                </p:cTn>
+                              </p:par>
+                            </p:childTnLst>
+                          </p:cTn>
+                        </p:par>
+                      </p:childTnLst>
+                    </p:cTn>
+                  </p:par>
+                  <p:par>
+                    <p:cTn id="19" fill="hold">
+                      <p:stCondLst>
+                        <p:cond delay="indefinite"/>
+                      </p:stCondLst>
+                      <p:childTnLst>
+                        <p:par>
+                          <p:cTn id="20" fill="hold">
+                            <p:stCondLst>
+                              <p:cond delay="0"/>
+                            </p:stCondLst>
+                            <p:childTnLst>
+                              <p:par>
+                                <p:cTn id="21" presetID="1" presetClass="entr" presetSubtype="0" fill="hold" grpId="0" nodeType="clickEffect">
+                                  <p:stCondLst>
+                                    <p:cond delay="0"/>
+                                  </p:stCondLst>
+                                  <p:childTnLst>
+                                    <p:set>
+                                      <p:cBhvr>
+                                        <p:cTn id="22" dur="1" fill="hold">
+                                          <p:stCondLst>
+                                            <p:cond delay="0"/>
+                                          </p:stCondLst>
+                                        </p:cTn>
+                                        <p:tgtEl>
+                                          <p:spTgt spid="19"/>
+                                        </p:tgtEl>
+                                        <p:attrNameLst>
+                                          <p:attrName>style.visibility</p:attrName>
+                                        </p:attrNameLst>
+                                      </p:cBhvr>
+                                      <p:to>
+                                        <p:strVal val="visible"/>
+                                      </p:to>
+                                    </p:set>
+                                  </p:childTnLst>
+                                </p:cTn>
+                              </p:par>
+                            </p:childTnLst>
+                          </p:cTn>
+                        </p:par>
+                      </p:childTnLst>
+                    </p:cTn>
+                  </p:par>
+                  <p:par>
+                    <p:cTn id="23" fill="hold">
+                      <p:stCondLst>
+                        <p:cond delay="indefinite"/>
+                      </p:stCondLst>
+                      <p:childTnLst>
+                        <p:par>
+                          <p:cTn id="24" fill="hold">
+                            <p:stCondLst>
+                              <p:cond delay="0"/>
+                            </p:stCondLst>
+                            <p:childTnLst>
+                              <p:par>
+                                <p:cTn id="25" presetID="1" presetClass="entr" presetSubtype="0" fill="hold" grpId="0" nodeType="clickEffect">
+                                  <p:stCondLst>
+                                    <p:cond delay="0"/>
+                                  </p:stCondLst>
+                                  <p:childTnLst>
+                                    <p:set>
+                                      <p:cBhvr>
+                                        <p:cTn id="26" dur="1" fill="hold">
+                                          <p:stCondLst>
+                                            <p:cond delay="0"/>
+                                          </p:stCondLst>
+                                        </p:cTn>
+                                        <p:tgtEl>
+                                          <p:spTgt spid="21"/>
+                                        </p:tgtEl>
+                                        <p:attrNameLst>
+                                          <p:attrName>style.visibility</p:attrName>
+                                        </p:attrNameLst>
+                                      </p:cBhvr>
+                                      <p:to>
+                                        <p:strVal val="visible"/>
+                                      </p:to>
+                                    </p:set>
+                                  </p:childTnLst>
+                                </p:cTn>
+                              </p:par>
+                            </p:childTnLst>
+                          </p:cTn>
+                        </p:par>
+                      </p:childTnLst>
+                    </p:cTn>
+                  </p:par>
+                  <p:par>
+                    <p:cTn id="27" fill="hold">
+                      <p:stCondLst>
+                        <p:cond delay="indefinite"/>
+                      </p:stCondLst>
+                      <p:childTnLst>
+                        <p:par>
+                          <p:cTn id="28" fill="hold">
+                            <p:stCondLst>
+                              <p:cond delay="0"/>
+                            </p:stCondLst>
+                            <p:childTnLst>
+                              <p:par>
+                                <p:cTn id="29" presetID="1" presetClass="entr" presetSubtype="0" fill="hold" grpId="0" nodeType="clickEffect">
+                                  <p:stCondLst>
+                                    <p:cond delay="0"/>
+                                  </p:stCondLst>
+                                  <p:childTnLst>
+                                    <p:set>
+                                      <p:cBhvr>
+                                        <p:cTn id="30" dur="1" fill="hold">
+                                          <p:stCondLst>
+                                            <p:cond delay="0"/>
+                                          </p:stCondLst>
+                                        </p:cTn>
+                                        <p:tgtEl>
+                                          <p:spTgt spid="20"/>
+                                        </p:tgtEl>
+                                        <p:attrNameLst>
+                                          <p:attrName>style.visibility</p:attrName>
+                                        </p:attrNameLst>
+                                      </p:cBhvr>
+                                      <p:to>
+                                        <p:strVal val="visible"/>
+                                      </p:to>
+                                    </p:set>
+                                  </p:childTnLst>
+                                </p:cTn>
+                              </p:par>
+                            </p:childTnLst>
+                          </p:cTn>
+                        </p:par>
+                      </p:childTnLst>
+                    </p:cTn>
+                  </p:par>
+                  <p:par>
+                    <p:cTn id="31" fill="hold">
+                      <p:stCondLst>
+                        <p:cond delay="indefinite"/>
+                      </p:stCondLst>
+                      <p:childTnLst>
+                        <p:par>
+                          <p:cTn id="32" fill="hold">
+                            <p:stCondLst>
+                              <p:cond delay="0"/>
+                            </p:stCondLst>
+                            <p:childTnLst>
+                              <p:par>
+                                <p:cTn id="33" presetID="1" presetClass="entr" presetSubtype="0" fill="hold" grpId="0" nodeType="clickEffect">
+                                  <p:stCondLst>
+                                    <p:cond delay="0"/>
+                                  </p:stCondLst>
+                                  <p:childTnLst>
+                                    <p:set>
+                                      <p:cBhvr>
+                                        <p:cTn id="34" dur="1" fill="hold">
+                                          <p:stCondLst>
+                                            <p:cond delay="0"/>
+                                          </p:stCondLst>
+                                        </p:cTn>
+                                        <p:tgtEl>
+                                          <p:spTgt spid="14"/>
+                                        </p:tgtEl>
+                                        <p:attrNameLst>
+                                          <p:attrName>style.visibility</p:attrName>
+                                        </p:attrNameLst>
+                                      </p:cBhvr>
+                                      <p:to>
+                                        <p:strVal val="visible"/>
+                                      </p:to>
+                                    </p:set>
+                                  </p:childTnLst>
+                                </p:cTn>
+                              </p:par>
+                            </p:childTnLst>
+                          </p:cTn>
+                        </p:par>
+                      </p:childTnLst>
+                    </p:cTn>
+                  </p:par>
+                </p:childTnLst>
+              </p:cTn>
+              <p:prevCondLst>
+                <p:cond evt="onPrev" delay="0">
+                  <p:tgtEl>
+                    <p:sldTgt/>
+                  </p:tgtEl>
+                </p:cond>
+              </p:prevCondLst>
+              <p:nextCondLst>
+                <p:cond evt="onNext" delay="0">
+                  <p:tgtEl>
+                    <p:sldTgt/>
+                  </p:tgtEl>
+                </p:cond>
+              </p:nextCondLst>
+            </p:seq>
+          </p:childTnLst>
+        </p:cTn>
+      </p:par>
+    </p:tnLst>
+    <p:bldLst>
+      <p:bldP spid="9" grpId="0" animBg="1"/>
+      <p:bldP spid="10" grpId="0" animBg="1"/>
+      <p:bldP spid="12" grpId="0" animBg="1"/>
+      <p:bldP spid="13" grpId="0" animBg="1"/>
+      <p:bldP spid="14" grpId="0" animBg="1"/>
+      <p:bldP spid="19" grpId="0" animBg="1"/>
+      <p:bldP spid="21" grpId="0" animBg="1"/>
+      <p:bldP spid="20" grpId="0" animBg="1"/>
+    </p:bldLst>
+  </p:timing>
 </p:sld>
 </file>
 
@@ -5460,7 +7647,106 @@
       </p:grpSpPr>
       <p:sp>
         <p:nvSpPr>
-          <p:cNvPr id="2" name="Title 1"/>
+          <p:cNvPr id="2" name="Content Placeholder 1"/>
+          <p:cNvSpPr>
+            <a:spLocks noGrp="1"/>
+          </p:cNvSpPr>
+          <p:nvPr>
+            <p:ph idx="1"/>
+          </p:nvPr>
+        </p:nvSpPr>
+        <p:spPr/>
+        <p:txBody>
+          <a:bodyPr>
+            <a:normAutofit lnSpcReduction="10000"/>
+          </a:bodyPr>
+          <a:lstStyle/>
+          <a:p>
+            <a:r>
+              <a:rPr lang="en-US" dirty="0"/>
+              <a:t>Save every solution we find to sub-problems</a:t>
+            </a:r>
+          </a:p>
+          <a:p>
+            <a:endParaRPr lang="en-US" dirty="0"/>
+          </a:p>
+          <a:p>
+            <a:r>
+              <a:rPr lang="en-US" dirty="0"/>
+              <a:t>Before recursively computing a solution:</a:t>
+            </a:r>
+          </a:p>
+          <a:p>
+            <a:pPr lvl="1"/>
+            <a:r>
+              <a:rPr lang="en-US" dirty="0"/>
+              <a:t>Look it up</a:t>
+            </a:r>
+          </a:p>
+          <a:p>
+            <a:pPr lvl="1"/>
+            <a:r>
+              <a:rPr lang="en-US" dirty="0"/>
+              <a:t>If found, use it</a:t>
+            </a:r>
+          </a:p>
+          <a:p>
+            <a:pPr lvl="1"/>
+            <a:r>
+              <a:rPr lang="en-US" dirty="0"/>
+              <a:t>Otherwise do the recursive computation</a:t>
+            </a:r>
+          </a:p>
+          <a:p>
+            <a:pPr lvl="1"/>
+            <a:endParaRPr lang="en-US" dirty="0"/>
+          </a:p>
+          <a:p>
+            <a:r>
+              <a:rPr lang="en-US" dirty="0"/>
+              <a:t>Study the </a:t>
+            </a:r>
+            <a:r>
+              <a:rPr lang="en-US" dirty="0" err="1"/>
+              <a:t>memoization</a:t>
+            </a:r>
+            <a:r>
+              <a:rPr lang="en-US" dirty="0"/>
+              <a:t> code in the </a:t>
+            </a:r>
+            <a:r>
+              <a:rPr lang="en-US" dirty="0" err="1">
+                <a:solidFill>
+                  <a:srgbClr val="F79646"/>
+                </a:solidFill>
+              </a:rPr>
+              <a:t>RecursiveHelperFunctions</a:t>
+            </a:r>
+            <a:r>
+              <a:rPr lang="en-US" dirty="0">
+                <a:solidFill>
+                  <a:srgbClr val="F79646"/>
+                </a:solidFill>
+              </a:rPr>
+              <a:t> </a:t>
+            </a:r>
+            <a:r>
+              <a:rPr lang="en-US" dirty="0"/>
+              <a:t>project</a:t>
+            </a:r>
+          </a:p>
+          <a:p>
+            <a:pPr lvl="1"/>
+            <a:endParaRPr lang="en-US" dirty="0"/>
+          </a:p>
+          <a:p>
+            <a:endParaRPr lang="en-US" dirty="0"/>
+          </a:p>
+        </p:txBody>
+      </p:sp>
+      <p:sp>
+        <p:nvSpPr>
+          <p:cNvPr id="3" name="Title 2"/>
           <p:cNvSpPr>
             <a:spLocks noGrp="1"/>
           </p:cNvSpPr>
@@ -5475,91 +7761,8 @@
           <a:p>
             <a:r>
               <a:rPr lang="en-US" dirty="0" err="1"/>
-              <a:t>BettingInterfaces</a:t>
-            </a:r>
-            <a:endParaRPr lang="en-US" dirty="0"/>
-          </a:p>
-        </p:txBody>
-      </p:sp>
-      <p:sp>
-        <p:nvSpPr>
-          <p:cNvPr id="3" name="Content Placeholder 2"/>
-          <p:cNvSpPr>
-            <a:spLocks noGrp="1"/>
-          </p:cNvSpPr>
-          <p:nvPr>
-            <p:ph idx="1"/>
-          </p:nvPr>
-        </p:nvSpPr>
-        <p:spPr>
-          <a:xfrm>
-            <a:off x="457200" y="1600200"/>
-            <a:ext cx="8229600" cy="5029200"/>
-          </a:xfrm>
-        </p:spPr>
-        <p:txBody>
-          <a:bodyPr>
-            <a:normAutofit fontScale="92500" lnSpcReduction="10000"/>
-          </a:bodyPr>
-          <a:lstStyle/>
-          <a:p>
-            <a:r>
-              <a:rPr lang="en-US" dirty="0"/>
-              <a:t>Get in groups of 2-3…no one working alone</a:t>
-            </a:r>
-          </a:p>
-          <a:p>
-            <a:r>
-              <a:rPr lang="en-US" dirty="0"/>
-              <a:t>Understand the given code, the duplication, plus the additional features you will be adding.  Look at 3 TODOs in </a:t>
-            </a:r>
-            <a:r>
-              <a:rPr lang="en-US" dirty="0" err="1"/>
-              <a:t>BettingMain</a:t>
-            </a:r>
-            <a:r>
-              <a:rPr lang="en-US" dirty="0"/>
-              <a:t>.</a:t>
-            </a:r>
-          </a:p>
-          <a:p>
-            <a:r>
-              <a:rPr lang="en-US" dirty="0"/>
-              <a:t>Design a solution for all 3 TODOs using interfaces and make a UML diagram describing it</a:t>
-            </a:r>
-          </a:p>
-          <a:p>
-            <a:r>
-              <a:rPr lang="en-US" dirty="0"/>
-              <a:t>Get myself or a TA to check out your UML</a:t>
-            </a:r>
-          </a:p>
-          <a:p>
-            <a:r>
-              <a:rPr lang="en-US" dirty="0"/>
-              <a:t>Once we sign off – start coding </a:t>
-            </a:r>
-          </a:p>
-          <a:p>
-            <a:pPr lvl="1"/>
-            <a:r>
-              <a:rPr lang="en-US" dirty="0"/>
-              <a:t>You only need 1 computer for this one.  </a:t>
-            </a:r>
-          </a:p>
-          <a:p>
-            <a:pPr lvl="1"/>
-            <a:r>
-              <a:rPr lang="en-US" dirty="0"/>
-              <a:t>I recommend you do each TODO one by one rather than </a:t>
-            </a:r>
-            <a:r>
-              <a:rPr lang="en-US"/>
-              <a:t>doing everything in one go</a:t>
-            </a:r>
-            <a:endParaRPr lang="en-US" dirty="0"/>
-          </a:p>
-          <a:p>
+              <a:t>Memoization</a:t>
+            </a:r>
             <a:endParaRPr lang="en-US" dirty="0"/>
           </a:p>
         </p:txBody>
@@ -5567,7 +7770,7 @@
     </p:spTree>
     <p:extLst>
       <p:ext uri="{BB962C8B-B14F-4D97-AF65-F5344CB8AC3E}">
-        <p14:creationId xmlns:p14="http://schemas.microsoft.com/office/powerpoint/2010/main" val="3585860032"/>
+        <p14:creationId xmlns:p14="http://schemas.microsoft.com/office/powerpoint/2010/main" val="3349563426"/>
       </p:ext>
     </p:extLst>
   </p:cSld>
@@ -5610,9 +7813,10 @@
           <a:lstStyle/>
           <a:p>
             <a:r>
-              <a:rPr lang="en-US" dirty="0"/>
-              <a:t>UML as it currently stands</a:t>
-            </a:r>
+              <a:rPr lang="en-US" dirty="0" err="1"/>
+              <a:t>BettingInterfaces</a:t>
+            </a:r>
+            <a:endParaRPr lang="en-US" dirty="0"/>
           </a:p>
         </p:txBody>
       </p:sp>
@@ -5626,28 +7830,83 @@
             <p:ph idx="1"/>
           </p:nvPr>
         </p:nvSpPr>
-        <p:spPr/>
-        <p:txBody>
-          <a:bodyPr/>
-          <a:lstStyle/>
-          <a:p>
-            <a:r>
-              <a:rPr lang="en-US" dirty="0"/>
-              <a:t>What do you need to add?</a:t>
-            </a:r>
-          </a:p>
-          <a:p>
-            <a:r>
-              <a:rPr lang="en-US" dirty="0"/>
-              <a:t>What do the Bet classes have in common?</a:t>
-            </a:r>
+        <p:spPr>
+          <a:xfrm>
+            <a:off x="457200" y="1600200"/>
+            <a:ext cx="8229600" cy="5029200"/>
+          </a:xfrm>
+        </p:spPr>
+        <p:txBody>
+          <a:bodyPr>
+            <a:normAutofit fontScale="92500" lnSpcReduction="10000"/>
+          </a:bodyPr>
+          <a:lstStyle/>
+          <a:p>
+            <a:r>
+              <a:rPr lang="en-US" dirty="0"/>
+              <a:t>Get in groups of 2-3…no one working alone</a:t>
+            </a:r>
+          </a:p>
+          <a:p>
+            <a:r>
+              <a:rPr lang="en-US" dirty="0"/>
+              <a:t>Understand the given code, the duplication, plus the additional features you will be adding.  Look at 3 TODOs in </a:t>
+            </a:r>
+            <a:r>
+              <a:rPr lang="en-US" dirty="0" err="1"/>
+              <a:t>BettingMain</a:t>
+            </a:r>
+            <a:r>
+              <a:rPr lang="en-US" dirty="0"/>
+              <a:t>.</a:t>
+            </a:r>
+          </a:p>
+          <a:p>
+            <a:r>
+              <a:rPr lang="en-US" dirty="0"/>
+              <a:t>Design a solution for all 3 TODOs using interfaces and make a UML diagram describing it</a:t>
+            </a:r>
+          </a:p>
+          <a:p>
+            <a:r>
+              <a:rPr lang="en-US" dirty="0"/>
+              <a:t>Get myself or a TA to check out your UML</a:t>
+            </a:r>
+          </a:p>
+          <a:p>
+            <a:r>
+              <a:rPr lang="en-US" dirty="0"/>
+              <a:t>Once we sign off – start coding </a:t>
+            </a:r>
+          </a:p>
+          <a:p>
+            <a:pPr lvl="1"/>
+            <a:r>
+              <a:rPr lang="en-US" dirty="0"/>
+              <a:t>You only need 1 computer for this one.  </a:t>
+            </a:r>
+          </a:p>
+          <a:p>
+            <a:pPr lvl="1"/>
+            <a:r>
+              <a:rPr lang="en-US" dirty="0"/>
+              <a:t>I recommend you do each TODO one by one rather than </a:t>
+            </a:r>
+            <a:r>
+              <a:rPr lang="en-US"/>
+              <a:t>doing everything in one go</a:t>
+            </a:r>
+            <a:endParaRPr lang="en-US" dirty="0"/>
+          </a:p>
+          <a:p>
+            <a:endParaRPr lang="en-US" dirty="0"/>
           </a:p>
         </p:txBody>
       </p:sp>
     </p:spTree>
     <p:extLst>
       <p:ext uri="{BB962C8B-B14F-4D97-AF65-F5344CB8AC3E}">
-        <p14:creationId xmlns:p14="http://schemas.microsoft.com/office/powerpoint/2010/main" val="3193839378"/>
+        <p14:creationId xmlns:p14="http://schemas.microsoft.com/office/powerpoint/2010/main" val="3585860032"/>
       </p:ext>
     </p:extLst>
   </p:cSld>

</xml_diff>

<commit_message>
update link to videos and slides
</commit_message>
<xml_diff>
--- a/ClassMaterials/MoreRecursionMoreInterfaces/Slides/More_Interfaces_More_Recursion.pptx
+++ b/ClassMaterials/MoreRecursionMoreInterfaces/Slides/More_Interfaces_More_Recursion.pptx
@@ -5,7 +5,7 @@
     <p:sldMasterId id="2147483648" r:id="rId1"/>
   </p:sldMasterIdLst>
   <p:notesMasterIdLst>
-    <p:notesMasterId r:id="rId15"/>
+    <p:notesMasterId r:id="rId18"/>
   </p:notesMasterIdLst>
   <p:sldIdLst>
     <p:sldId id="256" r:id="rId2"/>
@@ -15,12 +15,15 @@
     <p:sldId id="259" r:id="rId6"/>
     <p:sldId id="262" r:id="rId7"/>
     <p:sldId id="270" r:id="rId8"/>
-    <p:sldId id="261" r:id="rId9"/>
-    <p:sldId id="260" r:id="rId10"/>
-    <p:sldId id="267" r:id="rId11"/>
-    <p:sldId id="268" r:id="rId12"/>
-    <p:sldId id="269" r:id="rId13"/>
-    <p:sldId id="271" r:id="rId14"/>
+    <p:sldId id="273" r:id="rId9"/>
+    <p:sldId id="274" r:id="rId10"/>
+    <p:sldId id="261" r:id="rId11"/>
+    <p:sldId id="260" r:id="rId12"/>
+    <p:sldId id="275" r:id="rId13"/>
+    <p:sldId id="267" r:id="rId14"/>
+    <p:sldId id="268" r:id="rId15"/>
+    <p:sldId id="269" r:id="rId16"/>
+    <p:sldId id="271" r:id="rId17"/>
   </p:sldIdLst>
   <p:sldSz cx="9144000" cy="6858000" type="screen4x3"/>
   <p:notesSz cx="6858000" cy="9144000"/>
@@ -220,7 +223,7 @@
           <a:p>
             <a:fld id="{01A9AFE8-3E8D-E148-BA98-12759F2DD8EB}" type="datetimeFigureOut">
               <a:rPr lang="en-US" smtClean="0"/>
-              <a:t>4/8/2020</a:t>
+              <a:t>4/12/2020</a:t>
             </a:fld>
             <a:endParaRPr lang="en-US"/>
           </a:p>
@@ -759,59 +762,11 @@
         </p:nvSpPr>
         <p:spPr/>
         <p:txBody>
-          <a:bodyPr>
-            <a:normAutofit/>
-          </a:bodyPr>
-          <a:lstStyle/>
-          <a:p>
-            <a:pPr defTabSz="868801">
-              <a:defRPr/>
-            </a:pPr>
-            <a:r>
-              <a:rPr lang="en-US" dirty="0"/>
-              <a:t>[Probably should point</a:t>
-            </a:r>
-            <a:r>
-              <a:rPr lang="en-US" baseline="0" dirty="0"/>
-              <a:t> out that the slide title is not a typo.  They’ll read it as “memorization”.]</a:t>
-            </a:r>
-          </a:p>
-          <a:p>
-            <a:pPr defTabSz="868801">
-              <a:defRPr/>
-            </a:pPr>
+          <a:bodyPr/>
+          <a:lstStyle/>
+          <a:p>
             <a:endParaRPr lang="en-US" dirty="0"/>
           </a:p>
-          <a:p>
-            <a:pPr defTabSz="868801">
-              <a:defRPr/>
-            </a:pPr>
-            <a:r>
-              <a:rPr lang="en-US" dirty="0"/>
-              <a:t>I draw out a tree of Fibonacci calls</a:t>
-            </a:r>
-            <a:r>
-              <a:rPr lang="en-US" baseline="0" dirty="0"/>
-              <a:t> on this slide for when it’s implemented as F(n) = F(n-1) + F(n-2), usually for F(5) or something like that. Then I explain that you would create an array/</a:t>
-            </a:r>
-            <a:r>
-              <a:rPr lang="en-US" baseline="0" dirty="0" err="1"/>
-              <a:t>hashmap</a:t>
-            </a:r>
-            <a:r>
-              <a:rPr lang="en-US" baseline="0" dirty="0"/>
-              <a:t>/something to contain the values you’ve previously found and each time you find one save it, then check for that first. After the explanation, I show how it would reduce the tree by leaving only one calculation of </a:t>
-            </a:r>
-            <a:r>
-              <a:rPr lang="en-US" baseline="0"/>
-              <a:t>each value left </a:t>
-            </a:r>
-            <a:r>
-              <a:rPr lang="en-US" baseline="0" dirty="0"/>
-              <a:t>in the tree.</a:t>
-            </a:r>
-            <a:endParaRPr lang="en-US" dirty="0"/>
-          </a:p>
         </p:txBody>
       </p:sp>
       <p:sp>
@@ -829,10 +784,9 @@
           <a:bodyPr/>
           <a:lstStyle/>
           <a:p>
-            <a:fld id="{3D41B427-7DFC-4CC2-88EE-62ECF6F87677}" type="slidenum">
+            <a:fld id="{45D9DED7-56C8-B246-9138-4CD26015242F}" type="slidenum">
               <a:rPr lang="en-US" smtClean="0"/>
-              <a:pPr/>
-              <a:t>8</a:t>
+              <a:t>9</a:t>
             </a:fld>
             <a:endParaRPr lang="en-US"/>
           </a:p>
@@ -841,7 +795,7 @@
     </p:spTree>
     <p:extLst>
       <p:ext uri="{BB962C8B-B14F-4D97-AF65-F5344CB8AC3E}">
-        <p14:creationId xmlns:p14="http://schemas.microsoft.com/office/powerpoint/2010/main" val="1873822009"/>
+        <p14:creationId xmlns:p14="http://schemas.microsoft.com/office/powerpoint/2010/main" val="1208130159"/>
       </p:ext>
     </p:extLst>
   </p:cSld>
@@ -892,326 +846,79 @@
         </p:nvSpPr>
         <p:spPr/>
         <p:txBody>
+          <a:bodyPr>
+            <a:normAutofit/>
+          </a:bodyPr>
+          <a:lstStyle/>
+          <a:p>
+            <a:pPr defTabSz="868801">
+              <a:defRPr/>
+            </a:pPr>
+            <a:r>
+              <a:rPr lang="en-US" dirty="0"/>
+              <a:t>[Probably should point</a:t>
+            </a:r>
+            <a:r>
+              <a:rPr lang="en-US" baseline="0" dirty="0"/>
+              <a:t> out that the slide title is not a typo.  They’ll read it as “memorization”.]</a:t>
+            </a:r>
+          </a:p>
+          <a:p>
+            <a:pPr defTabSz="868801">
+              <a:defRPr/>
+            </a:pPr>
+            <a:endParaRPr lang="en-US" dirty="0"/>
+          </a:p>
+          <a:p>
+            <a:pPr defTabSz="868801">
+              <a:defRPr/>
+            </a:pPr>
+            <a:r>
+              <a:rPr lang="en-US" dirty="0"/>
+              <a:t>I draw out a tree of Fibonacci calls</a:t>
+            </a:r>
+            <a:r>
+              <a:rPr lang="en-US" baseline="0" dirty="0"/>
+              <a:t> on this slide for when it’s implemented as F(n) = F(n-1) + F(n-2), usually for F(5) or something like that. Then I explain that you would create an array/</a:t>
+            </a:r>
+            <a:r>
+              <a:rPr lang="en-US" baseline="0" dirty="0" err="1"/>
+              <a:t>hashmap</a:t>
+            </a:r>
+            <a:r>
+              <a:rPr lang="en-US" baseline="0" dirty="0"/>
+              <a:t>/something to contain the values you’ve previously found and each time you find one save it, then check for that first. After the explanation, I show how it would reduce the tree by leaving only one calculation of </a:t>
+            </a:r>
+            <a:r>
+              <a:rPr lang="en-US" baseline="0"/>
+              <a:t>each value left </a:t>
+            </a:r>
+            <a:r>
+              <a:rPr lang="en-US" baseline="0" dirty="0"/>
+              <a:t>in the tree.</a:t>
+            </a:r>
+            <a:endParaRPr lang="en-US" dirty="0"/>
+          </a:p>
+        </p:txBody>
+      </p:sp>
+      <p:sp>
+        <p:nvSpPr>
+          <p:cNvPr id="4" name="Slide Number Placeholder 3"/>
+          <p:cNvSpPr>
+            <a:spLocks noGrp="1"/>
+          </p:cNvSpPr>
+          <p:nvPr>
+            <p:ph type="sldNum" sz="quarter" idx="10"/>
+          </p:nvPr>
+        </p:nvSpPr>
+        <p:spPr/>
+        <p:txBody>
           <a:bodyPr/>
           <a:lstStyle/>
           <a:p>
-            <a:r>
-              <a:rPr lang="en-US" dirty="0"/>
-              <a:t>Can ask students</a:t>
-            </a:r>
-            <a:r>
-              <a:rPr lang="en-US" baseline="0" dirty="0"/>
-              <a:t> to draw this out themselves to make sure they can translate from code to UML and then show this to verify they understood what they needed to write.</a:t>
-            </a:r>
-            <a:endParaRPr lang="en-US" dirty="0"/>
-          </a:p>
-          <a:p>
-            <a:endParaRPr lang="en-US" dirty="0"/>
-          </a:p>
-          <a:p>
-            <a:endParaRPr lang="en-US" dirty="0"/>
-          </a:p>
-          <a:p>
-            <a:r>
-              <a:rPr lang="en-US" dirty="0"/>
-              <a:t>@</a:t>
-            </a:r>
-            <a:r>
-              <a:rPr lang="en-US" dirty="0" err="1"/>
-              <a:t>startuml</a:t>
-            </a:r>
-            <a:endParaRPr lang="en-US" dirty="0"/>
-          </a:p>
-          <a:p>
-            <a:r>
-              <a:rPr lang="en-US" dirty="0"/>
-              <a:t>class </a:t>
-            </a:r>
-            <a:r>
-              <a:rPr lang="en-US" dirty="0" err="1"/>
-              <a:t>BettingMain</a:t>
-            </a:r>
-            <a:r>
-              <a:rPr lang="en-US" dirty="0"/>
-              <a:t> {</a:t>
-            </a:r>
-          </a:p>
-          <a:p>
-            <a:r>
-              <a:rPr lang="en-US" dirty="0" err="1"/>
-              <a:t>currentMoney</a:t>
-            </a:r>
-            <a:endParaRPr lang="en-US" dirty="0"/>
-          </a:p>
-          <a:p>
-            <a:r>
-              <a:rPr lang="en-US" dirty="0" err="1"/>
-              <a:t>handleCommand</a:t>
-            </a:r>
-            <a:r>
-              <a:rPr lang="en-US" dirty="0"/>
-              <a:t>(command)</a:t>
-            </a:r>
-          </a:p>
-          <a:p>
-            <a:r>
-              <a:rPr lang="en-US" dirty="0" err="1"/>
-              <a:t>handleRoll</a:t>
-            </a:r>
-            <a:r>
-              <a:rPr lang="en-US" dirty="0"/>
-              <a:t>()</a:t>
-            </a:r>
-          </a:p>
-          <a:p>
-            <a:r>
-              <a:rPr lang="en-US" dirty="0" err="1"/>
-              <a:t>handleNumberBet</a:t>
-            </a:r>
-            <a:r>
-              <a:rPr lang="en-US" dirty="0"/>
-              <a:t>(</a:t>
-            </a:r>
-            <a:r>
-              <a:rPr lang="en-US" dirty="0" err="1"/>
-              <a:t>betAmount</a:t>
-            </a:r>
-            <a:r>
-              <a:rPr lang="en-US" dirty="0"/>
-              <a:t>, </a:t>
-            </a:r>
-            <a:r>
-              <a:rPr lang="en-US" dirty="0" err="1"/>
-              <a:t>numberBetOn</a:t>
-            </a:r>
-            <a:r>
-              <a:rPr lang="en-US" dirty="0"/>
-              <a:t>)</a:t>
-            </a:r>
-          </a:p>
-          <a:p>
-            <a:r>
-              <a:rPr lang="en-US" dirty="0" err="1"/>
-              <a:t>handleOddEvenBet</a:t>
-            </a:r>
-            <a:r>
-              <a:rPr lang="en-US" dirty="0"/>
-              <a:t>(</a:t>
-            </a:r>
-            <a:r>
-              <a:rPr lang="en-US" dirty="0" err="1"/>
-              <a:t>oddOrEven</a:t>
-            </a:r>
-            <a:r>
-              <a:rPr lang="en-US" dirty="0"/>
-              <a:t>, </a:t>
-            </a:r>
-            <a:r>
-              <a:rPr lang="en-US" dirty="0" err="1"/>
-              <a:t>betAmount</a:t>
-            </a:r>
-            <a:r>
-              <a:rPr lang="en-US" dirty="0"/>
-              <a:t>)</a:t>
-            </a:r>
-          </a:p>
-          <a:p>
-            <a:r>
-              <a:rPr lang="en-US" dirty="0"/>
-              <a:t>}</a:t>
-            </a:r>
-          </a:p>
-          <a:p>
-            <a:endParaRPr lang="en-US" dirty="0"/>
-          </a:p>
-          <a:p>
-            <a:r>
-              <a:rPr lang="en-US" dirty="0"/>
-              <a:t>class </a:t>
-            </a:r>
-            <a:r>
-              <a:rPr lang="en-US" dirty="0" err="1"/>
-              <a:t>NumberBet</a:t>
-            </a:r>
-            <a:r>
-              <a:rPr lang="en-US" dirty="0"/>
-              <a:t> {</a:t>
-            </a:r>
-          </a:p>
-          <a:p>
-            <a:r>
-              <a:rPr lang="en-US" dirty="0" err="1"/>
-              <a:t>numberBetOn</a:t>
-            </a:r>
-            <a:endParaRPr lang="en-US" dirty="0"/>
-          </a:p>
-          <a:p>
-            <a:r>
-              <a:rPr lang="en-US" dirty="0"/>
-              <a:t>amount</a:t>
-            </a:r>
-          </a:p>
-          <a:p>
-            <a:r>
-              <a:rPr lang="en-US" dirty="0" err="1"/>
-              <a:t>isWinResult</a:t>
-            </a:r>
-            <a:r>
-              <a:rPr lang="en-US" dirty="0"/>
-              <a:t>(</a:t>
-            </a:r>
-            <a:r>
-              <a:rPr lang="en-US" dirty="0" err="1"/>
-              <a:t>rollResult</a:t>
-            </a:r>
-            <a:r>
-              <a:rPr lang="en-US" dirty="0"/>
-              <a:t>)</a:t>
-            </a:r>
-          </a:p>
-          <a:p>
-            <a:r>
-              <a:rPr lang="en-US" dirty="0" err="1"/>
-              <a:t>winAmount</a:t>
-            </a:r>
-            <a:r>
-              <a:rPr lang="en-US" dirty="0"/>
-              <a:t>()</a:t>
-            </a:r>
-          </a:p>
-          <a:p>
-            <a:r>
-              <a:rPr lang="en-US" dirty="0"/>
-              <a:t>}</a:t>
-            </a:r>
-          </a:p>
-          <a:p>
-            <a:endParaRPr lang="en-US" dirty="0"/>
-          </a:p>
-          <a:p>
-            <a:r>
-              <a:rPr lang="en-US" dirty="0"/>
-              <a:t>class </a:t>
-            </a:r>
-            <a:r>
-              <a:rPr lang="en-US" dirty="0" err="1"/>
-              <a:t>OddEvenBet</a:t>
-            </a:r>
-            <a:r>
-              <a:rPr lang="en-US" dirty="0"/>
-              <a:t>{</a:t>
-            </a:r>
-          </a:p>
-          <a:p>
-            <a:r>
-              <a:rPr lang="en-US" dirty="0" err="1"/>
-              <a:t>isEvenBet</a:t>
-            </a:r>
-            <a:endParaRPr lang="en-US" dirty="0"/>
-          </a:p>
-          <a:p>
-            <a:r>
-              <a:rPr lang="en-US" dirty="0"/>
-              <a:t>amount</a:t>
-            </a:r>
-          </a:p>
-          <a:p>
-            <a:r>
-              <a:rPr lang="en-US" dirty="0" err="1"/>
-              <a:t>isWinResult</a:t>
-            </a:r>
-            <a:r>
-              <a:rPr lang="en-US" dirty="0"/>
-              <a:t>(</a:t>
-            </a:r>
-            <a:r>
-              <a:rPr lang="en-US" dirty="0" err="1"/>
-              <a:t>rollResult</a:t>
-            </a:r>
-            <a:r>
-              <a:rPr lang="en-US" dirty="0"/>
-              <a:t>)</a:t>
-            </a:r>
-          </a:p>
-          <a:p>
-            <a:r>
-              <a:rPr lang="en-US" dirty="0" err="1"/>
-              <a:t>winAmount</a:t>
-            </a:r>
-            <a:r>
-              <a:rPr lang="en-US" dirty="0"/>
-              <a:t>()</a:t>
-            </a:r>
-          </a:p>
-          <a:p>
-            <a:r>
-              <a:rPr lang="en-US" dirty="0"/>
-              <a:t>}</a:t>
-            </a:r>
-          </a:p>
-          <a:p>
-            <a:r>
-              <a:rPr lang="en-US" dirty="0" err="1"/>
-              <a:t>BettingMain</a:t>
-            </a:r>
-            <a:r>
-              <a:rPr lang="en-US" dirty="0"/>
-              <a:t> -&gt; "*" </a:t>
-            </a:r>
-            <a:r>
-              <a:rPr lang="en-US" dirty="0" err="1"/>
-              <a:t>NumberBet</a:t>
-            </a:r>
-            <a:r>
-              <a:rPr lang="en-US" dirty="0"/>
-              <a:t> </a:t>
-            </a:r>
-          </a:p>
-          <a:p>
-            <a:r>
-              <a:rPr lang="en-US" dirty="0" err="1"/>
-              <a:t>BettingMain</a:t>
-            </a:r>
-            <a:r>
-              <a:rPr lang="en-US" dirty="0"/>
-              <a:t> -&gt; "*" </a:t>
-            </a:r>
-            <a:r>
-              <a:rPr lang="en-US" dirty="0" err="1"/>
-              <a:t>OddEvenBet</a:t>
-            </a:r>
-            <a:endParaRPr lang="en-US" dirty="0"/>
-          </a:p>
-          <a:p>
-            <a:r>
-              <a:rPr lang="en-US" dirty="0"/>
-              <a:t>@</a:t>
-            </a:r>
-            <a:r>
-              <a:rPr lang="en-US" dirty="0" err="1"/>
-              <a:t>enduml</a:t>
-            </a:r>
-            <a:endParaRPr lang="en-US" dirty="0"/>
-          </a:p>
-        </p:txBody>
-      </p:sp>
-      <p:sp>
-        <p:nvSpPr>
-          <p:cNvPr id="4" name="Slide Number Placeholder 3"/>
-          <p:cNvSpPr>
-            <a:spLocks noGrp="1"/>
-          </p:cNvSpPr>
-          <p:nvPr>
-            <p:ph type="sldNum" sz="quarter" idx="10"/>
-          </p:nvPr>
-        </p:nvSpPr>
-        <p:spPr/>
-        <p:txBody>
-          <a:bodyPr/>
-          <a:lstStyle/>
-          <a:p>
-            <a:fld id="{45D9DED7-56C8-B246-9138-4CD26015242F}" type="slidenum">
+            <a:fld id="{3D41B427-7DFC-4CC2-88EE-62ECF6F87677}" type="slidenum">
               <a:rPr lang="en-US" smtClean="0"/>
+              <a:pPr/>
               <a:t>10</a:t>
             </a:fld>
             <a:endParaRPr lang="en-US"/>
@@ -1221,7 +928,7 @@
     </p:spTree>
     <p:extLst>
       <p:ext uri="{BB962C8B-B14F-4D97-AF65-F5344CB8AC3E}">
-        <p14:creationId xmlns:p14="http://schemas.microsoft.com/office/powerpoint/2010/main" val="1248892832"/>
+        <p14:creationId xmlns:p14="http://schemas.microsoft.com/office/powerpoint/2010/main" val="1873822009"/>
       </p:ext>
     </p:extLst>
   </p:cSld>
@@ -1592,7 +1299,7 @@
           <a:p>
             <a:fld id="{45D9DED7-56C8-B246-9138-4CD26015242F}" type="slidenum">
               <a:rPr lang="en-US" smtClean="0"/>
-              <a:t>11</a:t>
+              <a:t>13</a:t>
             </a:fld>
             <a:endParaRPr lang="en-US"/>
           </a:p>
@@ -1656,6 +1363,386 @@
           <a:lstStyle/>
           <a:p>
             <a:r>
+              <a:rPr lang="en-US" dirty="0"/>
+              <a:t>Can ask students</a:t>
+            </a:r>
+            <a:r>
+              <a:rPr lang="en-US" baseline="0" dirty="0"/>
+              <a:t> to draw this out themselves to make sure they can translate from code to UML and then show this to verify they understood what they needed to write.</a:t>
+            </a:r>
+            <a:endParaRPr lang="en-US" dirty="0"/>
+          </a:p>
+          <a:p>
+            <a:endParaRPr lang="en-US" dirty="0"/>
+          </a:p>
+          <a:p>
+            <a:endParaRPr lang="en-US" dirty="0"/>
+          </a:p>
+          <a:p>
+            <a:r>
+              <a:rPr lang="en-US" dirty="0"/>
+              <a:t>@</a:t>
+            </a:r>
+            <a:r>
+              <a:rPr lang="en-US" dirty="0" err="1"/>
+              <a:t>startuml</a:t>
+            </a:r>
+            <a:endParaRPr lang="en-US" dirty="0"/>
+          </a:p>
+          <a:p>
+            <a:r>
+              <a:rPr lang="en-US" dirty="0"/>
+              <a:t>class </a:t>
+            </a:r>
+            <a:r>
+              <a:rPr lang="en-US" dirty="0" err="1"/>
+              <a:t>BettingMain</a:t>
+            </a:r>
+            <a:r>
+              <a:rPr lang="en-US" dirty="0"/>
+              <a:t> {</a:t>
+            </a:r>
+          </a:p>
+          <a:p>
+            <a:r>
+              <a:rPr lang="en-US" dirty="0" err="1"/>
+              <a:t>currentMoney</a:t>
+            </a:r>
+            <a:endParaRPr lang="en-US" dirty="0"/>
+          </a:p>
+          <a:p>
+            <a:r>
+              <a:rPr lang="en-US" dirty="0" err="1"/>
+              <a:t>handleCommand</a:t>
+            </a:r>
+            <a:r>
+              <a:rPr lang="en-US" dirty="0"/>
+              <a:t>(command)</a:t>
+            </a:r>
+          </a:p>
+          <a:p>
+            <a:r>
+              <a:rPr lang="en-US" dirty="0" err="1"/>
+              <a:t>handleRoll</a:t>
+            </a:r>
+            <a:r>
+              <a:rPr lang="en-US" dirty="0"/>
+              <a:t>()</a:t>
+            </a:r>
+          </a:p>
+          <a:p>
+            <a:r>
+              <a:rPr lang="en-US" dirty="0" err="1"/>
+              <a:t>handleNumberBet</a:t>
+            </a:r>
+            <a:r>
+              <a:rPr lang="en-US" dirty="0"/>
+              <a:t>(</a:t>
+            </a:r>
+            <a:r>
+              <a:rPr lang="en-US" dirty="0" err="1"/>
+              <a:t>betAmount</a:t>
+            </a:r>
+            <a:r>
+              <a:rPr lang="en-US" dirty="0"/>
+              <a:t>, </a:t>
+            </a:r>
+            <a:r>
+              <a:rPr lang="en-US" dirty="0" err="1"/>
+              <a:t>numberBetOn</a:t>
+            </a:r>
+            <a:r>
+              <a:rPr lang="en-US" dirty="0"/>
+              <a:t>)</a:t>
+            </a:r>
+          </a:p>
+          <a:p>
+            <a:r>
+              <a:rPr lang="en-US" dirty="0" err="1"/>
+              <a:t>handleOddEvenBet</a:t>
+            </a:r>
+            <a:r>
+              <a:rPr lang="en-US" dirty="0"/>
+              <a:t>(</a:t>
+            </a:r>
+            <a:r>
+              <a:rPr lang="en-US" dirty="0" err="1"/>
+              <a:t>oddOrEven</a:t>
+            </a:r>
+            <a:r>
+              <a:rPr lang="en-US" dirty="0"/>
+              <a:t>, </a:t>
+            </a:r>
+            <a:r>
+              <a:rPr lang="en-US" dirty="0" err="1"/>
+              <a:t>betAmount</a:t>
+            </a:r>
+            <a:r>
+              <a:rPr lang="en-US" dirty="0"/>
+              <a:t>)</a:t>
+            </a:r>
+          </a:p>
+          <a:p>
+            <a:r>
+              <a:rPr lang="en-US" dirty="0"/>
+              <a:t>}</a:t>
+            </a:r>
+          </a:p>
+          <a:p>
+            <a:endParaRPr lang="en-US" dirty="0"/>
+          </a:p>
+          <a:p>
+            <a:r>
+              <a:rPr lang="en-US" dirty="0"/>
+              <a:t>class </a:t>
+            </a:r>
+            <a:r>
+              <a:rPr lang="en-US" dirty="0" err="1"/>
+              <a:t>NumberBet</a:t>
+            </a:r>
+            <a:r>
+              <a:rPr lang="en-US" dirty="0"/>
+              <a:t> {</a:t>
+            </a:r>
+          </a:p>
+          <a:p>
+            <a:r>
+              <a:rPr lang="en-US" dirty="0" err="1"/>
+              <a:t>numberBetOn</a:t>
+            </a:r>
+            <a:endParaRPr lang="en-US" dirty="0"/>
+          </a:p>
+          <a:p>
+            <a:r>
+              <a:rPr lang="en-US" dirty="0"/>
+              <a:t>amount</a:t>
+            </a:r>
+          </a:p>
+          <a:p>
+            <a:r>
+              <a:rPr lang="en-US" dirty="0" err="1"/>
+              <a:t>isWinResult</a:t>
+            </a:r>
+            <a:r>
+              <a:rPr lang="en-US" dirty="0"/>
+              <a:t>(</a:t>
+            </a:r>
+            <a:r>
+              <a:rPr lang="en-US" dirty="0" err="1"/>
+              <a:t>rollResult</a:t>
+            </a:r>
+            <a:r>
+              <a:rPr lang="en-US" dirty="0"/>
+              <a:t>)</a:t>
+            </a:r>
+          </a:p>
+          <a:p>
+            <a:r>
+              <a:rPr lang="en-US" dirty="0" err="1"/>
+              <a:t>winAmount</a:t>
+            </a:r>
+            <a:r>
+              <a:rPr lang="en-US" dirty="0"/>
+              <a:t>()</a:t>
+            </a:r>
+          </a:p>
+          <a:p>
+            <a:r>
+              <a:rPr lang="en-US" dirty="0"/>
+              <a:t>}</a:t>
+            </a:r>
+          </a:p>
+          <a:p>
+            <a:endParaRPr lang="en-US" dirty="0"/>
+          </a:p>
+          <a:p>
+            <a:r>
+              <a:rPr lang="en-US" dirty="0"/>
+              <a:t>class </a:t>
+            </a:r>
+            <a:r>
+              <a:rPr lang="en-US" dirty="0" err="1"/>
+              <a:t>OddEvenBet</a:t>
+            </a:r>
+            <a:r>
+              <a:rPr lang="en-US" dirty="0"/>
+              <a:t>{</a:t>
+            </a:r>
+          </a:p>
+          <a:p>
+            <a:r>
+              <a:rPr lang="en-US" dirty="0" err="1"/>
+              <a:t>isEvenBet</a:t>
+            </a:r>
+            <a:endParaRPr lang="en-US" dirty="0"/>
+          </a:p>
+          <a:p>
+            <a:r>
+              <a:rPr lang="en-US" dirty="0"/>
+              <a:t>amount</a:t>
+            </a:r>
+          </a:p>
+          <a:p>
+            <a:r>
+              <a:rPr lang="en-US" dirty="0" err="1"/>
+              <a:t>isWinResult</a:t>
+            </a:r>
+            <a:r>
+              <a:rPr lang="en-US" dirty="0"/>
+              <a:t>(</a:t>
+            </a:r>
+            <a:r>
+              <a:rPr lang="en-US" dirty="0" err="1"/>
+              <a:t>rollResult</a:t>
+            </a:r>
+            <a:r>
+              <a:rPr lang="en-US" dirty="0"/>
+              <a:t>)</a:t>
+            </a:r>
+          </a:p>
+          <a:p>
+            <a:r>
+              <a:rPr lang="en-US" dirty="0" err="1"/>
+              <a:t>winAmount</a:t>
+            </a:r>
+            <a:r>
+              <a:rPr lang="en-US" dirty="0"/>
+              <a:t>()</a:t>
+            </a:r>
+          </a:p>
+          <a:p>
+            <a:r>
+              <a:rPr lang="en-US" dirty="0"/>
+              <a:t>}</a:t>
+            </a:r>
+          </a:p>
+          <a:p>
+            <a:r>
+              <a:rPr lang="en-US" dirty="0" err="1"/>
+              <a:t>BettingMain</a:t>
+            </a:r>
+            <a:r>
+              <a:rPr lang="en-US" dirty="0"/>
+              <a:t> -&gt; "*" </a:t>
+            </a:r>
+            <a:r>
+              <a:rPr lang="en-US" dirty="0" err="1"/>
+              <a:t>NumberBet</a:t>
+            </a:r>
+            <a:r>
+              <a:rPr lang="en-US" dirty="0"/>
+              <a:t> </a:t>
+            </a:r>
+          </a:p>
+          <a:p>
+            <a:r>
+              <a:rPr lang="en-US" dirty="0" err="1"/>
+              <a:t>BettingMain</a:t>
+            </a:r>
+            <a:r>
+              <a:rPr lang="en-US" dirty="0"/>
+              <a:t> -&gt; "*" </a:t>
+            </a:r>
+            <a:r>
+              <a:rPr lang="en-US" dirty="0" err="1"/>
+              <a:t>OddEvenBet</a:t>
+            </a:r>
+            <a:endParaRPr lang="en-US" dirty="0"/>
+          </a:p>
+          <a:p>
+            <a:r>
+              <a:rPr lang="en-US" dirty="0"/>
+              <a:t>@</a:t>
+            </a:r>
+            <a:r>
+              <a:rPr lang="en-US" dirty="0" err="1"/>
+              <a:t>enduml</a:t>
+            </a:r>
+            <a:endParaRPr lang="en-US" dirty="0"/>
+          </a:p>
+        </p:txBody>
+      </p:sp>
+      <p:sp>
+        <p:nvSpPr>
+          <p:cNvPr id="4" name="Slide Number Placeholder 3"/>
+          <p:cNvSpPr>
+            <a:spLocks noGrp="1"/>
+          </p:cNvSpPr>
+          <p:nvPr>
+            <p:ph type="sldNum" sz="quarter" idx="10"/>
+          </p:nvPr>
+        </p:nvSpPr>
+        <p:spPr/>
+        <p:txBody>
+          <a:bodyPr/>
+          <a:lstStyle/>
+          <a:p>
+            <a:fld id="{45D9DED7-56C8-B246-9138-4CD26015242F}" type="slidenum">
+              <a:rPr lang="en-US" smtClean="0"/>
+              <a:t>14</a:t>
+            </a:fld>
+            <a:endParaRPr lang="en-US"/>
+          </a:p>
+        </p:txBody>
+      </p:sp>
+    </p:spTree>
+    <p:extLst>
+      <p:ext uri="{BB962C8B-B14F-4D97-AF65-F5344CB8AC3E}">
+        <p14:creationId xmlns:p14="http://schemas.microsoft.com/office/powerpoint/2010/main" val="1248892832"/>
+      </p:ext>
+    </p:extLst>
+  </p:cSld>
+  <p:clrMapOvr>
+    <a:masterClrMapping/>
+  </p:clrMapOvr>
+</p:notes>
+</file>
+
+<file path=ppt/notesSlides/notesSlide7.xml><?xml version="1.0" encoding="utf-8"?>
+<p:notes xmlns:a="http://schemas.openxmlformats.org/drawingml/2006/main" xmlns:r="http://schemas.openxmlformats.org/officeDocument/2006/relationships" xmlns:p="http://schemas.openxmlformats.org/presentationml/2006/main">
+  <p:cSld>
+    <p:spTree>
+      <p:nvGrpSpPr>
+        <p:cNvPr id="1" name=""/>
+        <p:cNvGrpSpPr/>
+        <p:nvPr/>
+      </p:nvGrpSpPr>
+      <p:grpSpPr>
+        <a:xfrm>
+          <a:off x="0" y="0"/>
+          <a:ext cx="0" cy="0"/>
+          <a:chOff x="0" y="0"/>
+          <a:chExt cx="0" cy="0"/>
+        </a:xfrm>
+      </p:grpSpPr>
+      <p:sp>
+        <p:nvSpPr>
+          <p:cNvPr id="2" name="Slide Image Placeholder 1"/>
+          <p:cNvSpPr>
+            <a:spLocks noGrp="1" noRot="1" noChangeAspect="1"/>
+          </p:cNvSpPr>
+          <p:nvPr>
+            <p:ph type="sldImg"/>
+          </p:nvPr>
+        </p:nvSpPr>
+        <p:spPr/>
+      </p:sp>
+      <p:sp>
+        <p:nvSpPr>
+          <p:cNvPr id="3" name="Notes Placeholder 2"/>
+          <p:cNvSpPr>
+            <a:spLocks noGrp="1"/>
+          </p:cNvSpPr>
+          <p:nvPr>
+            <p:ph type="body" idx="1"/>
+          </p:nvPr>
+        </p:nvSpPr>
+        <p:spPr/>
+        <p:txBody>
+          <a:bodyPr/>
+          <a:lstStyle/>
+          <a:p>
+            <a:r>
               <a:rPr lang="en-US" dirty="0" smtClean="0"/>
               <a:t>@</a:t>
             </a:r>
@@ -2038,7 +2125,7 @@
           <a:p>
             <a:fld id="{45D9DED7-56C8-B246-9138-4CD26015242F}" type="slidenum">
               <a:rPr lang="en-US" smtClean="0"/>
-              <a:t>13</a:t>
+              <a:t>16</a:t>
             </a:fld>
             <a:endParaRPr lang="en-US"/>
           </a:p>
@@ -2236,7 +2323,7 @@
           <a:p>
             <a:fld id="{E6E52604-4630-4861-9364-F52CA104A3D5}" type="datetimeFigureOut">
               <a:rPr lang="en-US" smtClean="0"/>
-              <a:t>4/8/2020</a:t>
+              <a:t>4/12/2020</a:t>
             </a:fld>
             <a:endParaRPr lang="en-US"/>
           </a:p>
@@ -2294,6 +2381,14 @@
   <p:clrMapOvr>
     <a:masterClrMapping/>
   </p:clrMapOvr>
+  <mc:AlternateContent xmlns:mc="http://schemas.openxmlformats.org/markup-compatibility/2006" xmlns:p14="http://schemas.microsoft.com/office/powerpoint/2010/main">
+    <mc:Choice Requires="p14">
+      <p:transition p14:dur="0"/>
+    </mc:Choice>
+    <mc:Fallback xmlns="">
+      <p:transition/>
+    </mc:Fallback>
+  </mc:AlternateContent>
 </p:sldLayout>
 </file>
 
@@ -2404,7 +2499,7 @@
           <a:p>
             <a:fld id="{E6E52604-4630-4861-9364-F52CA104A3D5}" type="datetimeFigureOut">
               <a:rPr lang="en-US" smtClean="0"/>
-              <a:t>4/8/2020</a:t>
+              <a:t>4/12/2020</a:t>
             </a:fld>
             <a:endParaRPr lang="en-US"/>
           </a:p>
@@ -2462,6 +2557,14 @@
   <p:clrMapOvr>
     <a:masterClrMapping/>
   </p:clrMapOvr>
+  <mc:AlternateContent xmlns:mc="http://schemas.openxmlformats.org/markup-compatibility/2006" xmlns:p14="http://schemas.microsoft.com/office/powerpoint/2010/main">
+    <mc:Choice Requires="p14">
+      <p:transition p14:dur="0"/>
+    </mc:Choice>
+    <mc:Fallback xmlns="">
+      <p:transition/>
+    </mc:Fallback>
+  </mc:AlternateContent>
 </p:sldLayout>
 </file>
 
@@ -2582,7 +2685,7 @@
           <a:p>
             <a:fld id="{E6E52604-4630-4861-9364-F52CA104A3D5}" type="datetimeFigureOut">
               <a:rPr lang="en-US" smtClean="0"/>
-              <a:t>4/8/2020</a:t>
+              <a:t>4/12/2020</a:t>
             </a:fld>
             <a:endParaRPr lang="en-US"/>
           </a:p>
@@ -2640,6 +2743,14 @@
   <p:clrMapOvr>
     <a:masterClrMapping/>
   </p:clrMapOvr>
+  <mc:AlternateContent xmlns:mc="http://schemas.openxmlformats.org/markup-compatibility/2006" xmlns:p14="http://schemas.microsoft.com/office/powerpoint/2010/main">
+    <mc:Choice Requires="p14">
+      <p:transition p14:dur="0"/>
+    </mc:Choice>
+    <mc:Fallback xmlns="">
+      <p:transition/>
+    </mc:Fallback>
+  </mc:AlternateContent>
 </p:sldLayout>
 </file>
 
@@ -2750,7 +2861,7 @@
           <a:p>
             <a:fld id="{E6E52604-4630-4861-9364-F52CA104A3D5}" type="datetimeFigureOut">
               <a:rPr lang="en-US" smtClean="0"/>
-              <a:t>4/8/2020</a:t>
+              <a:t>4/12/2020</a:t>
             </a:fld>
             <a:endParaRPr lang="en-US"/>
           </a:p>
@@ -2808,6 +2919,14 @@
   <p:clrMapOvr>
     <a:masterClrMapping/>
   </p:clrMapOvr>
+  <mc:AlternateContent xmlns:mc="http://schemas.openxmlformats.org/markup-compatibility/2006" xmlns:p14="http://schemas.microsoft.com/office/powerpoint/2010/main">
+    <mc:Choice Requires="p14">
+      <p:transition p14:dur="0"/>
+    </mc:Choice>
+    <mc:Fallback xmlns="">
+      <p:transition/>
+    </mc:Fallback>
+  </mc:AlternateContent>
 </p:sldLayout>
 </file>
 
@@ -2995,7 +3114,7 @@
           <a:p>
             <a:fld id="{E6E52604-4630-4861-9364-F52CA104A3D5}" type="datetimeFigureOut">
               <a:rPr lang="en-US" smtClean="0"/>
-              <a:t>4/8/2020</a:t>
+              <a:t>4/12/2020</a:t>
             </a:fld>
             <a:endParaRPr lang="en-US"/>
           </a:p>
@@ -3053,6 +3172,14 @@
   <p:clrMapOvr>
     <a:masterClrMapping/>
   </p:clrMapOvr>
+  <mc:AlternateContent xmlns:mc="http://schemas.openxmlformats.org/markup-compatibility/2006" xmlns:p14="http://schemas.microsoft.com/office/powerpoint/2010/main">
+    <mc:Choice Requires="p14">
+      <p:transition p14:dur="0"/>
+    </mc:Choice>
+    <mc:Fallback xmlns="">
+      <p:transition/>
+    </mc:Fallback>
+  </mc:AlternateContent>
 </p:sldLayout>
 </file>
 
@@ -3280,7 +3407,7 @@
           <a:p>
             <a:fld id="{E6E52604-4630-4861-9364-F52CA104A3D5}" type="datetimeFigureOut">
               <a:rPr lang="en-US" smtClean="0"/>
-              <a:t>4/8/2020</a:t>
+              <a:t>4/12/2020</a:t>
             </a:fld>
             <a:endParaRPr lang="en-US"/>
           </a:p>
@@ -3338,6 +3465,14 @@
   <p:clrMapOvr>
     <a:masterClrMapping/>
   </p:clrMapOvr>
+  <mc:AlternateContent xmlns:mc="http://schemas.openxmlformats.org/markup-compatibility/2006" xmlns:p14="http://schemas.microsoft.com/office/powerpoint/2010/main">
+    <mc:Choice Requires="p14">
+      <p:transition p14:dur="0"/>
+    </mc:Choice>
+    <mc:Fallback xmlns="">
+      <p:transition/>
+    </mc:Fallback>
+  </mc:AlternateContent>
 </p:sldLayout>
 </file>
 
@@ -3699,7 +3834,7 @@
           <a:p>
             <a:fld id="{E6E52604-4630-4861-9364-F52CA104A3D5}" type="datetimeFigureOut">
               <a:rPr lang="en-US" smtClean="0"/>
-              <a:t>4/8/2020</a:t>
+              <a:t>4/12/2020</a:t>
             </a:fld>
             <a:endParaRPr lang="en-US"/>
           </a:p>
@@ -3757,6 +3892,14 @@
   <p:clrMapOvr>
     <a:masterClrMapping/>
   </p:clrMapOvr>
+  <mc:AlternateContent xmlns:mc="http://schemas.openxmlformats.org/markup-compatibility/2006" xmlns:p14="http://schemas.microsoft.com/office/powerpoint/2010/main">
+    <mc:Choice Requires="p14">
+      <p:transition p14:dur="0"/>
+    </mc:Choice>
+    <mc:Fallback xmlns="">
+      <p:transition/>
+    </mc:Fallback>
+  </mc:AlternateContent>
 </p:sldLayout>
 </file>
 
@@ -3816,7 +3959,7 @@
           <a:p>
             <a:fld id="{E6E52604-4630-4861-9364-F52CA104A3D5}" type="datetimeFigureOut">
               <a:rPr lang="en-US" smtClean="0"/>
-              <a:t>4/8/2020</a:t>
+              <a:t>4/12/2020</a:t>
             </a:fld>
             <a:endParaRPr lang="en-US"/>
           </a:p>
@@ -3874,6 +4017,14 @@
   <p:clrMapOvr>
     <a:masterClrMapping/>
   </p:clrMapOvr>
+  <mc:AlternateContent xmlns:mc="http://schemas.openxmlformats.org/markup-compatibility/2006" xmlns:p14="http://schemas.microsoft.com/office/powerpoint/2010/main">
+    <mc:Choice Requires="p14">
+      <p:transition p14:dur="0"/>
+    </mc:Choice>
+    <mc:Fallback xmlns="">
+      <p:transition/>
+    </mc:Fallback>
+  </mc:AlternateContent>
 </p:sldLayout>
 </file>
 
@@ -3911,7 +4062,7 @@
           <a:p>
             <a:fld id="{E6E52604-4630-4861-9364-F52CA104A3D5}" type="datetimeFigureOut">
               <a:rPr lang="en-US" smtClean="0"/>
-              <a:t>4/8/2020</a:t>
+              <a:t>4/12/2020</a:t>
             </a:fld>
             <a:endParaRPr lang="en-US"/>
           </a:p>
@@ -3969,6 +4120,14 @@
   <p:clrMapOvr>
     <a:masterClrMapping/>
   </p:clrMapOvr>
+  <mc:AlternateContent xmlns:mc="http://schemas.openxmlformats.org/markup-compatibility/2006" xmlns:p14="http://schemas.microsoft.com/office/powerpoint/2010/main">
+    <mc:Choice Requires="p14">
+      <p:transition p14:dur="0"/>
+    </mc:Choice>
+    <mc:Fallback xmlns="">
+      <p:transition/>
+    </mc:Fallback>
+  </mc:AlternateContent>
 </p:sldLayout>
 </file>
 
@@ -4186,7 +4345,7 @@
           <a:p>
             <a:fld id="{E6E52604-4630-4861-9364-F52CA104A3D5}" type="datetimeFigureOut">
               <a:rPr lang="en-US" smtClean="0"/>
-              <a:t>4/8/2020</a:t>
+              <a:t>4/12/2020</a:t>
             </a:fld>
             <a:endParaRPr lang="en-US"/>
           </a:p>
@@ -4244,6 +4403,14 @@
   <p:clrMapOvr>
     <a:masterClrMapping/>
   </p:clrMapOvr>
+  <mc:AlternateContent xmlns:mc="http://schemas.openxmlformats.org/markup-compatibility/2006" xmlns:p14="http://schemas.microsoft.com/office/powerpoint/2010/main">
+    <mc:Choice Requires="p14">
+      <p:transition p14:dur="0"/>
+    </mc:Choice>
+    <mc:Fallback xmlns="">
+      <p:transition/>
+    </mc:Fallback>
+  </mc:AlternateContent>
 </p:sldLayout>
 </file>
 
@@ -4438,7 +4605,7 @@
           <a:p>
             <a:fld id="{E6E52604-4630-4861-9364-F52CA104A3D5}" type="datetimeFigureOut">
               <a:rPr lang="en-US" smtClean="0"/>
-              <a:t>4/8/2020</a:t>
+              <a:t>4/12/2020</a:t>
             </a:fld>
             <a:endParaRPr lang="en-US"/>
           </a:p>
@@ -4496,6 +4663,14 @@
   <p:clrMapOvr>
     <a:masterClrMapping/>
   </p:clrMapOvr>
+  <mc:AlternateContent xmlns:mc="http://schemas.openxmlformats.org/markup-compatibility/2006" xmlns:p14="http://schemas.microsoft.com/office/powerpoint/2010/main">
+    <mc:Choice Requires="p14">
+      <p:transition p14:dur="0"/>
+    </mc:Choice>
+    <mc:Fallback xmlns="">
+      <p:transition/>
+    </mc:Fallback>
+  </mc:AlternateContent>
 </p:sldLayout>
 </file>
 
@@ -4649,7 +4824,7 @@
           <a:p>
             <a:fld id="{E6E52604-4630-4861-9364-F52CA104A3D5}" type="datetimeFigureOut">
               <a:rPr lang="en-US" smtClean="0"/>
-              <a:t>4/8/2020</a:t>
+              <a:t>4/12/2020</a:t>
             </a:fld>
             <a:endParaRPr lang="en-US"/>
           </a:p>
@@ -4754,6 +4929,14 @@
     <p:sldLayoutId id="2147483658" r:id="rId10"/>
     <p:sldLayoutId id="2147483659" r:id="rId11"/>
   </p:sldLayoutIdLst>
+  <mc:AlternateContent xmlns:mc="http://schemas.openxmlformats.org/markup-compatibility/2006" xmlns:p14="http://schemas.microsoft.com/office/powerpoint/2010/main">
+    <mc:Choice Requires="p14">
+      <p:transition p14:dur="0"/>
+    </mc:Choice>
+    <mc:Fallback xmlns="">
+      <p:transition/>
+    </mc:Fallback>
+  </mc:AlternateContent>
   <p:txStyles>
     <p:titleStyle>
       <a:lvl1pPr algn="ctr" defTabSz="914400" rtl="0" eaLnBrk="1" latinLnBrk="0" hangingPunct="1">
@@ -5153,6 +5336,21 @@
   <p:clrMapOvr>
     <a:masterClrMapping/>
   </p:clrMapOvr>
+  <mc:AlternateContent xmlns:mc="http://schemas.openxmlformats.org/markup-compatibility/2006" xmlns:p14="http://schemas.microsoft.com/office/powerpoint/2010/main">
+    <mc:Choice Requires="p14">
+      <p:transition p14:dur="0"/>
+    </mc:Choice>
+    <mc:Fallback xmlns="">
+      <p:transition/>
+    </mc:Fallback>
+  </mc:AlternateContent>
+  <p:timing>
+    <p:tnLst>
+      <p:par>
+        <p:cTn id="1" dur="indefinite" restart="never" nodeType="tmRoot"/>
+      </p:par>
+    </p:tnLst>
+  </p:timing>
 </p:sld>
 </file>
 
@@ -5175,6 +5373,452 @@
       </p:grpSpPr>
       <p:sp>
         <p:nvSpPr>
+          <p:cNvPr id="2" name="Content Placeholder 1"/>
+          <p:cNvSpPr>
+            <a:spLocks noGrp="1"/>
+          </p:cNvSpPr>
+          <p:nvPr>
+            <p:ph idx="1"/>
+          </p:nvPr>
+        </p:nvSpPr>
+        <p:spPr/>
+        <p:txBody>
+          <a:bodyPr>
+            <a:normAutofit lnSpcReduction="10000"/>
+          </a:bodyPr>
+          <a:lstStyle/>
+          <a:p>
+            <a:r>
+              <a:rPr lang="en-US" dirty="0"/>
+              <a:t>Save every solution we find to sub-problems</a:t>
+            </a:r>
+          </a:p>
+          <a:p>
+            <a:endParaRPr lang="en-US" dirty="0"/>
+          </a:p>
+          <a:p>
+            <a:r>
+              <a:rPr lang="en-US" dirty="0"/>
+              <a:t>Before recursively computing a solution:</a:t>
+            </a:r>
+          </a:p>
+          <a:p>
+            <a:pPr lvl="1"/>
+            <a:r>
+              <a:rPr lang="en-US" dirty="0"/>
+              <a:t>Look it up</a:t>
+            </a:r>
+          </a:p>
+          <a:p>
+            <a:pPr lvl="1"/>
+            <a:r>
+              <a:rPr lang="en-US" dirty="0"/>
+              <a:t>If found, use it</a:t>
+            </a:r>
+          </a:p>
+          <a:p>
+            <a:pPr lvl="1"/>
+            <a:r>
+              <a:rPr lang="en-US" dirty="0"/>
+              <a:t>Otherwise do the recursive computation</a:t>
+            </a:r>
+          </a:p>
+          <a:p>
+            <a:pPr lvl="1"/>
+            <a:endParaRPr lang="en-US" dirty="0"/>
+          </a:p>
+          <a:p>
+            <a:r>
+              <a:rPr lang="en-US" dirty="0"/>
+              <a:t>Study the memoization code in the </a:t>
+            </a:r>
+            <a:r>
+              <a:rPr lang="en-US" dirty="0" err="1">
+                <a:solidFill>
+                  <a:srgbClr val="F79646"/>
+                </a:solidFill>
+              </a:rPr>
+              <a:t>RecursiveHelperFunctions</a:t>
+            </a:r>
+            <a:r>
+              <a:rPr lang="en-US" dirty="0">
+                <a:solidFill>
+                  <a:srgbClr val="F79646"/>
+                </a:solidFill>
+              </a:rPr>
+              <a:t> </a:t>
+            </a:r>
+            <a:r>
+              <a:rPr lang="en-US" dirty="0"/>
+              <a:t>project</a:t>
+            </a:r>
+          </a:p>
+          <a:p>
+            <a:pPr lvl="1"/>
+            <a:endParaRPr lang="en-US" dirty="0"/>
+          </a:p>
+          <a:p>
+            <a:endParaRPr lang="en-US" dirty="0"/>
+          </a:p>
+        </p:txBody>
+      </p:sp>
+      <p:sp>
+        <p:nvSpPr>
+          <p:cNvPr id="3" name="Title 2"/>
+          <p:cNvSpPr>
+            <a:spLocks noGrp="1"/>
+          </p:cNvSpPr>
+          <p:nvPr>
+            <p:ph type="title"/>
+          </p:nvPr>
+        </p:nvSpPr>
+        <p:spPr/>
+        <p:txBody>
+          <a:bodyPr/>
+          <a:lstStyle/>
+          <a:p>
+            <a:r>
+              <a:rPr lang="en-US" dirty="0"/>
+              <a:t>Memoization</a:t>
+            </a:r>
+          </a:p>
+        </p:txBody>
+      </p:sp>
+    </p:spTree>
+    <p:extLst>
+      <p:ext uri="{BB962C8B-B14F-4D97-AF65-F5344CB8AC3E}">
+        <p14:creationId xmlns:p14="http://schemas.microsoft.com/office/powerpoint/2010/main" val="3349563426"/>
+      </p:ext>
+    </p:extLst>
+  </p:cSld>
+  <p:clrMapOvr>
+    <a:masterClrMapping/>
+  </p:clrMapOvr>
+  <mc:AlternateContent xmlns:mc="http://schemas.openxmlformats.org/markup-compatibility/2006" xmlns:p14="http://schemas.microsoft.com/office/powerpoint/2010/main">
+    <mc:Choice Requires="p14">
+      <p:transition p14:dur="0"/>
+    </mc:Choice>
+    <mc:Fallback xmlns="">
+      <p:transition/>
+    </mc:Fallback>
+  </mc:AlternateContent>
+  <p:timing>
+    <p:tnLst>
+      <p:par>
+        <p:cTn id="1" dur="indefinite" restart="never" nodeType="tmRoot"/>
+      </p:par>
+    </p:tnLst>
+  </p:timing>
+</p:sld>
+</file>
+
+<file path=ppt/slides/slide11.xml><?xml version="1.0" encoding="utf-8"?>
+<p:sld xmlns:a="http://schemas.openxmlformats.org/drawingml/2006/main" xmlns:r="http://schemas.openxmlformats.org/officeDocument/2006/relationships" xmlns:p="http://schemas.openxmlformats.org/presentationml/2006/main" show="0">
+  <p:cSld>
+    <p:spTree>
+      <p:nvGrpSpPr>
+        <p:cNvPr id="1" name=""/>
+        <p:cNvGrpSpPr/>
+        <p:nvPr/>
+      </p:nvGrpSpPr>
+      <p:grpSpPr>
+        <a:xfrm>
+          <a:off x="0" y="0"/>
+          <a:ext cx="0" cy="0"/>
+          <a:chOff x="0" y="0"/>
+          <a:chExt cx="0" cy="0"/>
+        </a:xfrm>
+      </p:grpSpPr>
+      <p:sp>
+        <p:nvSpPr>
+          <p:cNvPr id="2" name="Title 1"/>
+          <p:cNvSpPr>
+            <a:spLocks noGrp="1"/>
+          </p:cNvSpPr>
+          <p:nvPr>
+            <p:ph type="title"/>
+          </p:nvPr>
+        </p:nvSpPr>
+        <p:spPr/>
+        <p:txBody>
+          <a:bodyPr/>
+          <a:lstStyle/>
+          <a:p>
+            <a:r>
+              <a:rPr lang="en-US" dirty="0" err="1"/>
+              <a:t>BettingInterfaces</a:t>
+            </a:r>
+            <a:endParaRPr lang="en-US" dirty="0"/>
+          </a:p>
+        </p:txBody>
+      </p:sp>
+      <p:sp>
+        <p:nvSpPr>
+          <p:cNvPr id="3" name="Content Placeholder 2"/>
+          <p:cNvSpPr>
+            <a:spLocks noGrp="1"/>
+          </p:cNvSpPr>
+          <p:nvPr>
+            <p:ph idx="1"/>
+          </p:nvPr>
+        </p:nvSpPr>
+        <p:spPr>
+          <a:xfrm>
+            <a:off x="457200" y="1600200"/>
+            <a:ext cx="8229600" cy="5029200"/>
+          </a:xfrm>
+        </p:spPr>
+        <p:txBody>
+          <a:bodyPr>
+            <a:normAutofit fontScale="92500" lnSpcReduction="10000"/>
+          </a:bodyPr>
+          <a:lstStyle/>
+          <a:p>
+            <a:r>
+              <a:rPr lang="en-US" dirty="0"/>
+              <a:t>Get in groups of 2-3…no one working alone</a:t>
+            </a:r>
+          </a:p>
+          <a:p>
+            <a:r>
+              <a:rPr lang="en-US" dirty="0"/>
+              <a:t>Understand the given code, the duplication, plus the additional features you will be adding.  Look at 3 TODOs in </a:t>
+            </a:r>
+            <a:r>
+              <a:rPr lang="en-US" dirty="0" err="1"/>
+              <a:t>BettingMain</a:t>
+            </a:r>
+            <a:r>
+              <a:rPr lang="en-US" dirty="0"/>
+              <a:t>.</a:t>
+            </a:r>
+          </a:p>
+          <a:p>
+            <a:r>
+              <a:rPr lang="en-US" dirty="0"/>
+              <a:t>Design a solution for all 3 TODOs using interfaces and make a UML diagram describing it</a:t>
+            </a:r>
+          </a:p>
+          <a:p>
+            <a:r>
+              <a:rPr lang="en-US" dirty="0"/>
+              <a:t>Get myself or a TA to check out your UML</a:t>
+            </a:r>
+          </a:p>
+          <a:p>
+            <a:r>
+              <a:rPr lang="en-US" dirty="0"/>
+              <a:t>Once we sign off – start coding </a:t>
+            </a:r>
+          </a:p>
+          <a:p>
+            <a:pPr lvl="1"/>
+            <a:r>
+              <a:rPr lang="en-US" dirty="0"/>
+              <a:t>You only need 1 computer for this one.  </a:t>
+            </a:r>
+          </a:p>
+          <a:p>
+            <a:pPr lvl="1"/>
+            <a:r>
+              <a:rPr lang="en-US" dirty="0"/>
+              <a:t>I recommend you do each TODO one by one rather than doing everything in one go</a:t>
+            </a:r>
+          </a:p>
+          <a:p>
+            <a:endParaRPr lang="en-US" dirty="0"/>
+          </a:p>
+        </p:txBody>
+      </p:sp>
+    </p:spTree>
+    <p:extLst>
+      <p:ext uri="{BB962C8B-B14F-4D97-AF65-F5344CB8AC3E}">
+        <p14:creationId xmlns:p14="http://schemas.microsoft.com/office/powerpoint/2010/main" val="3585860032"/>
+      </p:ext>
+    </p:extLst>
+  </p:cSld>
+  <p:clrMapOvr>
+    <a:masterClrMapping/>
+  </p:clrMapOvr>
+  <mc:AlternateContent xmlns:mc="http://schemas.openxmlformats.org/markup-compatibility/2006">
+    <mc:Choice xmlns:p14="http://schemas.microsoft.com/office/powerpoint/2010/main" Requires="p14">
+      <p:transition p14:dur="0"/>
+    </mc:Choice>
+    <mc:Fallback>
+      <p:transition/>
+    </mc:Fallback>
+  </mc:AlternateContent>
+  <p:timing>
+    <p:tnLst>
+      <p:par>
+        <p:cTn id="1" dur="indefinite" restart="never" nodeType="tmRoot"/>
+      </p:par>
+    </p:tnLst>
+  </p:timing>
+</p:sld>
+</file>
+
+<file path=ppt/slides/slide12.xml><?xml version="1.0" encoding="utf-8"?>
+<p:sld xmlns:a="http://schemas.openxmlformats.org/drawingml/2006/main" xmlns:r="http://schemas.openxmlformats.org/officeDocument/2006/relationships" xmlns:p="http://schemas.openxmlformats.org/presentationml/2006/main">
+  <p:cSld>
+    <p:spTree>
+      <p:nvGrpSpPr>
+        <p:cNvPr id="1" name=""/>
+        <p:cNvGrpSpPr/>
+        <p:nvPr/>
+      </p:nvGrpSpPr>
+      <p:grpSpPr>
+        <a:xfrm>
+          <a:off x="0" y="0"/>
+          <a:ext cx="0" cy="0"/>
+          <a:chOff x="0" y="0"/>
+          <a:chExt cx="0" cy="0"/>
+        </a:xfrm>
+      </p:grpSpPr>
+      <p:sp>
+        <p:nvSpPr>
+          <p:cNvPr id="2" name="Title 1"/>
+          <p:cNvSpPr>
+            <a:spLocks noGrp="1"/>
+          </p:cNvSpPr>
+          <p:nvPr>
+            <p:ph type="title"/>
+          </p:nvPr>
+        </p:nvSpPr>
+        <p:spPr/>
+        <p:txBody>
+          <a:bodyPr/>
+          <a:lstStyle/>
+          <a:p>
+            <a:r>
+              <a:rPr lang="en-US" dirty="0" err="1"/>
+              <a:t>BettingInterfaces</a:t>
+            </a:r>
+            <a:endParaRPr lang="en-US" dirty="0"/>
+          </a:p>
+        </p:txBody>
+      </p:sp>
+      <p:sp>
+        <p:nvSpPr>
+          <p:cNvPr id="3" name="Content Placeholder 2"/>
+          <p:cNvSpPr>
+            <a:spLocks noGrp="1"/>
+          </p:cNvSpPr>
+          <p:nvPr>
+            <p:ph idx="1"/>
+          </p:nvPr>
+        </p:nvSpPr>
+        <p:spPr>
+          <a:xfrm>
+            <a:off x="457200" y="1600200"/>
+            <a:ext cx="8229600" cy="5029200"/>
+          </a:xfrm>
+        </p:spPr>
+        <p:txBody>
+          <a:bodyPr>
+            <a:normAutofit fontScale="92500" lnSpcReduction="10000"/>
+          </a:bodyPr>
+          <a:lstStyle/>
+          <a:p>
+            <a:r>
+              <a:rPr lang="en-US" dirty="0" smtClean="0"/>
+              <a:t>If you can, work with a classmate (some have been arranged, others not yet)</a:t>
+            </a:r>
+            <a:endParaRPr lang="en-US" dirty="0"/>
+          </a:p>
+          <a:p>
+            <a:r>
+              <a:rPr lang="en-US" dirty="0"/>
+              <a:t>Understand the given code, the duplication, plus the additional features you will be adding.  Look at 3 TODOs in </a:t>
+            </a:r>
+            <a:r>
+              <a:rPr lang="en-US" dirty="0" err="1"/>
+              <a:t>BettingMain</a:t>
+            </a:r>
+            <a:r>
+              <a:rPr lang="en-US" dirty="0"/>
+              <a:t>.</a:t>
+            </a:r>
+          </a:p>
+          <a:p>
+            <a:r>
+              <a:rPr lang="en-US" dirty="0"/>
+              <a:t>Design a solution for all 3 TODOs using interfaces and make a UML diagram describing </a:t>
+            </a:r>
+            <a:r>
+              <a:rPr lang="en-US" dirty="0" smtClean="0"/>
+              <a:t>it</a:t>
+            </a:r>
+          </a:p>
+          <a:p>
+            <a:r>
+              <a:rPr lang="en-US" dirty="0" smtClean="0"/>
+              <a:t>Compare your UML solution to the final solution BEFORE you start coding</a:t>
+            </a:r>
+            <a:endParaRPr lang="en-US" dirty="0"/>
+          </a:p>
+          <a:p>
+            <a:r>
+              <a:rPr lang="en-US" dirty="0" smtClean="0"/>
+              <a:t>I </a:t>
+            </a:r>
+            <a:r>
+              <a:rPr lang="en-US" dirty="0"/>
+              <a:t>recommend you do each TODO one by one rather than doing everything in one go</a:t>
+            </a:r>
+          </a:p>
+          <a:p>
+            <a:endParaRPr lang="en-US" dirty="0"/>
+          </a:p>
+        </p:txBody>
+      </p:sp>
+    </p:spTree>
+    <p:extLst>
+      <p:ext uri="{BB962C8B-B14F-4D97-AF65-F5344CB8AC3E}">
+        <p14:creationId xmlns:p14="http://schemas.microsoft.com/office/powerpoint/2010/main" val="4101944219"/>
+      </p:ext>
+    </p:extLst>
+  </p:cSld>
+  <p:clrMapOvr>
+    <a:masterClrMapping/>
+  </p:clrMapOvr>
+  <mc:AlternateContent xmlns:mc="http://schemas.openxmlformats.org/markup-compatibility/2006" xmlns:p14="http://schemas.microsoft.com/office/powerpoint/2010/main">
+    <mc:Choice Requires="p14">
+      <p:transition p14:dur="0"/>
+    </mc:Choice>
+    <mc:Fallback xmlns="">
+      <p:transition/>
+    </mc:Fallback>
+  </mc:AlternateContent>
+  <p:timing>
+    <p:tnLst>
+      <p:par>
+        <p:cTn id="1" dur="indefinite" restart="never" nodeType="tmRoot"/>
+      </p:par>
+    </p:tnLst>
+  </p:timing>
+</p:sld>
+</file>
+
+<file path=ppt/slides/slide13.xml><?xml version="1.0" encoding="utf-8"?>
+<p:sld xmlns:a="http://schemas.openxmlformats.org/drawingml/2006/main" xmlns:r="http://schemas.openxmlformats.org/officeDocument/2006/relationships" xmlns:p="http://schemas.openxmlformats.org/presentationml/2006/main">
+  <p:cSld>
+    <p:spTree>
+      <p:nvGrpSpPr>
+        <p:cNvPr id="1" name=""/>
+        <p:cNvGrpSpPr/>
+        <p:nvPr/>
+      </p:nvGrpSpPr>
+      <p:grpSpPr>
+        <a:xfrm>
+          <a:off x="0" y="0"/>
+          <a:ext cx="0" cy="0"/>
+          <a:chOff x="0" y="0"/>
+          <a:chExt cx="0" cy="0"/>
+        </a:xfrm>
+      </p:grpSpPr>
+      <p:sp>
+        <p:nvSpPr>
           <p:cNvPr id="2" name="Title 1"/>
           <p:cNvSpPr>
             <a:spLocks noGrp="1"/>
@@ -5233,10 +5877,25 @@
   <p:clrMapOvr>
     <a:masterClrMapping/>
   </p:clrMapOvr>
+  <mc:AlternateContent xmlns:mc="http://schemas.openxmlformats.org/markup-compatibility/2006" xmlns:p14="http://schemas.microsoft.com/office/powerpoint/2010/main">
+    <mc:Choice Requires="p14">
+      <p:transition p14:dur="0"/>
+    </mc:Choice>
+    <mc:Fallback xmlns="">
+      <p:transition/>
+    </mc:Fallback>
+  </mc:AlternateContent>
+  <p:timing>
+    <p:tnLst>
+      <p:par>
+        <p:cTn id="1" dur="indefinite" restart="never" nodeType="tmRoot"/>
+      </p:par>
+    </p:tnLst>
+  </p:timing>
 </p:sld>
 </file>
 
-<file path=ppt/slides/slide11.xml><?xml version="1.0" encoding="utf-8"?>
+<file path=ppt/slides/slide14.xml><?xml version="1.0" encoding="utf-8"?>
 <p:sld xmlns:a="http://schemas.openxmlformats.org/drawingml/2006/main" xmlns:r="http://schemas.openxmlformats.org/officeDocument/2006/relationships" xmlns:p="http://schemas.openxmlformats.org/presentationml/2006/main">
   <p:cSld>
     <p:spTree>
@@ -5361,10 +6020,25 @@
   <p:clrMapOvr>
     <a:masterClrMapping/>
   </p:clrMapOvr>
+  <mc:AlternateContent xmlns:mc="http://schemas.openxmlformats.org/markup-compatibility/2006" xmlns:p14="http://schemas.microsoft.com/office/powerpoint/2010/main">
+    <mc:Choice Requires="p14">
+      <p:transition p14:dur="0"/>
+    </mc:Choice>
+    <mc:Fallback xmlns="">
+      <p:transition/>
+    </mc:Fallback>
+  </mc:AlternateContent>
+  <p:timing>
+    <p:tnLst>
+      <p:par>
+        <p:cTn id="1" dur="indefinite" restart="never" nodeType="tmRoot"/>
+      </p:par>
+    </p:tnLst>
+  </p:timing>
 </p:sld>
 </file>
 
-<file path=ppt/slides/slide12.xml><?xml version="1.0" encoding="utf-8"?>
+<file path=ppt/slides/slide15.xml><?xml version="1.0" encoding="utf-8"?>
 <p:sld xmlns:a="http://schemas.openxmlformats.org/drawingml/2006/main" xmlns:r="http://schemas.openxmlformats.org/officeDocument/2006/relationships" xmlns:p="http://schemas.openxmlformats.org/presentationml/2006/main">
   <p:cSld>
     <p:spTree>
@@ -5464,10 +6138,25 @@
   <p:clrMapOvr>
     <a:masterClrMapping/>
   </p:clrMapOvr>
+  <mc:AlternateContent xmlns:mc="http://schemas.openxmlformats.org/markup-compatibility/2006" xmlns:p14="http://schemas.microsoft.com/office/powerpoint/2010/main">
+    <mc:Choice Requires="p14">
+      <p:transition p14:dur="0"/>
+    </mc:Choice>
+    <mc:Fallback xmlns="">
+      <p:transition/>
+    </mc:Fallback>
+  </mc:AlternateContent>
+  <p:timing>
+    <p:tnLst>
+      <p:par>
+        <p:cTn id="1" dur="indefinite" restart="never" nodeType="tmRoot"/>
+      </p:par>
+    </p:tnLst>
+  </p:timing>
 </p:sld>
 </file>
 
-<file path=ppt/slides/slide13.xml><?xml version="1.0" encoding="utf-8"?>
+<file path=ppt/slides/slide16.xml><?xml version="1.0" encoding="utf-8"?>
 <p:sld xmlns:a="http://schemas.openxmlformats.org/drawingml/2006/main" xmlns:r="http://schemas.openxmlformats.org/officeDocument/2006/relationships" xmlns:p="http://schemas.openxmlformats.org/presentationml/2006/main">
   <p:cSld>
     <p:spTree>
@@ -5660,6 +6349,21 @@
   <p:clrMapOvr>
     <a:masterClrMapping/>
   </p:clrMapOvr>
+  <mc:AlternateContent xmlns:mc="http://schemas.openxmlformats.org/markup-compatibility/2006" xmlns:p14="http://schemas.microsoft.com/office/powerpoint/2010/main">
+    <mc:Choice Requires="p14">
+      <p:transition p14:dur="0"/>
+    </mc:Choice>
+    <mc:Fallback xmlns="">
+      <p:transition/>
+    </mc:Fallback>
+  </mc:AlternateContent>
+  <p:timing>
+    <p:tnLst>
+      <p:par>
+        <p:cTn id="1" dur="indefinite" restart="never" nodeType="tmRoot"/>
+      </p:par>
+    </p:tnLst>
+  </p:timing>
 </p:sld>
 </file>
 
@@ -5787,6 +6491,21 @@
   <p:clrMapOvr>
     <a:masterClrMapping/>
   </p:clrMapOvr>
+  <mc:AlternateContent xmlns:mc="http://schemas.openxmlformats.org/markup-compatibility/2006" xmlns:p14="http://schemas.microsoft.com/office/powerpoint/2010/main">
+    <mc:Choice Requires="p14">
+      <p:transition p14:dur="0"/>
+    </mc:Choice>
+    <mc:Fallback xmlns="">
+      <p:transition/>
+    </mc:Fallback>
+  </mc:AlternateContent>
+  <p:timing>
+    <p:tnLst>
+      <p:par>
+        <p:cTn id="1" dur="indefinite" restart="never" nodeType="tmRoot"/>
+      </p:par>
+    </p:tnLst>
+  </p:timing>
 </p:sld>
 </file>
 
@@ -5906,6 +6625,21 @@
   <p:clrMapOvr>
     <a:masterClrMapping/>
   </p:clrMapOvr>
+  <mc:AlternateContent xmlns:mc="http://schemas.openxmlformats.org/markup-compatibility/2006" xmlns:p14="http://schemas.microsoft.com/office/powerpoint/2010/main">
+    <mc:Choice Requires="p14">
+      <p:transition p14:dur="0"/>
+    </mc:Choice>
+    <mc:Fallback xmlns="">
+      <p:transition/>
+    </mc:Fallback>
+  </mc:AlternateContent>
+  <p:timing>
+    <p:tnLst>
+      <p:par>
+        <p:cTn id="1" dur="indefinite" restart="never" nodeType="tmRoot"/>
+      </p:par>
+    </p:tnLst>
+  </p:timing>
 </p:sld>
 </file>
 
@@ -6075,6 +6809,21 @@
   <p:clrMapOvr>
     <a:masterClrMapping/>
   </p:clrMapOvr>
+  <mc:AlternateContent xmlns:mc="http://schemas.openxmlformats.org/markup-compatibility/2006" xmlns:p14="http://schemas.microsoft.com/office/powerpoint/2010/main">
+    <mc:Choice Requires="p14">
+      <p:transition p14:dur="0"/>
+    </mc:Choice>
+    <mc:Fallback xmlns="">
+      <p:transition/>
+    </mc:Fallback>
+  </mc:AlternateContent>
+  <p:timing>
+    <p:tnLst>
+      <p:par>
+        <p:cTn id="1" dur="indefinite" restart="never" nodeType="tmRoot"/>
+      </p:par>
+    </p:tnLst>
+  </p:timing>
 </p:sld>
 </file>
 
@@ -6165,6 +6914,21 @@
   <p:clrMapOvr>
     <a:masterClrMapping/>
   </p:clrMapOvr>
+  <mc:AlternateContent xmlns:mc="http://schemas.openxmlformats.org/markup-compatibility/2006" xmlns:p14="http://schemas.microsoft.com/office/powerpoint/2010/main">
+    <mc:Choice Requires="p14">
+      <p:transition p14:dur="0"/>
+    </mc:Choice>
+    <mc:Fallback xmlns="">
+      <p:transition/>
+    </mc:Fallback>
+  </mc:AlternateContent>
+  <p:timing>
+    <p:tnLst>
+      <p:par>
+        <p:cTn id="1" dur="indefinite" restart="never" nodeType="tmRoot"/>
+      </p:par>
+    </p:tnLst>
+  </p:timing>
 </p:sld>
 </file>
 
@@ -6241,6 +7005,21 @@
   <p:clrMapOvr>
     <a:masterClrMapping/>
   </p:clrMapOvr>
+  <mc:AlternateContent xmlns:mc="http://schemas.openxmlformats.org/markup-compatibility/2006" xmlns:p14="http://schemas.microsoft.com/office/powerpoint/2010/main">
+    <mc:Choice Requires="p14">
+      <p:transition p14:dur="0"/>
+    </mc:Choice>
+    <mc:Fallback xmlns="">
+      <p:transition/>
+    </mc:Fallback>
+  </mc:AlternateContent>
+  <p:timing>
+    <p:tnLst>
+      <p:par>
+        <p:cTn id="1" dur="indefinite" restart="never" nodeType="tmRoot"/>
+      </p:par>
+    </p:tnLst>
+  </p:timing>
 </p:sld>
 </file>
 
@@ -7225,6 +8004,14 @@
   <p:clrMapOvr>
     <a:masterClrMapping/>
   </p:clrMapOvr>
+  <mc:AlternateContent xmlns:mc="http://schemas.openxmlformats.org/markup-compatibility/2006" xmlns:p14="http://schemas.microsoft.com/office/powerpoint/2010/main">
+    <mc:Choice Requires="p14">
+      <p:transition p14:dur="0"/>
+    </mc:Choice>
+    <mc:Fallback xmlns="">
+      <p:transition/>
+    </mc:Fallback>
+  </mc:AlternateContent>
   <p:timing>
     <p:tnLst>
       <p:par>
@@ -7647,136 +8434,2424 @@
       </p:grpSpPr>
       <p:sp>
         <p:nvSpPr>
-          <p:cNvPr id="2" name="Content Placeholder 1"/>
+          <p:cNvPr id="56" name="Oval 55"/>
+          <p:cNvSpPr/>
+          <p:nvPr/>
+        </p:nvSpPr>
+        <p:spPr>
+          <a:xfrm>
+            <a:off x="7419124" y="1537551"/>
+            <a:ext cx="731659" cy="745732"/>
+          </a:xfrm>
+          <a:prstGeom prst="ellipse">
+            <a:avLst/>
+          </a:prstGeom>
+          <a:solidFill>
+            <a:srgbClr val="FFFF00"/>
+          </a:solidFill>
+        </p:spPr>
+        <p:style>
+          <a:lnRef idx="2">
+            <a:schemeClr val="accent2">
+              <a:shade val="50000"/>
+            </a:schemeClr>
+          </a:lnRef>
+          <a:fillRef idx="1">
+            <a:schemeClr val="accent2"/>
+          </a:fillRef>
+          <a:effectRef idx="0">
+            <a:schemeClr val="accent2"/>
+          </a:effectRef>
+          <a:fontRef idx="minor">
+            <a:schemeClr val="lt1"/>
+          </a:fontRef>
+        </p:style>
+        <p:txBody>
+          <a:bodyPr rtlCol="0" anchor="ctr"/>
+          <a:lstStyle/>
+          <a:p>
+            <a:pPr algn="ctr"/>
+            <a:endParaRPr lang="en-US"/>
+          </a:p>
+        </p:txBody>
+      </p:sp>
+      <p:sp>
+        <p:nvSpPr>
+          <p:cNvPr id="54" name="Oval 53"/>
+          <p:cNvSpPr/>
+          <p:nvPr/>
+        </p:nvSpPr>
+        <p:spPr>
+          <a:xfrm>
+            <a:off x="2074049" y="4315218"/>
+            <a:ext cx="731659" cy="745732"/>
+          </a:xfrm>
+          <a:prstGeom prst="ellipse">
+            <a:avLst/>
+          </a:prstGeom>
+          <a:solidFill>
+            <a:srgbClr val="FFFF00"/>
+          </a:solidFill>
+        </p:spPr>
+        <p:style>
+          <a:lnRef idx="2">
+            <a:schemeClr val="accent2">
+              <a:shade val="50000"/>
+            </a:schemeClr>
+          </a:lnRef>
+          <a:fillRef idx="1">
+            <a:schemeClr val="accent2"/>
+          </a:fillRef>
+          <a:effectRef idx="0">
+            <a:schemeClr val="accent2"/>
+          </a:effectRef>
+          <a:fontRef idx="minor">
+            <a:schemeClr val="lt1"/>
+          </a:fontRef>
+        </p:style>
+        <p:txBody>
+          <a:bodyPr rtlCol="0" anchor="ctr"/>
+          <a:lstStyle/>
+          <a:p>
+            <a:pPr algn="ctr"/>
+            <a:endParaRPr lang="en-US"/>
+          </a:p>
+        </p:txBody>
+      </p:sp>
+      <p:sp>
+        <p:nvSpPr>
+          <p:cNvPr id="53" name="Oval 52"/>
+          <p:cNvSpPr/>
+          <p:nvPr/>
+        </p:nvSpPr>
+        <p:spPr>
+          <a:xfrm>
+            <a:off x="6513220" y="2381803"/>
+            <a:ext cx="731659" cy="745732"/>
+          </a:xfrm>
+          <a:prstGeom prst="ellipse">
+            <a:avLst/>
+          </a:prstGeom>
+        </p:spPr>
+        <p:style>
+          <a:lnRef idx="2">
+            <a:schemeClr val="accent2">
+              <a:shade val="50000"/>
+            </a:schemeClr>
+          </a:lnRef>
+          <a:fillRef idx="1">
+            <a:schemeClr val="accent2"/>
+          </a:fillRef>
+          <a:effectRef idx="0">
+            <a:schemeClr val="accent2"/>
+          </a:effectRef>
+          <a:fontRef idx="minor">
+            <a:schemeClr val="lt1"/>
+          </a:fontRef>
+        </p:style>
+        <p:txBody>
+          <a:bodyPr rtlCol="0" anchor="ctr"/>
+          <a:lstStyle/>
+          <a:p>
+            <a:pPr algn="ctr"/>
+            <a:endParaRPr lang="en-US"/>
+          </a:p>
+        </p:txBody>
+      </p:sp>
+      <p:sp>
+        <p:nvSpPr>
+          <p:cNvPr id="52" name="Oval 51"/>
+          <p:cNvSpPr/>
+          <p:nvPr/>
+        </p:nvSpPr>
+        <p:spPr>
+          <a:xfrm>
+            <a:off x="5956182" y="4290877"/>
+            <a:ext cx="731659" cy="745732"/>
+          </a:xfrm>
+          <a:prstGeom prst="ellipse">
+            <a:avLst/>
+          </a:prstGeom>
+        </p:spPr>
+        <p:style>
+          <a:lnRef idx="2">
+            <a:schemeClr val="accent2">
+              <a:shade val="50000"/>
+            </a:schemeClr>
+          </a:lnRef>
+          <a:fillRef idx="1">
+            <a:schemeClr val="accent2"/>
+          </a:fillRef>
+          <a:effectRef idx="0">
+            <a:schemeClr val="accent2"/>
+          </a:effectRef>
+          <a:fontRef idx="minor">
+            <a:schemeClr val="lt1"/>
+          </a:fontRef>
+        </p:style>
+        <p:txBody>
+          <a:bodyPr rtlCol="0" anchor="ctr"/>
+          <a:lstStyle/>
+          <a:p>
+            <a:pPr algn="ctr"/>
+            <a:endParaRPr lang="en-US"/>
+          </a:p>
+        </p:txBody>
+      </p:sp>
+      <p:sp>
+        <p:nvSpPr>
+          <p:cNvPr id="12" name="Oval 11"/>
+          <p:cNvSpPr/>
+          <p:nvPr/>
+        </p:nvSpPr>
+        <p:spPr>
+          <a:xfrm>
+            <a:off x="1041652" y="5382058"/>
+            <a:ext cx="731659" cy="745732"/>
+          </a:xfrm>
+          <a:prstGeom prst="ellipse">
+            <a:avLst/>
+          </a:prstGeom>
+        </p:spPr>
+        <p:style>
+          <a:lnRef idx="2">
+            <a:schemeClr val="accent2">
+              <a:shade val="50000"/>
+            </a:schemeClr>
+          </a:lnRef>
+          <a:fillRef idx="1">
+            <a:schemeClr val="accent2"/>
+          </a:fillRef>
+          <a:effectRef idx="0">
+            <a:schemeClr val="accent2"/>
+          </a:effectRef>
+          <a:fontRef idx="minor">
+            <a:schemeClr val="lt1"/>
+          </a:fontRef>
+        </p:style>
+        <p:txBody>
+          <a:bodyPr rtlCol="0" anchor="ctr"/>
+          <a:lstStyle/>
+          <a:p>
+            <a:pPr algn="ctr"/>
+            <a:endParaRPr lang="en-US"/>
+          </a:p>
+        </p:txBody>
+      </p:sp>
+      <p:sp>
+        <p:nvSpPr>
+          <p:cNvPr id="2" name="Title 1"/>
           <p:cNvSpPr>
             <a:spLocks noGrp="1"/>
           </p:cNvSpPr>
           <p:nvPr>
+            <p:ph type="title"/>
+          </p:nvPr>
+        </p:nvSpPr>
+        <p:spPr>
+          <a:xfrm>
+            <a:off x="477524" y="-232618"/>
+            <a:ext cx="8229600" cy="1143000"/>
+          </a:xfrm>
+        </p:spPr>
+        <p:txBody>
+          <a:bodyPr>
+            <a:normAutofit/>
+          </a:bodyPr>
+          <a:lstStyle/>
+          <a:p>
+            <a:r>
+              <a:rPr lang="en-US" dirty="0" smtClean="0"/>
+              <a:t>Recursive Fibonacci Number</a:t>
+            </a:r>
+            <a:endParaRPr lang="en-US" dirty="0"/>
+          </a:p>
+        </p:txBody>
+      </p:sp>
+      <p:sp>
+        <p:nvSpPr>
+          <p:cNvPr id="3" name="Content Placeholder 2"/>
+          <p:cNvSpPr>
+            <a:spLocks noGrp="1"/>
+          </p:cNvSpPr>
+          <p:nvPr>
             <p:ph idx="1"/>
           </p:nvPr>
         </p:nvSpPr>
-        <p:spPr/>
+        <p:spPr>
+          <a:xfrm>
+            <a:off x="556339" y="662765"/>
+            <a:ext cx="8229600" cy="1447800"/>
+          </a:xfrm>
+        </p:spPr>
         <p:txBody>
           <a:bodyPr>
-            <a:normAutofit lnSpcReduction="10000"/>
+            <a:normAutofit fontScale="77500" lnSpcReduction="20000"/>
           </a:bodyPr>
           <a:lstStyle/>
           <a:p>
             <a:r>
-              <a:rPr lang="en-US" dirty="0"/>
-              <a:t>Save every solution we find to sub-problems</a:t>
-            </a:r>
-          </a:p>
-          <a:p>
+              <a:rPr lang="en-US" dirty="0" smtClean="0"/>
+              <a:t>Calculate f(4) …where  </a:t>
+            </a:r>
+          </a:p>
+          <a:p>
+            <a:pPr marL="457200" lvl="1" indent="0">
+              <a:buNone/>
+            </a:pPr>
+            <a:r>
+              <a:rPr lang="en-US" dirty="0" smtClean="0"/>
+              <a:t>If n &gt; 2                               f(n) = f(n-1) + f(n-2)</a:t>
+            </a:r>
+          </a:p>
+          <a:p>
+            <a:pPr marL="457200" lvl="1" indent="0">
+              <a:buNone/>
+            </a:pPr>
+            <a:r>
+              <a:rPr lang="en-US" dirty="0" smtClean="0"/>
+              <a:t>Else if n is 1 or 2, then    f(n) = 1</a:t>
+            </a:r>
+          </a:p>
+          <a:p>
+            <a:r>
+              <a:rPr lang="en-US" dirty="0" smtClean="0"/>
+              <a:t>f(5) = f(4) + f(3)…</a:t>
+            </a:r>
             <a:endParaRPr lang="en-US" dirty="0"/>
           </a:p>
-          <a:p>
-            <a:r>
-              <a:rPr lang="en-US" dirty="0"/>
-              <a:t>Before recursively computing a solution:</a:t>
-            </a:r>
-          </a:p>
-          <a:p>
-            <a:pPr lvl="1"/>
-            <a:r>
-              <a:rPr lang="en-US" dirty="0"/>
-              <a:t>Look it up</a:t>
-            </a:r>
-          </a:p>
-          <a:p>
-            <a:pPr lvl="1"/>
-            <a:r>
-              <a:rPr lang="en-US" dirty="0"/>
-              <a:t>If found, use it</a:t>
-            </a:r>
-          </a:p>
-          <a:p>
-            <a:pPr lvl="1"/>
-            <a:r>
-              <a:rPr lang="en-US" dirty="0"/>
-              <a:t>Otherwise do the recursive computation</a:t>
-            </a:r>
-          </a:p>
-          <a:p>
-            <a:pPr lvl="1"/>
-            <a:endParaRPr lang="en-US" dirty="0"/>
-          </a:p>
-          <a:p>
-            <a:r>
-              <a:rPr lang="en-US" dirty="0"/>
-              <a:t>Study the </a:t>
-            </a:r>
-            <a:r>
-              <a:rPr lang="en-US" dirty="0" err="1"/>
-              <a:t>memoization</a:t>
-            </a:r>
-            <a:r>
-              <a:rPr lang="en-US" dirty="0"/>
-              <a:t> code in the </a:t>
-            </a:r>
-            <a:r>
-              <a:rPr lang="en-US" dirty="0" err="1">
+        </p:txBody>
+      </p:sp>
+      <p:sp>
+        <p:nvSpPr>
+          <p:cNvPr id="4" name="TextBox 3"/>
+          <p:cNvSpPr txBox="1"/>
+          <p:nvPr/>
+        </p:nvSpPr>
+        <p:spPr>
+          <a:xfrm>
+            <a:off x="3945369" y="3710689"/>
+            <a:ext cx="620683" cy="461665"/>
+          </a:xfrm>
+          <a:prstGeom prst="rect">
+            <a:avLst/>
+          </a:prstGeom>
+          <a:noFill/>
+        </p:spPr>
+        <p:txBody>
+          <a:bodyPr wrap="none" rtlCol="0">
+            <a:spAutoFit/>
+          </a:bodyPr>
+          <a:lstStyle/>
+          <a:p>
+            <a:r>
+              <a:rPr lang="en-US" sz="2400" dirty="0" smtClean="0"/>
+              <a:t>f(5)</a:t>
+            </a:r>
+            <a:endParaRPr lang="en-US" sz="2400" dirty="0"/>
+          </a:p>
+        </p:txBody>
+      </p:sp>
+      <p:cxnSp>
+        <p:nvCxnSpPr>
+          <p:cNvPr id="6" name="Straight Arrow Connector 5"/>
+          <p:cNvCxnSpPr/>
+          <p:nvPr/>
+        </p:nvCxnSpPr>
+        <p:spPr>
+          <a:xfrm flipH="1">
+            <a:off x="2676237" y="4128110"/>
+            <a:ext cx="1269132" cy="319167"/>
+          </a:xfrm>
+          <a:prstGeom prst="straightConnector1">
+            <a:avLst/>
+          </a:prstGeom>
+          <a:ln>
+            <a:tailEnd type="triangle"/>
+          </a:ln>
+        </p:spPr>
+        <p:style>
+          <a:lnRef idx="1">
+            <a:schemeClr val="accent1"/>
+          </a:lnRef>
+          <a:fillRef idx="0">
+            <a:schemeClr val="accent1"/>
+          </a:fillRef>
+          <a:effectRef idx="0">
+            <a:schemeClr val="accent1"/>
+          </a:effectRef>
+          <a:fontRef idx="minor">
+            <a:schemeClr val="tx1"/>
+          </a:fontRef>
+        </p:style>
+      </p:cxnSp>
+      <p:sp>
+        <p:nvSpPr>
+          <p:cNvPr id="16" name="TextBox 15"/>
+          <p:cNvSpPr txBox="1"/>
+          <p:nvPr/>
+        </p:nvSpPr>
+        <p:spPr>
+          <a:xfrm>
+            <a:off x="2141357" y="4457252"/>
+            <a:ext cx="620683" cy="461665"/>
+          </a:xfrm>
+          <a:prstGeom prst="rect">
+            <a:avLst/>
+          </a:prstGeom>
+          <a:noFill/>
+        </p:spPr>
+        <p:txBody>
+          <a:bodyPr wrap="none" rtlCol="0">
+            <a:spAutoFit/>
+          </a:bodyPr>
+          <a:lstStyle/>
+          <a:p>
+            <a:r>
+              <a:rPr lang="en-US" sz="2400" dirty="0" smtClean="0"/>
+              <a:t>f(4)</a:t>
+            </a:r>
+            <a:endParaRPr lang="en-US" sz="2400" dirty="0"/>
+          </a:p>
+        </p:txBody>
+      </p:sp>
+      <p:cxnSp>
+        <p:nvCxnSpPr>
+          <p:cNvPr id="17" name="Straight Arrow Connector 16"/>
+          <p:cNvCxnSpPr/>
+          <p:nvPr/>
+        </p:nvCxnSpPr>
+        <p:spPr>
+          <a:xfrm flipH="1">
+            <a:off x="1607957" y="4874673"/>
+            <a:ext cx="533400" cy="457200"/>
+          </a:xfrm>
+          <a:prstGeom prst="straightConnector1">
+            <a:avLst/>
+          </a:prstGeom>
+          <a:ln>
+            <a:tailEnd type="triangle"/>
+          </a:ln>
+        </p:spPr>
+        <p:style>
+          <a:lnRef idx="1">
+            <a:schemeClr val="accent1"/>
+          </a:lnRef>
+          <a:fillRef idx="0">
+            <a:schemeClr val="accent1"/>
+          </a:fillRef>
+          <a:effectRef idx="0">
+            <a:schemeClr val="accent1"/>
+          </a:effectRef>
+          <a:fontRef idx="minor">
+            <a:schemeClr val="tx1"/>
+          </a:fontRef>
+        </p:style>
+      </p:cxnSp>
+      <p:cxnSp>
+        <p:nvCxnSpPr>
+          <p:cNvPr id="18" name="Straight Arrow Connector 17"/>
+          <p:cNvCxnSpPr/>
+          <p:nvPr/>
+        </p:nvCxnSpPr>
+        <p:spPr>
+          <a:xfrm>
+            <a:off x="2676237" y="4870234"/>
+            <a:ext cx="533400" cy="457200"/>
+          </a:xfrm>
+          <a:prstGeom prst="straightConnector1">
+            <a:avLst/>
+          </a:prstGeom>
+          <a:ln>
+            <a:tailEnd type="triangle"/>
+          </a:ln>
+        </p:spPr>
+        <p:style>
+          <a:lnRef idx="1">
+            <a:schemeClr val="accent1"/>
+          </a:lnRef>
+          <a:fillRef idx="0">
+            <a:schemeClr val="accent1"/>
+          </a:fillRef>
+          <a:effectRef idx="0">
+            <a:schemeClr val="accent1"/>
+          </a:effectRef>
+          <a:fontRef idx="minor">
+            <a:schemeClr val="tx1"/>
+          </a:fontRef>
+        </p:style>
+      </p:cxnSp>
+      <p:sp>
+        <p:nvSpPr>
+          <p:cNvPr id="19" name="TextBox 18"/>
+          <p:cNvSpPr txBox="1"/>
+          <p:nvPr/>
+        </p:nvSpPr>
+        <p:spPr>
+          <a:xfrm>
+            <a:off x="6054571" y="4457252"/>
+            <a:ext cx="620683" cy="461665"/>
+          </a:xfrm>
+          <a:prstGeom prst="rect">
+            <a:avLst/>
+          </a:prstGeom>
+          <a:noFill/>
+        </p:spPr>
+        <p:txBody>
+          <a:bodyPr wrap="none" rtlCol="0">
+            <a:spAutoFit/>
+          </a:bodyPr>
+          <a:lstStyle/>
+          <a:p>
+            <a:r>
+              <a:rPr lang="en-US" sz="2400" dirty="0" smtClean="0"/>
+              <a:t>f(3)</a:t>
+            </a:r>
+            <a:endParaRPr lang="en-US" sz="2400" dirty="0"/>
+          </a:p>
+        </p:txBody>
+      </p:sp>
+      <p:cxnSp>
+        <p:nvCxnSpPr>
+          <p:cNvPr id="20" name="Straight Arrow Connector 19"/>
+          <p:cNvCxnSpPr/>
+          <p:nvPr/>
+        </p:nvCxnSpPr>
+        <p:spPr>
+          <a:xfrm flipH="1">
+            <a:off x="5521171" y="4874673"/>
+            <a:ext cx="533400" cy="457200"/>
+          </a:xfrm>
+          <a:prstGeom prst="straightConnector1">
+            <a:avLst/>
+          </a:prstGeom>
+          <a:ln>
+            <a:tailEnd type="triangle"/>
+          </a:ln>
+        </p:spPr>
+        <p:style>
+          <a:lnRef idx="1">
+            <a:schemeClr val="accent1"/>
+          </a:lnRef>
+          <a:fillRef idx="0">
+            <a:schemeClr val="accent1"/>
+          </a:fillRef>
+          <a:effectRef idx="0">
+            <a:schemeClr val="accent1"/>
+          </a:effectRef>
+          <a:fontRef idx="minor">
+            <a:schemeClr val="tx1"/>
+          </a:fontRef>
+        </p:style>
+      </p:cxnSp>
+      <p:cxnSp>
+        <p:nvCxnSpPr>
+          <p:cNvPr id="21" name="Straight Arrow Connector 20"/>
+          <p:cNvCxnSpPr/>
+          <p:nvPr/>
+        </p:nvCxnSpPr>
+        <p:spPr>
+          <a:xfrm>
+            <a:off x="6589451" y="4870234"/>
+            <a:ext cx="533400" cy="457200"/>
+          </a:xfrm>
+          <a:prstGeom prst="straightConnector1">
+            <a:avLst/>
+          </a:prstGeom>
+          <a:ln>
+            <a:tailEnd type="triangle"/>
+          </a:ln>
+        </p:spPr>
+        <p:style>
+          <a:lnRef idx="1">
+            <a:schemeClr val="accent1"/>
+          </a:lnRef>
+          <a:fillRef idx="0">
+            <a:schemeClr val="accent1"/>
+          </a:fillRef>
+          <a:effectRef idx="0">
+            <a:schemeClr val="accent1"/>
+          </a:effectRef>
+          <a:fontRef idx="minor">
+            <a:schemeClr val="tx1"/>
+          </a:fontRef>
+        </p:style>
+      </p:cxnSp>
+      <p:sp>
+        <p:nvSpPr>
+          <p:cNvPr id="28" name="TextBox 27"/>
+          <p:cNvSpPr txBox="1"/>
+          <p:nvPr/>
+        </p:nvSpPr>
+        <p:spPr>
+          <a:xfrm>
+            <a:off x="7164272" y="5293259"/>
+            <a:ext cx="620683" cy="461665"/>
+          </a:xfrm>
+          <a:prstGeom prst="rect">
+            <a:avLst/>
+          </a:prstGeom>
+          <a:noFill/>
+        </p:spPr>
+        <p:txBody>
+          <a:bodyPr wrap="none" rtlCol="0">
+            <a:spAutoFit/>
+          </a:bodyPr>
+          <a:lstStyle/>
+          <a:p>
+            <a:r>
+              <a:rPr lang="en-US" sz="2400" dirty="0" smtClean="0"/>
+              <a:t>f(1)</a:t>
+            </a:r>
+            <a:endParaRPr lang="en-US" sz="2400" dirty="0"/>
+          </a:p>
+        </p:txBody>
+      </p:sp>
+      <p:sp>
+        <p:nvSpPr>
+          <p:cNvPr id="31" name="TextBox 30"/>
+          <p:cNvSpPr txBox="1"/>
+          <p:nvPr/>
+        </p:nvSpPr>
+        <p:spPr>
+          <a:xfrm>
+            <a:off x="4992201" y="5319892"/>
+            <a:ext cx="620683" cy="461665"/>
+          </a:xfrm>
+          <a:prstGeom prst="rect">
+            <a:avLst/>
+          </a:prstGeom>
+          <a:noFill/>
+        </p:spPr>
+        <p:txBody>
+          <a:bodyPr wrap="none" rtlCol="0">
+            <a:spAutoFit/>
+          </a:bodyPr>
+          <a:lstStyle/>
+          <a:p>
+            <a:r>
+              <a:rPr lang="en-US" sz="2400" dirty="0" smtClean="0"/>
+              <a:t>f(2)</a:t>
+            </a:r>
+            <a:endParaRPr lang="en-US" sz="2400" dirty="0"/>
+          </a:p>
+        </p:txBody>
+      </p:sp>
+      <p:sp>
+        <p:nvSpPr>
+          <p:cNvPr id="34" name="TextBox 33"/>
+          <p:cNvSpPr txBox="1"/>
+          <p:nvPr/>
+        </p:nvSpPr>
+        <p:spPr>
+          <a:xfrm>
+            <a:off x="1097141" y="5504103"/>
+            <a:ext cx="620683" cy="461665"/>
+          </a:xfrm>
+          <a:prstGeom prst="rect">
+            <a:avLst/>
+          </a:prstGeom>
+          <a:noFill/>
+        </p:spPr>
+        <p:txBody>
+          <a:bodyPr wrap="none" rtlCol="0">
+            <a:spAutoFit/>
+          </a:bodyPr>
+          <a:lstStyle/>
+          <a:p>
+            <a:r>
+              <a:rPr lang="en-US" sz="2400" dirty="0" smtClean="0"/>
+              <a:t>f(3)</a:t>
+            </a:r>
+            <a:endParaRPr lang="en-US" sz="2400" dirty="0"/>
+          </a:p>
+        </p:txBody>
+      </p:sp>
+      <p:cxnSp>
+        <p:nvCxnSpPr>
+          <p:cNvPr id="35" name="Straight Arrow Connector 34"/>
+          <p:cNvCxnSpPr/>
+          <p:nvPr/>
+        </p:nvCxnSpPr>
+        <p:spPr>
+          <a:xfrm flipH="1">
+            <a:off x="563741" y="5921524"/>
+            <a:ext cx="533400" cy="457200"/>
+          </a:xfrm>
+          <a:prstGeom prst="straightConnector1">
+            <a:avLst/>
+          </a:prstGeom>
+          <a:ln>
+            <a:tailEnd type="triangle"/>
+          </a:ln>
+        </p:spPr>
+        <p:style>
+          <a:lnRef idx="1">
+            <a:schemeClr val="accent1"/>
+          </a:lnRef>
+          <a:fillRef idx="0">
+            <a:schemeClr val="accent1"/>
+          </a:fillRef>
+          <a:effectRef idx="0">
+            <a:schemeClr val="accent1"/>
+          </a:effectRef>
+          <a:fontRef idx="minor">
+            <a:schemeClr val="tx1"/>
+          </a:fontRef>
+        </p:style>
+      </p:cxnSp>
+      <p:cxnSp>
+        <p:nvCxnSpPr>
+          <p:cNvPr id="36" name="Straight Arrow Connector 35"/>
+          <p:cNvCxnSpPr/>
+          <p:nvPr/>
+        </p:nvCxnSpPr>
+        <p:spPr>
+          <a:xfrm>
+            <a:off x="1632021" y="5917085"/>
+            <a:ext cx="533400" cy="457200"/>
+          </a:xfrm>
+          <a:prstGeom prst="straightConnector1">
+            <a:avLst/>
+          </a:prstGeom>
+          <a:ln>
+            <a:tailEnd type="triangle"/>
+          </a:ln>
+        </p:spPr>
+        <p:style>
+          <a:lnRef idx="1">
+            <a:schemeClr val="accent1"/>
+          </a:lnRef>
+          <a:fillRef idx="0">
+            <a:schemeClr val="accent1"/>
+          </a:fillRef>
+          <a:effectRef idx="0">
+            <a:schemeClr val="accent1"/>
+          </a:effectRef>
+          <a:fontRef idx="minor">
+            <a:schemeClr val="tx1"/>
+          </a:fontRef>
+        </p:style>
+      </p:cxnSp>
+      <p:sp>
+        <p:nvSpPr>
+          <p:cNvPr id="37" name="TextBox 36"/>
+          <p:cNvSpPr txBox="1"/>
+          <p:nvPr/>
+        </p:nvSpPr>
+        <p:spPr>
+          <a:xfrm>
+            <a:off x="2206842" y="6340110"/>
+            <a:ext cx="620683" cy="461665"/>
+          </a:xfrm>
+          <a:prstGeom prst="rect">
+            <a:avLst/>
+          </a:prstGeom>
+          <a:noFill/>
+        </p:spPr>
+        <p:txBody>
+          <a:bodyPr wrap="none" rtlCol="0">
+            <a:spAutoFit/>
+          </a:bodyPr>
+          <a:lstStyle/>
+          <a:p>
+            <a:r>
+              <a:rPr lang="en-US" sz="2400" dirty="0" smtClean="0"/>
+              <a:t>f(1)</a:t>
+            </a:r>
+            <a:endParaRPr lang="en-US" sz="2400" dirty="0"/>
+          </a:p>
+        </p:txBody>
+      </p:sp>
+      <p:sp>
+        <p:nvSpPr>
+          <p:cNvPr id="38" name="TextBox 37"/>
+          <p:cNvSpPr txBox="1"/>
+          <p:nvPr/>
+        </p:nvSpPr>
+        <p:spPr>
+          <a:xfrm>
+            <a:off x="34771" y="6366743"/>
+            <a:ext cx="620683" cy="461665"/>
+          </a:xfrm>
+          <a:prstGeom prst="rect">
+            <a:avLst/>
+          </a:prstGeom>
+          <a:noFill/>
+        </p:spPr>
+        <p:txBody>
+          <a:bodyPr wrap="none" rtlCol="0">
+            <a:spAutoFit/>
+          </a:bodyPr>
+          <a:lstStyle/>
+          <a:p>
+            <a:r>
+              <a:rPr lang="en-US" sz="2400" dirty="0" smtClean="0"/>
+              <a:t>f(2)</a:t>
+            </a:r>
+            <a:endParaRPr lang="en-US" sz="2400" dirty="0"/>
+          </a:p>
+        </p:txBody>
+      </p:sp>
+      <p:sp>
+        <p:nvSpPr>
+          <p:cNvPr id="39" name="TextBox 38"/>
+          <p:cNvSpPr txBox="1"/>
+          <p:nvPr/>
+        </p:nvSpPr>
+        <p:spPr>
+          <a:xfrm>
+            <a:off x="3200745" y="5372106"/>
+            <a:ext cx="620683" cy="461665"/>
+          </a:xfrm>
+          <a:prstGeom prst="rect">
+            <a:avLst/>
+          </a:prstGeom>
+          <a:noFill/>
+        </p:spPr>
+        <p:txBody>
+          <a:bodyPr wrap="none" rtlCol="0">
+            <a:spAutoFit/>
+          </a:bodyPr>
+          <a:lstStyle/>
+          <a:p>
+            <a:r>
+              <a:rPr lang="en-US" sz="2400" dirty="0" smtClean="0"/>
+              <a:t>f(2)</a:t>
+            </a:r>
+            <a:endParaRPr lang="en-US" sz="2400" dirty="0"/>
+          </a:p>
+        </p:txBody>
+      </p:sp>
+      <p:cxnSp>
+        <p:nvCxnSpPr>
+          <p:cNvPr id="43" name="Straight Arrow Connector 42"/>
+          <p:cNvCxnSpPr/>
+          <p:nvPr/>
+        </p:nvCxnSpPr>
+        <p:spPr>
+          <a:xfrm>
+            <a:off x="4671139" y="4125642"/>
+            <a:ext cx="1269132" cy="319167"/>
+          </a:xfrm>
+          <a:prstGeom prst="straightConnector1">
+            <a:avLst/>
+          </a:prstGeom>
+          <a:ln>
+            <a:tailEnd type="triangle"/>
+          </a:ln>
+        </p:spPr>
+        <p:style>
+          <a:lnRef idx="1">
+            <a:schemeClr val="accent1"/>
+          </a:lnRef>
+          <a:fillRef idx="0">
+            <a:schemeClr val="accent1"/>
+          </a:fillRef>
+          <a:effectRef idx="0">
+            <a:schemeClr val="accent1"/>
+          </a:effectRef>
+          <a:fontRef idx="minor">
+            <a:schemeClr val="tx1"/>
+          </a:fontRef>
+        </p:style>
+      </p:cxnSp>
+      <p:sp>
+        <p:nvSpPr>
+          <p:cNvPr id="22" name="TextBox 21"/>
+          <p:cNvSpPr txBox="1"/>
+          <p:nvPr/>
+        </p:nvSpPr>
+        <p:spPr>
+          <a:xfrm>
+            <a:off x="4849419" y="1574932"/>
+            <a:ext cx="620683" cy="461665"/>
+          </a:xfrm>
+          <a:prstGeom prst="rect">
+            <a:avLst/>
+          </a:prstGeom>
+          <a:noFill/>
+        </p:spPr>
+        <p:txBody>
+          <a:bodyPr wrap="none" rtlCol="0">
+            <a:spAutoFit/>
+          </a:bodyPr>
+          <a:lstStyle/>
+          <a:p>
+            <a:r>
+              <a:rPr lang="en-US" sz="2400" dirty="0" smtClean="0"/>
+              <a:t>f(6)</a:t>
+            </a:r>
+            <a:endParaRPr lang="en-US" sz="2400" dirty="0"/>
+          </a:p>
+        </p:txBody>
+      </p:sp>
+      <p:cxnSp>
+        <p:nvCxnSpPr>
+          <p:cNvPr id="23" name="Straight Arrow Connector 22"/>
+          <p:cNvCxnSpPr>
+            <a:endCxn id="4" idx="0"/>
+          </p:cNvCxnSpPr>
+          <p:nvPr/>
+        </p:nvCxnSpPr>
+        <p:spPr>
+          <a:xfrm flipH="1">
+            <a:off x="4255711" y="2102477"/>
+            <a:ext cx="736490" cy="1608212"/>
+          </a:xfrm>
+          <a:prstGeom prst="straightConnector1">
+            <a:avLst/>
+          </a:prstGeom>
+          <a:ln>
+            <a:tailEnd type="triangle"/>
+          </a:ln>
+        </p:spPr>
+        <p:style>
+          <a:lnRef idx="1">
+            <a:schemeClr val="accent1"/>
+          </a:lnRef>
+          <a:fillRef idx="0">
+            <a:schemeClr val="accent1"/>
+          </a:fillRef>
+          <a:effectRef idx="0">
+            <a:schemeClr val="accent1"/>
+          </a:effectRef>
+          <a:fontRef idx="minor">
+            <a:schemeClr val="tx1"/>
+          </a:fontRef>
+        </p:style>
+      </p:cxnSp>
+      <p:sp>
+        <p:nvSpPr>
+          <p:cNvPr id="41" name="TextBox 40"/>
+          <p:cNvSpPr txBox="1"/>
+          <p:nvPr/>
+        </p:nvSpPr>
+        <p:spPr>
+          <a:xfrm>
+            <a:off x="7474613" y="1701693"/>
+            <a:ext cx="620683" cy="461665"/>
+          </a:xfrm>
+          <a:prstGeom prst="rect">
+            <a:avLst/>
+          </a:prstGeom>
+          <a:noFill/>
+        </p:spPr>
+        <p:txBody>
+          <a:bodyPr wrap="none" rtlCol="0">
+            <a:spAutoFit/>
+          </a:bodyPr>
+          <a:lstStyle/>
+          <a:p>
+            <a:r>
+              <a:rPr lang="en-US" sz="2400" dirty="0" smtClean="0"/>
+              <a:t>f(4)</a:t>
+            </a:r>
+            <a:endParaRPr lang="en-US" sz="2400" dirty="0"/>
+          </a:p>
+        </p:txBody>
+      </p:sp>
+      <p:cxnSp>
+        <p:nvCxnSpPr>
+          <p:cNvPr id="42" name="Straight Arrow Connector 41"/>
+          <p:cNvCxnSpPr/>
+          <p:nvPr/>
+        </p:nvCxnSpPr>
+        <p:spPr>
+          <a:xfrm flipH="1">
+            <a:off x="6941213" y="2119114"/>
+            <a:ext cx="533400" cy="457200"/>
+          </a:xfrm>
+          <a:prstGeom prst="straightConnector1">
+            <a:avLst/>
+          </a:prstGeom>
+          <a:ln>
+            <a:tailEnd type="triangle"/>
+          </a:ln>
+        </p:spPr>
+        <p:style>
+          <a:lnRef idx="1">
+            <a:schemeClr val="accent1"/>
+          </a:lnRef>
+          <a:fillRef idx="0">
+            <a:schemeClr val="accent1"/>
+          </a:fillRef>
+          <a:effectRef idx="0">
+            <a:schemeClr val="accent1"/>
+          </a:effectRef>
+          <a:fontRef idx="minor">
+            <a:schemeClr val="tx1"/>
+          </a:fontRef>
+        </p:style>
+      </p:cxnSp>
+      <p:cxnSp>
+        <p:nvCxnSpPr>
+          <p:cNvPr id="44" name="Straight Arrow Connector 43"/>
+          <p:cNvCxnSpPr/>
+          <p:nvPr/>
+        </p:nvCxnSpPr>
+        <p:spPr>
+          <a:xfrm>
+            <a:off x="8009493" y="2114675"/>
+            <a:ext cx="533400" cy="457200"/>
+          </a:xfrm>
+          <a:prstGeom prst="straightConnector1">
+            <a:avLst/>
+          </a:prstGeom>
+          <a:ln>
+            <a:tailEnd type="triangle"/>
+          </a:ln>
+        </p:spPr>
+        <p:style>
+          <a:lnRef idx="1">
+            <a:schemeClr val="accent1"/>
+          </a:lnRef>
+          <a:fillRef idx="0">
+            <a:schemeClr val="accent1"/>
+          </a:fillRef>
+          <a:effectRef idx="0">
+            <a:schemeClr val="accent1"/>
+          </a:effectRef>
+          <a:fontRef idx="minor">
+            <a:schemeClr val="tx1"/>
+          </a:fontRef>
+        </p:style>
+      </p:cxnSp>
+      <p:sp>
+        <p:nvSpPr>
+          <p:cNvPr id="45" name="TextBox 44"/>
+          <p:cNvSpPr txBox="1"/>
+          <p:nvPr/>
+        </p:nvSpPr>
+        <p:spPr>
+          <a:xfrm>
+            <a:off x="6536952" y="2517737"/>
+            <a:ext cx="620683" cy="461665"/>
+          </a:xfrm>
+          <a:prstGeom prst="rect">
+            <a:avLst/>
+          </a:prstGeom>
+          <a:noFill/>
+        </p:spPr>
+        <p:txBody>
+          <a:bodyPr wrap="none" rtlCol="0">
+            <a:spAutoFit/>
+          </a:bodyPr>
+          <a:lstStyle/>
+          <a:p>
+            <a:r>
+              <a:rPr lang="en-US" sz="2400" dirty="0" smtClean="0"/>
+              <a:t>f(3)</a:t>
+            </a:r>
+            <a:endParaRPr lang="en-US" sz="2400" dirty="0"/>
+          </a:p>
+        </p:txBody>
+      </p:sp>
+      <p:cxnSp>
+        <p:nvCxnSpPr>
+          <p:cNvPr id="46" name="Straight Arrow Connector 45"/>
+          <p:cNvCxnSpPr/>
+          <p:nvPr/>
+        </p:nvCxnSpPr>
+        <p:spPr>
+          <a:xfrm flipH="1">
+            <a:off x="6153321" y="2907687"/>
+            <a:ext cx="533400" cy="457200"/>
+          </a:xfrm>
+          <a:prstGeom prst="straightConnector1">
+            <a:avLst/>
+          </a:prstGeom>
+          <a:ln>
+            <a:tailEnd type="triangle"/>
+          </a:ln>
+        </p:spPr>
+        <p:style>
+          <a:lnRef idx="1">
+            <a:schemeClr val="accent1"/>
+          </a:lnRef>
+          <a:fillRef idx="0">
+            <a:schemeClr val="accent1"/>
+          </a:fillRef>
+          <a:effectRef idx="0">
+            <a:schemeClr val="accent1"/>
+          </a:effectRef>
+          <a:fontRef idx="minor">
+            <a:schemeClr val="tx1"/>
+          </a:fontRef>
+        </p:style>
+      </p:cxnSp>
+      <p:cxnSp>
+        <p:nvCxnSpPr>
+          <p:cNvPr id="47" name="Straight Arrow Connector 46"/>
+          <p:cNvCxnSpPr/>
+          <p:nvPr/>
+        </p:nvCxnSpPr>
+        <p:spPr>
+          <a:xfrm>
+            <a:off x="7122096" y="2783237"/>
+            <a:ext cx="533400" cy="457200"/>
+          </a:xfrm>
+          <a:prstGeom prst="straightConnector1">
+            <a:avLst/>
+          </a:prstGeom>
+          <a:ln>
+            <a:tailEnd type="triangle"/>
+          </a:ln>
+        </p:spPr>
+        <p:style>
+          <a:lnRef idx="1">
+            <a:schemeClr val="accent1"/>
+          </a:lnRef>
+          <a:fillRef idx="0">
+            <a:schemeClr val="accent1"/>
+          </a:fillRef>
+          <a:effectRef idx="0">
+            <a:schemeClr val="accent1"/>
+          </a:effectRef>
+          <a:fontRef idx="minor">
+            <a:schemeClr val="tx1"/>
+          </a:fontRef>
+        </p:style>
+      </p:cxnSp>
+      <p:sp>
+        <p:nvSpPr>
+          <p:cNvPr id="48" name="TextBox 47"/>
+          <p:cNvSpPr txBox="1"/>
+          <p:nvPr/>
+        </p:nvSpPr>
+        <p:spPr>
+          <a:xfrm>
+            <a:off x="7619957" y="3191754"/>
+            <a:ext cx="620683" cy="461665"/>
+          </a:xfrm>
+          <a:prstGeom prst="rect">
+            <a:avLst/>
+          </a:prstGeom>
+          <a:noFill/>
+        </p:spPr>
+        <p:txBody>
+          <a:bodyPr wrap="none" rtlCol="0">
+            <a:spAutoFit/>
+          </a:bodyPr>
+          <a:lstStyle/>
+          <a:p>
+            <a:r>
+              <a:rPr lang="en-US" sz="2400" dirty="0" smtClean="0"/>
+              <a:t>f(1)</a:t>
+            </a:r>
+            <a:endParaRPr lang="en-US" sz="2400" dirty="0"/>
+          </a:p>
+        </p:txBody>
+      </p:sp>
+      <p:sp>
+        <p:nvSpPr>
+          <p:cNvPr id="49" name="TextBox 48"/>
+          <p:cNvSpPr txBox="1"/>
+          <p:nvPr/>
+        </p:nvSpPr>
+        <p:spPr>
+          <a:xfrm>
+            <a:off x="5629929" y="3274457"/>
+            <a:ext cx="620683" cy="461665"/>
+          </a:xfrm>
+          <a:prstGeom prst="rect">
+            <a:avLst/>
+          </a:prstGeom>
+          <a:noFill/>
+        </p:spPr>
+        <p:txBody>
+          <a:bodyPr wrap="none" rtlCol="0">
+            <a:spAutoFit/>
+          </a:bodyPr>
+          <a:lstStyle/>
+          <a:p>
+            <a:r>
+              <a:rPr lang="en-US" sz="2400" dirty="0" smtClean="0"/>
+              <a:t>f(2)</a:t>
+            </a:r>
+            <a:endParaRPr lang="en-US" sz="2400" dirty="0"/>
+          </a:p>
+        </p:txBody>
+      </p:sp>
+      <p:sp>
+        <p:nvSpPr>
+          <p:cNvPr id="50" name="TextBox 49"/>
+          <p:cNvSpPr txBox="1"/>
+          <p:nvPr/>
+        </p:nvSpPr>
+        <p:spPr>
+          <a:xfrm>
+            <a:off x="8534001" y="2616547"/>
+            <a:ext cx="620683" cy="461665"/>
+          </a:xfrm>
+          <a:prstGeom prst="rect">
+            <a:avLst/>
+          </a:prstGeom>
+          <a:noFill/>
+        </p:spPr>
+        <p:txBody>
+          <a:bodyPr wrap="none" rtlCol="0">
+            <a:spAutoFit/>
+          </a:bodyPr>
+          <a:lstStyle/>
+          <a:p>
+            <a:r>
+              <a:rPr lang="en-US" sz="2400" dirty="0" smtClean="0"/>
+              <a:t>f(2)</a:t>
+            </a:r>
+            <a:endParaRPr lang="en-US" sz="2400" dirty="0"/>
+          </a:p>
+        </p:txBody>
+      </p:sp>
+      <p:cxnSp>
+        <p:nvCxnSpPr>
+          <p:cNvPr id="51" name="Straight Arrow Connector 50"/>
+          <p:cNvCxnSpPr/>
+          <p:nvPr/>
+        </p:nvCxnSpPr>
+        <p:spPr>
+          <a:xfrm>
+            <a:off x="5507303" y="1803045"/>
+            <a:ext cx="1665577" cy="77560"/>
+          </a:xfrm>
+          <a:prstGeom prst="straightConnector1">
+            <a:avLst/>
+          </a:prstGeom>
+          <a:ln>
+            <a:tailEnd type="triangle"/>
+          </a:ln>
+        </p:spPr>
+        <p:style>
+          <a:lnRef idx="1">
+            <a:schemeClr val="accent1"/>
+          </a:lnRef>
+          <a:fillRef idx="0">
+            <a:schemeClr val="accent1"/>
+          </a:fillRef>
+          <a:effectRef idx="0">
+            <a:schemeClr val="accent1"/>
+          </a:effectRef>
+          <a:fontRef idx="minor">
+            <a:schemeClr val="tx1"/>
+          </a:fontRef>
+        </p:style>
+      </p:cxnSp>
+      <p:sp>
+        <p:nvSpPr>
+          <p:cNvPr id="13" name="TextBox 12"/>
+          <p:cNvSpPr txBox="1"/>
+          <p:nvPr/>
+        </p:nvSpPr>
+        <p:spPr>
+          <a:xfrm>
+            <a:off x="342153" y="2392780"/>
+            <a:ext cx="2310376" cy="369332"/>
+          </a:xfrm>
+          <a:prstGeom prst="rect">
+            <a:avLst/>
+          </a:prstGeom>
+          <a:noFill/>
+        </p:spPr>
+        <p:txBody>
+          <a:bodyPr wrap="none" rtlCol="0">
+            <a:spAutoFit/>
+          </a:bodyPr>
+          <a:lstStyle/>
+          <a:p>
+            <a:r>
+              <a:rPr lang="en-US" dirty="0" smtClean="0">
                 <a:solidFill>
-                  <a:srgbClr val="F79646"/>
+                  <a:srgbClr val="FF0000"/>
                 </a:solidFill>
               </a:rPr>
-              <a:t>RecursiveHelperFunctions</a:t>
-            </a:r>
-            <a:r>
-              <a:rPr lang="en-US" dirty="0">
-                <a:solidFill>
-                  <a:srgbClr val="F79646"/>
-                </a:solidFill>
-              </a:rPr>
-              <a:t> </a:t>
-            </a:r>
-            <a:r>
-              <a:rPr lang="en-US" dirty="0"/>
-              <a:t>project</a:t>
-            </a:r>
-          </a:p>
-          <a:p>
-            <a:pPr lvl="1"/>
-            <a:endParaRPr lang="en-US" dirty="0"/>
-          </a:p>
-          <a:p>
-            <a:endParaRPr lang="en-US" dirty="0"/>
-          </a:p>
-        </p:txBody>
-      </p:sp>
-      <p:sp>
-        <p:nvSpPr>
-          <p:cNvPr id="3" name="Title 2"/>
-          <p:cNvSpPr>
-            <a:spLocks noGrp="1"/>
-          </p:cNvSpPr>
-          <p:nvPr>
-            <p:ph type="title"/>
-          </p:nvPr>
-        </p:nvSpPr>
-        <p:spPr/>
-        <p:txBody>
-          <a:bodyPr/>
-          <a:lstStyle/>
-          <a:p>
-            <a:r>
-              <a:rPr lang="en-US" dirty="0" err="1"/>
-              <a:t>Memoization</a:t>
-            </a:r>
-            <a:endParaRPr lang="en-US" dirty="0"/>
+              <a:t>Repeated calculations!</a:t>
+            </a:r>
+            <a:endParaRPr lang="en-US" dirty="0">
+              <a:solidFill>
+                <a:srgbClr val="FF0000"/>
+              </a:solidFill>
+            </a:endParaRPr>
           </a:p>
         </p:txBody>
       </p:sp>
     </p:spTree>
     <p:extLst>
       <p:ext uri="{BB962C8B-B14F-4D97-AF65-F5344CB8AC3E}">
-        <p14:creationId xmlns:p14="http://schemas.microsoft.com/office/powerpoint/2010/main" val="3349563426"/>
+        <p14:creationId xmlns:p14="http://schemas.microsoft.com/office/powerpoint/2010/main" val="1325083078"/>
       </p:ext>
     </p:extLst>
   </p:cSld>
   <p:clrMapOvr>
     <a:masterClrMapping/>
   </p:clrMapOvr>
+  <mc:AlternateContent xmlns:mc="http://schemas.openxmlformats.org/markup-compatibility/2006" xmlns:p14="http://schemas.microsoft.com/office/powerpoint/2010/main">
+    <mc:Choice Requires="p14">
+      <p:transition p14:dur="10"/>
+    </mc:Choice>
+    <mc:Fallback xmlns="">
+      <p:transition/>
+    </mc:Fallback>
+  </mc:AlternateContent>
+  <p:timing>
+    <p:tnLst>
+      <p:par>
+        <p:cTn id="1" dur="indefinite" restart="never" nodeType="tmRoot">
+          <p:childTnLst>
+            <p:seq concurrent="1" nextAc="seek">
+              <p:cTn id="2" dur="indefinite" nodeType="mainSeq">
+                <p:childTnLst>
+                  <p:par>
+                    <p:cTn id="3" fill="hold">
+                      <p:stCondLst>
+                        <p:cond delay="indefinite"/>
+                      </p:stCondLst>
+                      <p:childTnLst>
+                        <p:par>
+                          <p:cTn id="4" fill="hold">
+                            <p:stCondLst>
+                              <p:cond delay="0"/>
+                            </p:stCondLst>
+                            <p:childTnLst>
+                              <p:par>
+                                <p:cTn id="5" presetID="1" presetClass="entr" presetSubtype="0" fill="hold" grpId="0" nodeType="clickEffect">
+                                  <p:stCondLst>
+                                    <p:cond delay="0"/>
+                                  </p:stCondLst>
+                                  <p:childTnLst>
+                                    <p:set>
+                                      <p:cBhvr>
+                                        <p:cTn id="6" dur="1" fill="hold">
+                                          <p:stCondLst>
+                                            <p:cond delay="0"/>
+                                          </p:stCondLst>
+                                        </p:cTn>
+                                        <p:tgtEl>
+                                          <p:spTgt spid="4"/>
+                                        </p:tgtEl>
+                                        <p:attrNameLst>
+                                          <p:attrName>style.visibility</p:attrName>
+                                        </p:attrNameLst>
+                                      </p:cBhvr>
+                                      <p:to>
+                                        <p:strVal val="visible"/>
+                                      </p:to>
+                                    </p:set>
+                                  </p:childTnLst>
+                                </p:cTn>
+                              </p:par>
+                              <p:par>
+                                <p:cTn id="7" presetID="1" presetClass="entr" presetSubtype="0" fill="hold" nodeType="withEffect">
+                                  <p:stCondLst>
+                                    <p:cond delay="0"/>
+                                  </p:stCondLst>
+                                  <p:childTnLst>
+                                    <p:set>
+                                      <p:cBhvr>
+                                        <p:cTn id="8" dur="1" fill="hold">
+                                          <p:stCondLst>
+                                            <p:cond delay="0"/>
+                                          </p:stCondLst>
+                                        </p:cTn>
+                                        <p:tgtEl>
+                                          <p:spTgt spid="6"/>
+                                        </p:tgtEl>
+                                        <p:attrNameLst>
+                                          <p:attrName>style.visibility</p:attrName>
+                                        </p:attrNameLst>
+                                      </p:cBhvr>
+                                      <p:to>
+                                        <p:strVal val="visible"/>
+                                      </p:to>
+                                    </p:set>
+                                  </p:childTnLst>
+                                </p:cTn>
+                              </p:par>
+                              <p:par>
+                                <p:cTn id="9" presetID="1" presetClass="entr" presetSubtype="0" fill="hold" nodeType="withEffect">
+                                  <p:stCondLst>
+                                    <p:cond delay="0"/>
+                                  </p:stCondLst>
+                                  <p:childTnLst>
+                                    <p:set>
+                                      <p:cBhvr>
+                                        <p:cTn id="10" dur="1" fill="hold">
+                                          <p:stCondLst>
+                                            <p:cond delay="0"/>
+                                          </p:stCondLst>
+                                        </p:cTn>
+                                        <p:tgtEl>
+                                          <p:spTgt spid="43"/>
+                                        </p:tgtEl>
+                                        <p:attrNameLst>
+                                          <p:attrName>style.visibility</p:attrName>
+                                        </p:attrNameLst>
+                                      </p:cBhvr>
+                                      <p:to>
+                                        <p:strVal val="visible"/>
+                                      </p:to>
+                                    </p:set>
+                                  </p:childTnLst>
+                                </p:cTn>
+                              </p:par>
+                            </p:childTnLst>
+                          </p:cTn>
+                        </p:par>
+                      </p:childTnLst>
+                    </p:cTn>
+                  </p:par>
+                  <p:par>
+                    <p:cTn id="11" fill="hold">
+                      <p:stCondLst>
+                        <p:cond delay="indefinite"/>
+                      </p:stCondLst>
+                      <p:childTnLst>
+                        <p:par>
+                          <p:cTn id="12" fill="hold">
+                            <p:stCondLst>
+                              <p:cond delay="0"/>
+                            </p:stCondLst>
+                            <p:childTnLst>
+                              <p:par>
+                                <p:cTn id="13" presetID="1" presetClass="entr" presetSubtype="0" fill="hold" grpId="0" nodeType="clickEffect">
+                                  <p:stCondLst>
+                                    <p:cond delay="0"/>
+                                  </p:stCondLst>
+                                  <p:childTnLst>
+                                    <p:set>
+                                      <p:cBhvr>
+                                        <p:cTn id="14" dur="1" fill="hold">
+                                          <p:stCondLst>
+                                            <p:cond delay="0"/>
+                                          </p:stCondLst>
+                                        </p:cTn>
+                                        <p:tgtEl>
+                                          <p:spTgt spid="19"/>
+                                        </p:tgtEl>
+                                        <p:attrNameLst>
+                                          <p:attrName>style.visibility</p:attrName>
+                                        </p:attrNameLst>
+                                      </p:cBhvr>
+                                      <p:to>
+                                        <p:strVal val="visible"/>
+                                      </p:to>
+                                    </p:set>
+                                  </p:childTnLst>
+                                </p:cTn>
+                              </p:par>
+                              <p:par>
+                                <p:cTn id="15" presetID="1" presetClass="entr" presetSubtype="0" fill="hold" grpId="0" nodeType="withEffect">
+                                  <p:stCondLst>
+                                    <p:cond delay="0"/>
+                                  </p:stCondLst>
+                                  <p:childTnLst>
+                                    <p:set>
+                                      <p:cBhvr>
+                                        <p:cTn id="16" dur="1" fill="hold">
+                                          <p:stCondLst>
+                                            <p:cond delay="0"/>
+                                          </p:stCondLst>
+                                        </p:cTn>
+                                        <p:tgtEl>
+                                          <p:spTgt spid="16"/>
+                                        </p:tgtEl>
+                                        <p:attrNameLst>
+                                          <p:attrName>style.visibility</p:attrName>
+                                        </p:attrNameLst>
+                                      </p:cBhvr>
+                                      <p:to>
+                                        <p:strVal val="visible"/>
+                                      </p:to>
+                                    </p:set>
+                                  </p:childTnLst>
+                                </p:cTn>
+                              </p:par>
+                            </p:childTnLst>
+                          </p:cTn>
+                        </p:par>
+                      </p:childTnLst>
+                    </p:cTn>
+                  </p:par>
+                  <p:par>
+                    <p:cTn id="17" fill="hold">
+                      <p:stCondLst>
+                        <p:cond delay="indefinite"/>
+                      </p:stCondLst>
+                      <p:childTnLst>
+                        <p:par>
+                          <p:cTn id="18" fill="hold">
+                            <p:stCondLst>
+                              <p:cond delay="0"/>
+                            </p:stCondLst>
+                            <p:childTnLst>
+                              <p:par>
+                                <p:cTn id="19" presetID="1" presetClass="entr" presetSubtype="0" fill="hold" nodeType="clickEffect">
+                                  <p:stCondLst>
+                                    <p:cond delay="0"/>
+                                  </p:stCondLst>
+                                  <p:childTnLst>
+                                    <p:set>
+                                      <p:cBhvr>
+                                        <p:cTn id="20" dur="1" fill="hold">
+                                          <p:stCondLst>
+                                            <p:cond delay="0"/>
+                                          </p:stCondLst>
+                                        </p:cTn>
+                                        <p:tgtEl>
+                                          <p:spTgt spid="17"/>
+                                        </p:tgtEl>
+                                        <p:attrNameLst>
+                                          <p:attrName>style.visibility</p:attrName>
+                                        </p:attrNameLst>
+                                      </p:cBhvr>
+                                      <p:to>
+                                        <p:strVal val="visible"/>
+                                      </p:to>
+                                    </p:set>
+                                  </p:childTnLst>
+                                </p:cTn>
+                              </p:par>
+                              <p:par>
+                                <p:cTn id="21" presetID="1" presetClass="entr" presetSubtype="0" fill="hold" nodeType="withEffect">
+                                  <p:stCondLst>
+                                    <p:cond delay="0"/>
+                                  </p:stCondLst>
+                                  <p:childTnLst>
+                                    <p:set>
+                                      <p:cBhvr>
+                                        <p:cTn id="22" dur="1" fill="hold">
+                                          <p:stCondLst>
+                                            <p:cond delay="0"/>
+                                          </p:stCondLst>
+                                        </p:cTn>
+                                        <p:tgtEl>
+                                          <p:spTgt spid="18"/>
+                                        </p:tgtEl>
+                                        <p:attrNameLst>
+                                          <p:attrName>style.visibility</p:attrName>
+                                        </p:attrNameLst>
+                                      </p:cBhvr>
+                                      <p:to>
+                                        <p:strVal val="visible"/>
+                                      </p:to>
+                                    </p:set>
+                                  </p:childTnLst>
+                                </p:cTn>
+                              </p:par>
+                              <p:par>
+                                <p:cTn id="23" presetID="1" presetClass="entr" presetSubtype="0" fill="hold" grpId="0" nodeType="withEffect">
+                                  <p:stCondLst>
+                                    <p:cond delay="0"/>
+                                  </p:stCondLst>
+                                  <p:childTnLst>
+                                    <p:set>
+                                      <p:cBhvr>
+                                        <p:cTn id="24" dur="1" fill="hold">
+                                          <p:stCondLst>
+                                            <p:cond delay="0"/>
+                                          </p:stCondLst>
+                                        </p:cTn>
+                                        <p:tgtEl>
+                                          <p:spTgt spid="34"/>
+                                        </p:tgtEl>
+                                        <p:attrNameLst>
+                                          <p:attrName>style.visibility</p:attrName>
+                                        </p:attrNameLst>
+                                      </p:cBhvr>
+                                      <p:to>
+                                        <p:strVal val="visible"/>
+                                      </p:to>
+                                    </p:set>
+                                  </p:childTnLst>
+                                </p:cTn>
+                              </p:par>
+                              <p:par>
+                                <p:cTn id="25" presetID="1" presetClass="entr" presetSubtype="0" fill="hold" grpId="0" nodeType="withEffect">
+                                  <p:stCondLst>
+                                    <p:cond delay="0"/>
+                                  </p:stCondLst>
+                                  <p:childTnLst>
+                                    <p:set>
+                                      <p:cBhvr>
+                                        <p:cTn id="26" dur="1" fill="hold">
+                                          <p:stCondLst>
+                                            <p:cond delay="0"/>
+                                          </p:stCondLst>
+                                        </p:cTn>
+                                        <p:tgtEl>
+                                          <p:spTgt spid="39"/>
+                                        </p:tgtEl>
+                                        <p:attrNameLst>
+                                          <p:attrName>style.visibility</p:attrName>
+                                        </p:attrNameLst>
+                                      </p:cBhvr>
+                                      <p:to>
+                                        <p:strVal val="visible"/>
+                                      </p:to>
+                                    </p:set>
+                                  </p:childTnLst>
+                                </p:cTn>
+                              </p:par>
+                            </p:childTnLst>
+                          </p:cTn>
+                        </p:par>
+                      </p:childTnLst>
+                    </p:cTn>
+                  </p:par>
+                  <p:par>
+                    <p:cTn id="27" fill="hold">
+                      <p:stCondLst>
+                        <p:cond delay="indefinite"/>
+                      </p:stCondLst>
+                      <p:childTnLst>
+                        <p:par>
+                          <p:cTn id="28" fill="hold">
+                            <p:stCondLst>
+                              <p:cond delay="0"/>
+                            </p:stCondLst>
+                            <p:childTnLst>
+                              <p:par>
+                                <p:cTn id="29" presetID="1" presetClass="entr" presetSubtype="0" fill="hold" nodeType="clickEffect">
+                                  <p:stCondLst>
+                                    <p:cond delay="0"/>
+                                  </p:stCondLst>
+                                  <p:childTnLst>
+                                    <p:set>
+                                      <p:cBhvr>
+                                        <p:cTn id="30" dur="1" fill="hold">
+                                          <p:stCondLst>
+                                            <p:cond delay="0"/>
+                                          </p:stCondLst>
+                                        </p:cTn>
+                                        <p:tgtEl>
+                                          <p:spTgt spid="35"/>
+                                        </p:tgtEl>
+                                        <p:attrNameLst>
+                                          <p:attrName>style.visibility</p:attrName>
+                                        </p:attrNameLst>
+                                      </p:cBhvr>
+                                      <p:to>
+                                        <p:strVal val="visible"/>
+                                      </p:to>
+                                    </p:set>
+                                  </p:childTnLst>
+                                </p:cTn>
+                              </p:par>
+                              <p:par>
+                                <p:cTn id="31" presetID="1" presetClass="entr" presetSubtype="0" fill="hold" grpId="0" nodeType="withEffect">
+                                  <p:stCondLst>
+                                    <p:cond delay="0"/>
+                                  </p:stCondLst>
+                                  <p:childTnLst>
+                                    <p:set>
+                                      <p:cBhvr>
+                                        <p:cTn id="32" dur="1" fill="hold">
+                                          <p:stCondLst>
+                                            <p:cond delay="0"/>
+                                          </p:stCondLst>
+                                        </p:cTn>
+                                        <p:tgtEl>
+                                          <p:spTgt spid="38"/>
+                                        </p:tgtEl>
+                                        <p:attrNameLst>
+                                          <p:attrName>style.visibility</p:attrName>
+                                        </p:attrNameLst>
+                                      </p:cBhvr>
+                                      <p:to>
+                                        <p:strVal val="visible"/>
+                                      </p:to>
+                                    </p:set>
+                                  </p:childTnLst>
+                                </p:cTn>
+                              </p:par>
+                              <p:par>
+                                <p:cTn id="33" presetID="1" presetClass="entr" presetSubtype="0" fill="hold" grpId="0" nodeType="withEffect">
+                                  <p:stCondLst>
+                                    <p:cond delay="0"/>
+                                  </p:stCondLst>
+                                  <p:childTnLst>
+                                    <p:set>
+                                      <p:cBhvr>
+                                        <p:cTn id="34" dur="1" fill="hold">
+                                          <p:stCondLst>
+                                            <p:cond delay="0"/>
+                                          </p:stCondLst>
+                                        </p:cTn>
+                                        <p:tgtEl>
+                                          <p:spTgt spid="37"/>
+                                        </p:tgtEl>
+                                        <p:attrNameLst>
+                                          <p:attrName>style.visibility</p:attrName>
+                                        </p:attrNameLst>
+                                      </p:cBhvr>
+                                      <p:to>
+                                        <p:strVal val="visible"/>
+                                      </p:to>
+                                    </p:set>
+                                  </p:childTnLst>
+                                </p:cTn>
+                              </p:par>
+                              <p:par>
+                                <p:cTn id="35" presetID="1" presetClass="entr" presetSubtype="0" fill="hold" nodeType="withEffect">
+                                  <p:stCondLst>
+                                    <p:cond delay="0"/>
+                                  </p:stCondLst>
+                                  <p:childTnLst>
+                                    <p:set>
+                                      <p:cBhvr>
+                                        <p:cTn id="36" dur="1" fill="hold">
+                                          <p:stCondLst>
+                                            <p:cond delay="0"/>
+                                          </p:stCondLst>
+                                        </p:cTn>
+                                        <p:tgtEl>
+                                          <p:spTgt spid="36"/>
+                                        </p:tgtEl>
+                                        <p:attrNameLst>
+                                          <p:attrName>style.visibility</p:attrName>
+                                        </p:attrNameLst>
+                                      </p:cBhvr>
+                                      <p:to>
+                                        <p:strVal val="visible"/>
+                                      </p:to>
+                                    </p:set>
+                                  </p:childTnLst>
+                                </p:cTn>
+                              </p:par>
+                            </p:childTnLst>
+                          </p:cTn>
+                        </p:par>
+                      </p:childTnLst>
+                    </p:cTn>
+                  </p:par>
+                  <p:par>
+                    <p:cTn id="37" fill="hold">
+                      <p:stCondLst>
+                        <p:cond delay="indefinite"/>
+                      </p:stCondLst>
+                      <p:childTnLst>
+                        <p:par>
+                          <p:cTn id="38" fill="hold">
+                            <p:stCondLst>
+                              <p:cond delay="0"/>
+                            </p:stCondLst>
+                            <p:childTnLst>
+                              <p:par>
+                                <p:cTn id="39" presetID="1" presetClass="entr" presetSubtype="0" fill="hold" nodeType="clickEffect">
+                                  <p:stCondLst>
+                                    <p:cond delay="0"/>
+                                  </p:stCondLst>
+                                  <p:childTnLst>
+                                    <p:set>
+                                      <p:cBhvr>
+                                        <p:cTn id="40" dur="1" fill="hold">
+                                          <p:stCondLst>
+                                            <p:cond delay="0"/>
+                                          </p:stCondLst>
+                                        </p:cTn>
+                                        <p:tgtEl>
+                                          <p:spTgt spid="20"/>
+                                        </p:tgtEl>
+                                        <p:attrNameLst>
+                                          <p:attrName>style.visibility</p:attrName>
+                                        </p:attrNameLst>
+                                      </p:cBhvr>
+                                      <p:to>
+                                        <p:strVal val="visible"/>
+                                      </p:to>
+                                    </p:set>
+                                  </p:childTnLst>
+                                </p:cTn>
+                              </p:par>
+                              <p:par>
+                                <p:cTn id="41" presetID="1" presetClass="entr" presetSubtype="0" fill="hold" nodeType="withEffect">
+                                  <p:stCondLst>
+                                    <p:cond delay="0"/>
+                                  </p:stCondLst>
+                                  <p:childTnLst>
+                                    <p:set>
+                                      <p:cBhvr>
+                                        <p:cTn id="42" dur="1" fill="hold">
+                                          <p:stCondLst>
+                                            <p:cond delay="0"/>
+                                          </p:stCondLst>
+                                        </p:cTn>
+                                        <p:tgtEl>
+                                          <p:spTgt spid="21"/>
+                                        </p:tgtEl>
+                                        <p:attrNameLst>
+                                          <p:attrName>style.visibility</p:attrName>
+                                        </p:attrNameLst>
+                                      </p:cBhvr>
+                                      <p:to>
+                                        <p:strVal val="visible"/>
+                                      </p:to>
+                                    </p:set>
+                                  </p:childTnLst>
+                                </p:cTn>
+                              </p:par>
+                              <p:par>
+                                <p:cTn id="43" presetID="1" presetClass="entr" presetSubtype="0" fill="hold" grpId="0" nodeType="withEffect">
+                                  <p:stCondLst>
+                                    <p:cond delay="0"/>
+                                  </p:stCondLst>
+                                  <p:childTnLst>
+                                    <p:set>
+                                      <p:cBhvr>
+                                        <p:cTn id="44" dur="1" fill="hold">
+                                          <p:stCondLst>
+                                            <p:cond delay="0"/>
+                                          </p:stCondLst>
+                                        </p:cTn>
+                                        <p:tgtEl>
+                                          <p:spTgt spid="31"/>
+                                        </p:tgtEl>
+                                        <p:attrNameLst>
+                                          <p:attrName>style.visibility</p:attrName>
+                                        </p:attrNameLst>
+                                      </p:cBhvr>
+                                      <p:to>
+                                        <p:strVal val="visible"/>
+                                      </p:to>
+                                    </p:set>
+                                  </p:childTnLst>
+                                </p:cTn>
+                              </p:par>
+                              <p:par>
+                                <p:cTn id="45" presetID="1" presetClass="entr" presetSubtype="0" fill="hold" grpId="0" nodeType="withEffect">
+                                  <p:stCondLst>
+                                    <p:cond delay="0"/>
+                                  </p:stCondLst>
+                                  <p:childTnLst>
+                                    <p:set>
+                                      <p:cBhvr>
+                                        <p:cTn id="46" dur="1" fill="hold">
+                                          <p:stCondLst>
+                                            <p:cond delay="0"/>
+                                          </p:stCondLst>
+                                        </p:cTn>
+                                        <p:tgtEl>
+                                          <p:spTgt spid="28"/>
+                                        </p:tgtEl>
+                                        <p:attrNameLst>
+                                          <p:attrName>style.visibility</p:attrName>
+                                        </p:attrNameLst>
+                                      </p:cBhvr>
+                                      <p:to>
+                                        <p:strVal val="visible"/>
+                                      </p:to>
+                                    </p:set>
+                                  </p:childTnLst>
+                                </p:cTn>
+                              </p:par>
+                            </p:childTnLst>
+                          </p:cTn>
+                        </p:par>
+                      </p:childTnLst>
+                    </p:cTn>
+                  </p:par>
+                  <p:par>
+                    <p:cTn id="47" fill="hold">
+                      <p:stCondLst>
+                        <p:cond delay="indefinite"/>
+                      </p:stCondLst>
+                      <p:childTnLst>
+                        <p:par>
+                          <p:cTn id="48" fill="hold">
+                            <p:stCondLst>
+                              <p:cond delay="0"/>
+                            </p:stCondLst>
+                            <p:childTnLst>
+                              <p:par>
+                                <p:cTn id="49" presetID="1" presetClass="entr" presetSubtype="0" fill="hold" nodeType="clickEffect">
+                                  <p:stCondLst>
+                                    <p:cond delay="0"/>
+                                  </p:stCondLst>
+                                  <p:childTnLst>
+                                    <p:set>
+                                      <p:cBhvr>
+                                        <p:cTn id="50" dur="1" fill="hold">
+                                          <p:stCondLst>
+                                            <p:cond delay="0"/>
+                                          </p:stCondLst>
+                                        </p:cTn>
+                                        <p:tgtEl>
+                                          <p:spTgt spid="23"/>
+                                        </p:tgtEl>
+                                        <p:attrNameLst>
+                                          <p:attrName>style.visibility</p:attrName>
+                                        </p:attrNameLst>
+                                      </p:cBhvr>
+                                      <p:to>
+                                        <p:strVal val="visible"/>
+                                      </p:to>
+                                    </p:set>
+                                  </p:childTnLst>
+                                </p:cTn>
+                              </p:par>
+                              <p:par>
+                                <p:cTn id="51" presetID="1" presetClass="entr" presetSubtype="0" fill="hold" grpId="0" nodeType="withEffect">
+                                  <p:stCondLst>
+                                    <p:cond delay="0"/>
+                                  </p:stCondLst>
+                                  <p:childTnLst>
+                                    <p:set>
+                                      <p:cBhvr>
+                                        <p:cTn id="52" dur="1" fill="hold">
+                                          <p:stCondLst>
+                                            <p:cond delay="0"/>
+                                          </p:stCondLst>
+                                        </p:cTn>
+                                        <p:tgtEl>
+                                          <p:spTgt spid="22"/>
+                                        </p:tgtEl>
+                                        <p:attrNameLst>
+                                          <p:attrName>style.visibility</p:attrName>
+                                        </p:attrNameLst>
+                                      </p:cBhvr>
+                                      <p:to>
+                                        <p:strVal val="visible"/>
+                                      </p:to>
+                                    </p:set>
+                                  </p:childTnLst>
+                                </p:cTn>
+                              </p:par>
+                              <p:par>
+                                <p:cTn id="53" presetID="1" presetClass="entr" presetSubtype="0" fill="hold" nodeType="withEffect">
+                                  <p:stCondLst>
+                                    <p:cond delay="0"/>
+                                  </p:stCondLst>
+                                  <p:childTnLst>
+                                    <p:set>
+                                      <p:cBhvr>
+                                        <p:cTn id="54" dur="1" fill="hold">
+                                          <p:stCondLst>
+                                            <p:cond delay="0"/>
+                                          </p:stCondLst>
+                                        </p:cTn>
+                                        <p:tgtEl>
+                                          <p:spTgt spid="51"/>
+                                        </p:tgtEl>
+                                        <p:attrNameLst>
+                                          <p:attrName>style.visibility</p:attrName>
+                                        </p:attrNameLst>
+                                      </p:cBhvr>
+                                      <p:to>
+                                        <p:strVal val="visible"/>
+                                      </p:to>
+                                    </p:set>
+                                  </p:childTnLst>
+                                </p:cTn>
+                              </p:par>
+                              <p:par>
+                                <p:cTn id="55" presetID="1" presetClass="entr" presetSubtype="0" fill="hold" grpId="0" nodeType="withEffect">
+                                  <p:stCondLst>
+                                    <p:cond delay="0"/>
+                                  </p:stCondLst>
+                                  <p:childTnLst>
+                                    <p:set>
+                                      <p:cBhvr>
+                                        <p:cTn id="56" dur="1" fill="hold">
+                                          <p:stCondLst>
+                                            <p:cond delay="0"/>
+                                          </p:stCondLst>
+                                        </p:cTn>
+                                        <p:tgtEl>
+                                          <p:spTgt spid="41"/>
+                                        </p:tgtEl>
+                                        <p:attrNameLst>
+                                          <p:attrName>style.visibility</p:attrName>
+                                        </p:attrNameLst>
+                                      </p:cBhvr>
+                                      <p:to>
+                                        <p:strVal val="visible"/>
+                                      </p:to>
+                                    </p:set>
+                                  </p:childTnLst>
+                                </p:cTn>
+                              </p:par>
+                            </p:childTnLst>
+                          </p:cTn>
+                        </p:par>
+                      </p:childTnLst>
+                    </p:cTn>
+                  </p:par>
+                  <p:par>
+                    <p:cTn id="57" fill="hold">
+                      <p:stCondLst>
+                        <p:cond delay="indefinite"/>
+                      </p:stCondLst>
+                      <p:childTnLst>
+                        <p:par>
+                          <p:cTn id="58" fill="hold">
+                            <p:stCondLst>
+                              <p:cond delay="0"/>
+                            </p:stCondLst>
+                            <p:childTnLst>
+                              <p:par>
+                                <p:cTn id="59" presetID="1" presetClass="entr" presetSubtype="0" fill="hold" nodeType="clickEffect">
+                                  <p:stCondLst>
+                                    <p:cond delay="0"/>
+                                  </p:stCondLst>
+                                  <p:childTnLst>
+                                    <p:set>
+                                      <p:cBhvr>
+                                        <p:cTn id="60" dur="1" fill="hold">
+                                          <p:stCondLst>
+                                            <p:cond delay="0"/>
+                                          </p:stCondLst>
+                                        </p:cTn>
+                                        <p:tgtEl>
+                                          <p:spTgt spid="42"/>
+                                        </p:tgtEl>
+                                        <p:attrNameLst>
+                                          <p:attrName>style.visibility</p:attrName>
+                                        </p:attrNameLst>
+                                      </p:cBhvr>
+                                      <p:to>
+                                        <p:strVal val="visible"/>
+                                      </p:to>
+                                    </p:set>
+                                  </p:childTnLst>
+                                </p:cTn>
+                              </p:par>
+                              <p:par>
+                                <p:cTn id="61" presetID="1" presetClass="entr" presetSubtype="0" fill="hold" nodeType="withEffect">
+                                  <p:stCondLst>
+                                    <p:cond delay="0"/>
+                                  </p:stCondLst>
+                                  <p:childTnLst>
+                                    <p:set>
+                                      <p:cBhvr>
+                                        <p:cTn id="62" dur="1" fill="hold">
+                                          <p:stCondLst>
+                                            <p:cond delay="0"/>
+                                          </p:stCondLst>
+                                        </p:cTn>
+                                        <p:tgtEl>
+                                          <p:spTgt spid="44"/>
+                                        </p:tgtEl>
+                                        <p:attrNameLst>
+                                          <p:attrName>style.visibility</p:attrName>
+                                        </p:attrNameLst>
+                                      </p:cBhvr>
+                                      <p:to>
+                                        <p:strVal val="visible"/>
+                                      </p:to>
+                                    </p:set>
+                                  </p:childTnLst>
+                                </p:cTn>
+                              </p:par>
+                              <p:par>
+                                <p:cTn id="63" presetID="1" presetClass="entr" presetSubtype="0" fill="hold" grpId="0" nodeType="withEffect">
+                                  <p:stCondLst>
+                                    <p:cond delay="0"/>
+                                  </p:stCondLst>
+                                  <p:childTnLst>
+                                    <p:set>
+                                      <p:cBhvr>
+                                        <p:cTn id="64" dur="1" fill="hold">
+                                          <p:stCondLst>
+                                            <p:cond delay="0"/>
+                                          </p:stCondLst>
+                                        </p:cTn>
+                                        <p:tgtEl>
+                                          <p:spTgt spid="50"/>
+                                        </p:tgtEl>
+                                        <p:attrNameLst>
+                                          <p:attrName>style.visibility</p:attrName>
+                                        </p:attrNameLst>
+                                      </p:cBhvr>
+                                      <p:to>
+                                        <p:strVal val="visible"/>
+                                      </p:to>
+                                    </p:set>
+                                  </p:childTnLst>
+                                </p:cTn>
+                              </p:par>
+                              <p:par>
+                                <p:cTn id="65" presetID="1" presetClass="entr" presetSubtype="0" fill="hold" grpId="0" nodeType="withEffect">
+                                  <p:stCondLst>
+                                    <p:cond delay="0"/>
+                                  </p:stCondLst>
+                                  <p:childTnLst>
+                                    <p:set>
+                                      <p:cBhvr>
+                                        <p:cTn id="66" dur="1" fill="hold">
+                                          <p:stCondLst>
+                                            <p:cond delay="0"/>
+                                          </p:stCondLst>
+                                        </p:cTn>
+                                        <p:tgtEl>
+                                          <p:spTgt spid="45"/>
+                                        </p:tgtEl>
+                                        <p:attrNameLst>
+                                          <p:attrName>style.visibility</p:attrName>
+                                        </p:attrNameLst>
+                                      </p:cBhvr>
+                                      <p:to>
+                                        <p:strVal val="visible"/>
+                                      </p:to>
+                                    </p:set>
+                                  </p:childTnLst>
+                                </p:cTn>
+                              </p:par>
+                            </p:childTnLst>
+                          </p:cTn>
+                        </p:par>
+                      </p:childTnLst>
+                    </p:cTn>
+                  </p:par>
+                  <p:par>
+                    <p:cTn id="67" fill="hold">
+                      <p:stCondLst>
+                        <p:cond delay="indefinite"/>
+                      </p:stCondLst>
+                      <p:childTnLst>
+                        <p:par>
+                          <p:cTn id="68" fill="hold">
+                            <p:stCondLst>
+                              <p:cond delay="0"/>
+                            </p:stCondLst>
+                            <p:childTnLst>
+                              <p:par>
+                                <p:cTn id="69" presetID="1" presetClass="entr" presetSubtype="0" fill="hold" nodeType="clickEffect">
+                                  <p:stCondLst>
+                                    <p:cond delay="0"/>
+                                  </p:stCondLst>
+                                  <p:childTnLst>
+                                    <p:set>
+                                      <p:cBhvr>
+                                        <p:cTn id="70" dur="1" fill="hold">
+                                          <p:stCondLst>
+                                            <p:cond delay="0"/>
+                                          </p:stCondLst>
+                                        </p:cTn>
+                                        <p:tgtEl>
+                                          <p:spTgt spid="47"/>
+                                        </p:tgtEl>
+                                        <p:attrNameLst>
+                                          <p:attrName>style.visibility</p:attrName>
+                                        </p:attrNameLst>
+                                      </p:cBhvr>
+                                      <p:to>
+                                        <p:strVal val="visible"/>
+                                      </p:to>
+                                    </p:set>
+                                  </p:childTnLst>
+                                </p:cTn>
+                              </p:par>
+                              <p:par>
+                                <p:cTn id="71" presetID="1" presetClass="entr" presetSubtype="0" fill="hold" nodeType="withEffect">
+                                  <p:stCondLst>
+                                    <p:cond delay="0"/>
+                                  </p:stCondLst>
+                                  <p:childTnLst>
+                                    <p:set>
+                                      <p:cBhvr>
+                                        <p:cTn id="72" dur="1" fill="hold">
+                                          <p:stCondLst>
+                                            <p:cond delay="0"/>
+                                          </p:stCondLst>
+                                        </p:cTn>
+                                        <p:tgtEl>
+                                          <p:spTgt spid="46"/>
+                                        </p:tgtEl>
+                                        <p:attrNameLst>
+                                          <p:attrName>style.visibility</p:attrName>
+                                        </p:attrNameLst>
+                                      </p:cBhvr>
+                                      <p:to>
+                                        <p:strVal val="visible"/>
+                                      </p:to>
+                                    </p:set>
+                                  </p:childTnLst>
+                                </p:cTn>
+                              </p:par>
+                              <p:par>
+                                <p:cTn id="73" presetID="1" presetClass="entr" presetSubtype="0" fill="hold" grpId="0" nodeType="withEffect">
+                                  <p:stCondLst>
+                                    <p:cond delay="0"/>
+                                  </p:stCondLst>
+                                  <p:childTnLst>
+                                    <p:set>
+                                      <p:cBhvr>
+                                        <p:cTn id="74" dur="1" fill="hold">
+                                          <p:stCondLst>
+                                            <p:cond delay="0"/>
+                                          </p:stCondLst>
+                                        </p:cTn>
+                                        <p:tgtEl>
+                                          <p:spTgt spid="49"/>
+                                        </p:tgtEl>
+                                        <p:attrNameLst>
+                                          <p:attrName>style.visibility</p:attrName>
+                                        </p:attrNameLst>
+                                      </p:cBhvr>
+                                      <p:to>
+                                        <p:strVal val="visible"/>
+                                      </p:to>
+                                    </p:set>
+                                  </p:childTnLst>
+                                </p:cTn>
+                              </p:par>
+                              <p:par>
+                                <p:cTn id="75" presetID="1" presetClass="entr" presetSubtype="0" fill="hold" grpId="0" nodeType="withEffect">
+                                  <p:stCondLst>
+                                    <p:cond delay="0"/>
+                                  </p:stCondLst>
+                                  <p:childTnLst>
+                                    <p:set>
+                                      <p:cBhvr>
+                                        <p:cTn id="76" dur="1" fill="hold">
+                                          <p:stCondLst>
+                                            <p:cond delay="0"/>
+                                          </p:stCondLst>
+                                        </p:cTn>
+                                        <p:tgtEl>
+                                          <p:spTgt spid="48"/>
+                                        </p:tgtEl>
+                                        <p:attrNameLst>
+                                          <p:attrName>style.visibility</p:attrName>
+                                        </p:attrNameLst>
+                                      </p:cBhvr>
+                                      <p:to>
+                                        <p:strVal val="visible"/>
+                                      </p:to>
+                                    </p:set>
+                                  </p:childTnLst>
+                                </p:cTn>
+                              </p:par>
+                            </p:childTnLst>
+                          </p:cTn>
+                        </p:par>
+                      </p:childTnLst>
+                    </p:cTn>
+                  </p:par>
+                  <p:par>
+                    <p:cTn id="77" fill="hold">
+                      <p:stCondLst>
+                        <p:cond delay="indefinite"/>
+                      </p:stCondLst>
+                      <p:childTnLst>
+                        <p:par>
+                          <p:cTn id="78" fill="hold">
+                            <p:stCondLst>
+                              <p:cond delay="0"/>
+                            </p:stCondLst>
+                            <p:childTnLst>
+                              <p:par>
+                                <p:cTn id="79" presetID="1" presetClass="entr" presetSubtype="0" fill="hold" grpId="0" nodeType="clickEffect">
+                                  <p:stCondLst>
+                                    <p:cond delay="0"/>
+                                  </p:stCondLst>
+                                  <p:childTnLst>
+                                    <p:set>
+                                      <p:cBhvr>
+                                        <p:cTn id="80" dur="1" fill="hold">
+                                          <p:stCondLst>
+                                            <p:cond delay="0"/>
+                                          </p:stCondLst>
+                                        </p:cTn>
+                                        <p:tgtEl>
+                                          <p:spTgt spid="13"/>
+                                        </p:tgtEl>
+                                        <p:attrNameLst>
+                                          <p:attrName>style.visibility</p:attrName>
+                                        </p:attrNameLst>
+                                      </p:cBhvr>
+                                      <p:to>
+                                        <p:strVal val="visible"/>
+                                      </p:to>
+                                    </p:set>
+                                  </p:childTnLst>
+                                </p:cTn>
+                              </p:par>
+                              <p:par>
+                                <p:cTn id="81" presetID="1" presetClass="entr" presetSubtype="0" fill="hold" grpId="0" nodeType="withEffect">
+                                  <p:stCondLst>
+                                    <p:cond delay="0"/>
+                                  </p:stCondLst>
+                                  <p:childTnLst>
+                                    <p:set>
+                                      <p:cBhvr>
+                                        <p:cTn id="82" dur="1" fill="hold">
+                                          <p:stCondLst>
+                                            <p:cond delay="0"/>
+                                          </p:stCondLst>
+                                        </p:cTn>
+                                        <p:tgtEl>
+                                          <p:spTgt spid="12"/>
+                                        </p:tgtEl>
+                                        <p:attrNameLst>
+                                          <p:attrName>style.visibility</p:attrName>
+                                        </p:attrNameLst>
+                                      </p:cBhvr>
+                                      <p:to>
+                                        <p:strVal val="visible"/>
+                                      </p:to>
+                                    </p:set>
+                                  </p:childTnLst>
+                                </p:cTn>
+                              </p:par>
+                              <p:par>
+                                <p:cTn id="83" presetID="1" presetClass="entr" presetSubtype="0" fill="hold" grpId="0" nodeType="withEffect">
+                                  <p:stCondLst>
+                                    <p:cond delay="0"/>
+                                  </p:stCondLst>
+                                  <p:childTnLst>
+                                    <p:set>
+                                      <p:cBhvr>
+                                        <p:cTn id="84" dur="1" fill="hold">
+                                          <p:stCondLst>
+                                            <p:cond delay="0"/>
+                                          </p:stCondLst>
+                                        </p:cTn>
+                                        <p:tgtEl>
+                                          <p:spTgt spid="52"/>
+                                        </p:tgtEl>
+                                        <p:attrNameLst>
+                                          <p:attrName>style.visibility</p:attrName>
+                                        </p:attrNameLst>
+                                      </p:cBhvr>
+                                      <p:to>
+                                        <p:strVal val="visible"/>
+                                      </p:to>
+                                    </p:set>
+                                  </p:childTnLst>
+                                </p:cTn>
+                              </p:par>
+                              <p:par>
+                                <p:cTn id="85" presetID="1" presetClass="entr" presetSubtype="0" fill="hold" grpId="0" nodeType="withEffect">
+                                  <p:stCondLst>
+                                    <p:cond delay="0"/>
+                                  </p:stCondLst>
+                                  <p:childTnLst>
+                                    <p:set>
+                                      <p:cBhvr>
+                                        <p:cTn id="86" dur="1" fill="hold">
+                                          <p:stCondLst>
+                                            <p:cond delay="0"/>
+                                          </p:stCondLst>
+                                        </p:cTn>
+                                        <p:tgtEl>
+                                          <p:spTgt spid="53"/>
+                                        </p:tgtEl>
+                                        <p:attrNameLst>
+                                          <p:attrName>style.visibility</p:attrName>
+                                        </p:attrNameLst>
+                                      </p:cBhvr>
+                                      <p:to>
+                                        <p:strVal val="visible"/>
+                                      </p:to>
+                                    </p:set>
+                                  </p:childTnLst>
+                                </p:cTn>
+                              </p:par>
+                              <p:par>
+                                <p:cTn id="87" presetID="1" presetClass="entr" presetSubtype="0" fill="hold" grpId="0" nodeType="withEffect">
+                                  <p:stCondLst>
+                                    <p:cond delay="0"/>
+                                  </p:stCondLst>
+                                  <p:childTnLst>
+                                    <p:set>
+                                      <p:cBhvr>
+                                        <p:cTn id="88" dur="1" fill="hold">
+                                          <p:stCondLst>
+                                            <p:cond delay="0"/>
+                                          </p:stCondLst>
+                                        </p:cTn>
+                                        <p:tgtEl>
+                                          <p:spTgt spid="54"/>
+                                        </p:tgtEl>
+                                        <p:attrNameLst>
+                                          <p:attrName>style.visibility</p:attrName>
+                                        </p:attrNameLst>
+                                      </p:cBhvr>
+                                      <p:to>
+                                        <p:strVal val="visible"/>
+                                      </p:to>
+                                    </p:set>
+                                  </p:childTnLst>
+                                </p:cTn>
+                              </p:par>
+                              <p:par>
+                                <p:cTn id="89" presetID="1" presetClass="entr" presetSubtype="0" fill="hold" grpId="0" nodeType="withEffect">
+                                  <p:stCondLst>
+                                    <p:cond delay="0"/>
+                                  </p:stCondLst>
+                                  <p:childTnLst>
+                                    <p:set>
+                                      <p:cBhvr>
+                                        <p:cTn id="90" dur="1" fill="hold">
+                                          <p:stCondLst>
+                                            <p:cond delay="0"/>
+                                          </p:stCondLst>
+                                        </p:cTn>
+                                        <p:tgtEl>
+                                          <p:spTgt spid="56"/>
+                                        </p:tgtEl>
+                                        <p:attrNameLst>
+                                          <p:attrName>style.visibility</p:attrName>
+                                        </p:attrNameLst>
+                                      </p:cBhvr>
+                                      <p:to>
+                                        <p:strVal val="visible"/>
+                                      </p:to>
+                                    </p:set>
+                                  </p:childTnLst>
+                                </p:cTn>
+                              </p:par>
+                            </p:childTnLst>
+                          </p:cTn>
+                        </p:par>
+                      </p:childTnLst>
+                    </p:cTn>
+                  </p:par>
+                </p:childTnLst>
+              </p:cTn>
+              <p:prevCondLst>
+                <p:cond evt="onPrev" delay="0">
+                  <p:tgtEl>
+                    <p:sldTgt/>
+                  </p:tgtEl>
+                </p:cond>
+              </p:prevCondLst>
+              <p:nextCondLst>
+                <p:cond evt="onNext" delay="0">
+                  <p:tgtEl>
+                    <p:sldTgt/>
+                  </p:tgtEl>
+                </p:cond>
+              </p:nextCondLst>
+            </p:seq>
+          </p:childTnLst>
+        </p:cTn>
+      </p:par>
+    </p:tnLst>
+    <p:bldLst>
+      <p:bldP spid="56" grpId="0" animBg="1"/>
+      <p:bldP spid="54" grpId="0" animBg="1"/>
+      <p:bldP spid="53" grpId="0" animBg="1"/>
+      <p:bldP spid="52" grpId="0" animBg="1"/>
+      <p:bldP spid="12" grpId="0" animBg="1"/>
+      <p:bldP spid="4" grpId="0"/>
+      <p:bldP spid="16" grpId="0"/>
+      <p:bldP spid="19" grpId="0"/>
+      <p:bldP spid="28" grpId="0"/>
+      <p:bldP spid="31" grpId="0"/>
+      <p:bldP spid="34" grpId="0"/>
+      <p:bldP spid="37" grpId="0"/>
+      <p:bldP spid="38" grpId="0"/>
+      <p:bldP spid="39" grpId="0"/>
+      <p:bldP spid="22" grpId="0"/>
+      <p:bldP spid="41" grpId="0"/>
+      <p:bldP spid="45" grpId="0"/>
+      <p:bldP spid="48" grpId="0"/>
+      <p:bldP spid="49" grpId="0"/>
+      <p:bldP spid="50" grpId="0"/>
+      <p:bldP spid="13" grpId="0"/>
+    </p:bldLst>
+  </p:timing>
 </p:sld>
 </file>
 
@@ -7799,12 +10874,12 @@
       </p:grpSpPr>
       <p:sp>
         <p:nvSpPr>
-          <p:cNvPr id="2" name="Title 1"/>
+          <p:cNvPr id="3" name="Content Placeholder 2"/>
           <p:cNvSpPr>
             <a:spLocks noGrp="1"/>
           </p:cNvSpPr>
           <p:nvPr>
-            <p:ph type="title"/>
+            <p:ph idx="1"/>
           </p:nvPr>
         </p:nvSpPr>
         <p:spPr/>
@@ -7813,92 +10888,77 @@
           <a:lstStyle/>
           <a:p>
             <a:r>
-              <a:rPr lang="en-US" dirty="0" err="1"/>
-              <a:t>BettingInterfaces</a:t>
-            </a:r>
+              <a:rPr lang="en-US" dirty="0" smtClean="0"/>
+              <a:t>f(40) ?</a:t>
+            </a:r>
+          </a:p>
+          <a:p>
+            <a:r>
+              <a:rPr lang="en-US" dirty="0" smtClean="0"/>
+              <a:t>f(400) ?</a:t>
+            </a:r>
+          </a:p>
+          <a:p>
             <a:endParaRPr lang="en-US" dirty="0"/>
           </a:p>
-        </p:txBody>
-      </p:sp>
-      <p:sp>
-        <p:nvSpPr>
-          <p:cNvPr id="3" name="Content Placeholder 2"/>
-          <p:cNvSpPr>
-            <a:spLocks noGrp="1"/>
-          </p:cNvSpPr>
-          <p:nvPr>
-            <p:ph idx="1"/>
-          </p:nvPr>
+          <a:p>
+            <a:r>
+              <a:rPr lang="en-US" dirty="0" smtClean="0"/>
+              <a:t>Open up Fibber.java </a:t>
+            </a:r>
+          </a:p>
+          <a:p>
+            <a:pPr lvl="1"/>
+            <a:r>
+              <a:rPr lang="en-US" dirty="0" smtClean="0"/>
+              <a:t>(memoization package)</a:t>
+            </a:r>
+            <a:endParaRPr lang="en-US" dirty="0"/>
+          </a:p>
+        </p:txBody>
+      </p:sp>
+      <p:sp>
+        <p:nvSpPr>
+          <p:cNvPr id="4" name="Title 1"/>
+          <p:cNvSpPr txBox="1">
+            <a:spLocks/>
+          </p:cNvSpPr>
+          <p:nvPr/>
         </p:nvSpPr>
         <p:spPr>
           <a:xfrm>
-            <a:off x="457200" y="1600200"/>
-            <a:ext cx="8229600" cy="5029200"/>
+            <a:off x="477524" y="-232618"/>
+            <a:ext cx="8229600" cy="1143000"/>
           </a:xfrm>
+          <a:prstGeom prst="rect">
+            <a:avLst/>
+          </a:prstGeom>
         </p:spPr>
         <p:txBody>
-          <a:bodyPr>
-            <a:normAutofit fontScale="92500" lnSpcReduction="10000"/>
+          <a:bodyPr vert="horz" lIns="91440" tIns="45720" rIns="91440" bIns="45720" rtlCol="0" anchor="ctr">
+            <a:normAutofit/>
           </a:bodyPr>
-          <a:lstStyle/>
-          <a:p>
-            <a:r>
-              <a:rPr lang="en-US" dirty="0"/>
-              <a:t>Get in groups of 2-3…no one working alone</a:t>
-            </a:r>
-          </a:p>
-          <a:p>
-            <a:r>
-              <a:rPr lang="en-US" dirty="0"/>
-              <a:t>Understand the given code, the duplication, plus the additional features you will be adding.  Look at 3 TODOs in </a:t>
-            </a:r>
-            <a:r>
-              <a:rPr lang="en-US" dirty="0" err="1"/>
-              <a:t>BettingMain</a:t>
-            </a:r>
-            <a:r>
-              <a:rPr lang="en-US" dirty="0"/>
-              <a:t>.</a:t>
-            </a:r>
-          </a:p>
-          <a:p>
-            <a:r>
-              <a:rPr lang="en-US" dirty="0"/>
-              <a:t>Design a solution for all 3 TODOs using interfaces and make a UML diagram describing it</a:t>
-            </a:r>
-          </a:p>
-          <a:p>
-            <a:r>
-              <a:rPr lang="en-US" dirty="0"/>
-              <a:t>Get myself or a TA to check out your UML</a:t>
-            </a:r>
-          </a:p>
-          <a:p>
-            <a:r>
-              <a:rPr lang="en-US" dirty="0"/>
-              <a:t>Once we sign off – start coding </a:t>
-            </a:r>
-          </a:p>
-          <a:p>
-            <a:pPr lvl="1"/>
-            <a:r>
-              <a:rPr lang="en-US" dirty="0"/>
-              <a:t>You only need 1 computer for this one.  </a:t>
-            </a:r>
-          </a:p>
-          <a:p>
-            <a:pPr lvl="1"/>
-            <a:r>
-              <a:rPr lang="en-US" dirty="0"/>
-              <a:t>I recommend you do each TODO one by one rather than </a:t>
-            </a:r>
-            <a:r>
-              <a:rPr lang="en-US"/>
-              <a:t>doing everything in one go</a:t>
-            </a:r>
-            <a:endParaRPr lang="en-US" dirty="0"/>
-          </a:p>
-          <a:p>
+          <a:lstStyle>
+            <a:lvl1pPr algn="ctr" defTabSz="914400" rtl="0" eaLnBrk="1" latinLnBrk="0" hangingPunct="1">
+              <a:spcBef>
+                <a:spcPct val="0"/>
+              </a:spcBef>
+              <a:buNone/>
+              <a:defRPr sz="4400" kern="1200">
+                <a:solidFill>
+                  <a:schemeClr val="tx1"/>
+                </a:solidFill>
+                <a:latin typeface="+mj-lt"/>
+                <a:ea typeface="+mj-ea"/>
+                <a:cs typeface="+mj-cs"/>
+              </a:defRPr>
+            </a:lvl1pPr>
+          </a:lstStyle>
+          <a:p>
+            <a:r>
+              <a:rPr lang="en-US" smtClean="0"/>
+              <a:t>Recursive Fibonacci Number</a:t>
+            </a:r>
             <a:endParaRPr lang="en-US" dirty="0"/>
           </a:p>
         </p:txBody>
@@ -7906,13 +10966,28 @@
     </p:spTree>
     <p:extLst>
       <p:ext uri="{BB962C8B-B14F-4D97-AF65-F5344CB8AC3E}">
-        <p14:creationId xmlns:p14="http://schemas.microsoft.com/office/powerpoint/2010/main" val="3585860032"/>
+        <p14:creationId xmlns:p14="http://schemas.microsoft.com/office/powerpoint/2010/main" val="4278681860"/>
       </p:ext>
     </p:extLst>
   </p:cSld>
   <p:clrMapOvr>
     <a:masterClrMapping/>
   </p:clrMapOvr>
+  <mc:AlternateContent xmlns:mc="http://schemas.openxmlformats.org/markup-compatibility/2006" xmlns:p14="http://schemas.microsoft.com/office/powerpoint/2010/main">
+    <mc:Choice Requires="p14">
+      <p:transition p14:dur="0"/>
+    </mc:Choice>
+    <mc:Fallback xmlns="">
+      <p:transition/>
+    </mc:Fallback>
+  </mc:AlternateContent>
+  <p:timing>
+    <p:tnLst>
+      <p:par>
+        <p:cTn id="1" dur="indefinite" restart="never" nodeType="tmRoot"/>
+      </p:par>
+    </p:tnLst>
+  </p:timing>
 </p:sld>
 </file>
 

</xml_diff>